<commit_message>
Complete README.md and PowerPoint with Java implementation
</commit_message>
<xml_diff>
--- a/Hyperdrive Project - Presentation.pptx
+++ b/Hyperdrive Project - Presentation.pptx
@@ -5,7 +5,7 @@
     <p:sldMasterId id="2147483660" r:id="rId1"/>
   </p:sldMasterIdLst>
   <p:notesMasterIdLst>
-    <p:notesMasterId r:id="rId9"/>
+    <p:notesMasterId r:id="rId8"/>
   </p:notesMasterIdLst>
   <p:sldIdLst>
     <p:sldId id="256" r:id="rId2"/>
@@ -14,7 +14,6 @@
     <p:sldId id="259" r:id="rId5"/>
     <p:sldId id="260" r:id="rId6"/>
     <p:sldId id="261" r:id="rId7"/>
-    <p:sldId id="262" r:id="rId8"/>
   </p:sldIdLst>
   <p:sldSz cx="12192000" cy="6858000"/>
   <p:notesSz cx="6858000" cy="9144000"/>
@@ -125,12 +124,273 @@
 <p1510:revInfo xmlns:a="http://schemas.openxmlformats.org/drawingml/2006/main" xmlns:r="http://schemas.openxmlformats.org/officeDocument/2006/relationships" xmlns:p1510="http://schemas.microsoft.com/office/powerpoint/2015/10/main">
   <p1510:revLst>
     <p1510:client id="{A31E354D-2F64-44AE-9584-233072750931}" v="42" dt="2023-12-18T12:24:28.862"/>
+    <p1510:client id="{AEC6D4B4-88A1-4199-AA04-3D7D6F24A006}" v="16" dt="2023-12-18T16:18:11.311"/>
   </p1510:revLst>
 </p1510:revInfo>
 </file>
 
 <file path=ppt/changesInfos/changesInfo1.xml><?xml version="1.0" encoding="utf-8"?>
 <pc:chgInfo xmlns:a="http://schemas.openxmlformats.org/drawingml/2006/main" xmlns:r="http://schemas.openxmlformats.org/officeDocument/2006/relationships" xmlns:ac="http://schemas.microsoft.com/office/drawing/2013/main/command" xmlns:pc="http://schemas.microsoft.com/office/powerpoint/2013/main/command">
+  <pc:docChgLst>
+    <pc:chgData name="OPPLIGER Severine" userId="bbff5e40-effe-447c-9c8a-b2d02ae784db" providerId="ADAL" clId="{AEC6D4B4-88A1-4199-AA04-3D7D6F24A006}"/>
+    <pc:docChg chg="custSel delSld modSld">
+      <pc:chgData name="OPPLIGER Severine" userId="bbff5e40-effe-447c-9c8a-b2d02ae784db" providerId="ADAL" clId="{AEC6D4B4-88A1-4199-AA04-3D7D6F24A006}" dt="2023-12-18T16:19:28.106" v="672" actId="2696"/>
+      <pc:docMkLst>
+        <pc:docMk/>
+      </pc:docMkLst>
+      <pc:sldChg chg="addSp delSp modSp mod">
+        <pc:chgData name="OPPLIGER Severine" userId="bbff5e40-effe-447c-9c8a-b2d02ae784db" providerId="ADAL" clId="{AEC6D4B4-88A1-4199-AA04-3D7D6F24A006}" dt="2023-12-18T16:18:11.311" v="648"/>
+        <pc:sldMkLst>
+          <pc:docMk/>
+          <pc:sldMk cId="248013012" sldId="258"/>
+        </pc:sldMkLst>
+        <pc:spChg chg="del">
+          <ac:chgData name="OPPLIGER Severine" userId="bbff5e40-effe-447c-9c8a-b2d02ae784db" providerId="ADAL" clId="{AEC6D4B4-88A1-4199-AA04-3D7D6F24A006}" dt="2023-12-18T16:18:07.988" v="646" actId="478"/>
+          <ac:spMkLst>
+            <pc:docMk/>
+            <pc:sldMk cId="248013012" sldId="258"/>
+            <ac:spMk id="2" creationId="{1D9D951A-93C8-8169-7DB1-AF55C7050321}"/>
+          </ac:spMkLst>
+        </pc:spChg>
+        <pc:spChg chg="add del mod">
+          <ac:chgData name="OPPLIGER Severine" userId="bbff5e40-effe-447c-9c8a-b2d02ae784db" providerId="ADAL" clId="{AEC6D4B4-88A1-4199-AA04-3D7D6F24A006}" dt="2023-12-18T16:18:10.715" v="647" actId="478"/>
+          <ac:spMkLst>
+            <pc:docMk/>
+            <pc:sldMk cId="248013012" sldId="258"/>
+            <ac:spMk id="6" creationId="{3F427D85-8946-6DC8-6CF7-E634E11ED825}"/>
+          </ac:spMkLst>
+        </pc:spChg>
+        <pc:spChg chg="add mod">
+          <ac:chgData name="OPPLIGER Severine" userId="bbff5e40-effe-447c-9c8a-b2d02ae784db" providerId="ADAL" clId="{AEC6D4B4-88A1-4199-AA04-3D7D6F24A006}" dt="2023-12-18T16:18:11.311" v="648"/>
+          <ac:spMkLst>
+            <pc:docMk/>
+            <pc:sldMk cId="248013012" sldId="258"/>
+            <ac:spMk id="9" creationId="{32D48665-5A0C-7CDC-7735-00A59BD97F0C}"/>
+          </ac:spMkLst>
+        </pc:spChg>
+      </pc:sldChg>
+      <pc:sldChg chg="addSp delSp modSp mod delAnim modAnim">
+        <pc:chgData name="OPPLIGER Severine" userId="bbff5e40-effe-447c-9c8a-b2d02ae784db" providerId="ADAL" clId="{AEC6D4B4-88A1-4199-AA04-3D7D6F24A006}" dt="2023-12-18T16:18:15.731" v="649" actId="20577"/>
+        <pc:sldMkLst>
+          <pc:docMk/>
+          <pc:sldMk cId="3120141481" sldId="259"/>
+        </pc:sldMkLst>
+        <pc:spChg chg="mod">
+          <ac:chgData name="OPPLIGER Severine" userId="bbff5e40-effe-447c-9c8a-b2d02ae784db" providerId="ADAL" clId="{AEC6D4B4-88A1-4199-AA04-3D7D6F24A006}" dt="2023-12-18T16:18:15.731" v="649" actId="20577"/>
+          <ac:spMkLst>
+            <pc:docMk/>
+            <pc:sldMk cId="3120141481" sldId="259"/>
+            <ac:spMk id="2" creationId="{36159D9B-21F8-F742-845A-3CFC228BCC64}"/>
+          </ac:spMkLst>
+        </pc:spChg>
+        <pc:spChg chg="add mod">
+          <ac:chgData name="OPPLIGER Severine" userId="bbff5e40-effe-447c-9c8a-b2d02ae784db" providerId="ADAL" clId="{AEC6D4B4-88A1-4199-AA04-3D7D6F24A006}" dt="2023-12-18T16:11:07.664" v="593" actId="1076"/>
+          <ac:spMkLst>
+            <pc:docMk/>
+            <pc:sldMk cId="3120141481" sldId="259"/>
+            <ac:spMk id="3" creationId="{E376CE7F-5EF7-17E4-7E6A-6487DDF60EE1}"/>
+          </ac:spMkLst>
+        </pc:spChg>
+        <pc:spChg chg="add mod">
+          <ac:chgData name="OPPLIGER Severine" userId="bbff5e40-effe-447c-9c8a-b2d02ae784db" providerId="ADAL" clId="{AEC6D4B4-88A1-4199-AA04-3D7D6F24A006}" dt="2023-12-18T16:11:03.436" v="592" actId="1076"/>
+          <ac:spMkLst>
+            <pc:docMk/>
+            <pc:sldMk cId="3120141481" sldId="259"/>
+            <ac:spMk id="7" creationId="{FECBB849-ED76-E270-325C-2C0736792143}"/>
+          </ac:spMkLst>
+        </pc:spChg>
+        <pc:spChg chg="add mod">
+          <ac:chgData name="OPPLIGER Severine" userId="bbff5e40-effe-447c-9c8a-b2d02ae784db" providerId="ADAL" clId="{AEC6D4B4-88A1-4199-AA04-3D7D6F24A006}" dt="2023-12-18T16:15:49.989" v="623" actId="1076"/>
+          <ac:spMkLst>
+            <pc:docMk/>
+            <pc:sldMk cId="3120141481" sldId="259"/>
+            <ac:spMk id="10" creationId="{80B2DD38-EEE7-A815-C6EA-8A0BFF2DF9BF}"/>
+          </ac:spMkLst>
+        </pc:spChg>
+        <pc:spChg chg="add del mod">
+          <ac:chgData name="OPPLIGER Severine" userId="bbff5e40-effe-447c-9c8a-b2d02ae784db" providerId="ADAL" clId="{AEC6D4B4-88A1-4199-AA04-3D7D6F24A006}" dt="2023-12-18T16:11:21.139" v="597"/>
+          <ac:spMkLst>
+            <pc:docMk/>
+            <pc:sldMk cId="3120141481" sldId="259"/>
+            <ac:spMk id="11" creationId="{50F426CD-2D45-8108-8561-AA7A0383B46E}"/>
+          </ac:spMkLst>
+        </pc:spChg>
+        <pc:spChg chg="add del mod">
+          <ac:chgData name="OPPLIGER Severine" userId="bbff5e40-effe-447c-9c8a-b2d02ae784db" providerId="ADAL" clId="{AEC6D4B4-88A1-4199-AA04-3D7D6F24A006}" dt="2023-12-18T16:11:28.971" v="600" actId="478"/>
+          <ac:spMkLst>
+            <pc:docMk/>
+            <pc:sldMk cId="3120141481" sldId="259"/>
+            <ac:spMk id="15" creationId="{BF41E0E7-FD76-8442-034C-468950364CE3}"/>
+          </ac:spMkLst>
+        </pc:spChg>
+        <pc:spChg chg="add del mod">
+          <ac:chgData name="OPPLIGER Severine" userId="bbff5e40-effe-447c-9c8a-b2d02ae784db" providerId="ADAL" clId="{AEC6D4B4-88A1-4199-AA04-3D7D6F24A006}" dt="2023-12-18T16:15:24.254" v="621" actId="478"/>
+          <ac:spMkLst>
+            <pc:docMk/>
+            <pc:sldMk cId="3120141481" sldId="259"/>
+            <ac:spMk id="16" creationId="{7D69BEEC-D865-F869-61E4-CE85388A679B}"/>
+          </ac:spMkLst>
+        </pc:spChg>
+        <pc:spChg chg="add mod ord">
+          <ac:chgData name="OPPLIGER Severine" userId="bbff5e40-effe-447c-9c8a-b2d02ae784db" providerId="ADAL" clId="{AEC6D4B4-88A1-4199-AA04-3D7D6F24A006}" dt="2023-12-18T16:15:55.606" v="625" actId="166"/>
+          <ac:spMkLst>
+            <pc:docMk/>
+            <pc:sldMk cId="3120141481" sldId="259"/>
+            <ac:spMk id="17" creationId="{E2352A55-F42B-175B-CC1F-0F12E05C5D4E}"/>
+          </ac:spMkLst>
+        </pc:spChg>
+        <pc:spChg chg="add mod">
+          <ac:chgData name="OPPLIGER Severine" userId="bbff5e40-effe-447c-9c8a-b2d02ae784db" providerId="ADAL" clId="{AEC6D4B4-88A1-4199-AA04-3D7D6F24A006}" dt="2023-12-18T16:14:34.711" v="615" actId="1076"/>
+          <ac:spMkLst>
+            <pc:docMk/>
+            <pc:sldMk cId="3120141481" sldId="259"/>
+            <ac:spMk id="20" creationId="{15158C23-223D-ECB2-F076-924EAC62C54F}"/>
+          </ac:spMkLst>
+        </pc:spChg>
+        <pc:spChg chg="add mod">
+          <ac:chgData name="OPPLIGER Severine" userId="bbff5e40-effe-447c-9c8a-b2d02ae784db" providerId="ADAL" clId="{AEC6D4B4-88A1-4199-AA04-3D7D6F24A006}" dt="2023-12-18T16:15:52.896" v="624" actId="1076"/>
+          <ac:spMkLst>
+            <pc:docMk/>
+            <pc:sldMk cId="3120141481" sldId="259"/>
+            <ac:spMk id="22" creationId="{45B0C264-B2D8-3107-234B-234806B9BB57}"/>
+          </ac:spMkLst>
+        </pc:spChg>
+        <pc:spChg chg="ord">
+          <ac:chgData name="OPPLIGER Severine" userId="bbff5e40-effe-447c-9c8a-b2d02ae784db" providerId="ADAL" clId="{AEC6D4B4-88A1-4199-AA04-3D7D6F24A006}" dt="2023-12-18T16:10:46.550" v="590" actId="166"/>
+          <ac:spMkLst>
+            <pc:docMk/>
+            <pc:sldMk cId="3120141481" sldId="259"/>
+            <ac:spMk id="2048" creationId="{1D6FEC9C-70EB-CA61-65B4-B3A534508EFB}"/>
+          </ac:spMkLst>
+        </pc:spChg>
+        <pc:spChg chg="del ord">
+          <ac:chgData name="OPPLIGER Severine" userId="bbff5e40-effe-447c-9c8a-b2d02ae784db" providerId="ADAL" clId="{AEC6D4B4-88A1-4199-AA04-3D7D6F24A006}" dt="2023-12-18T16:13:54.916" v="612" actId="478"/>
+          <ac:spMkLst>
+            <pc:docMk/>
+            <pc:sldMk cId="3120141481" sldId="259"/>
+            <ac:spMk id="2075" creationId="{E1D3CA26-B00F-B382-5C3B-6CB78971CEE8}"/>
+          </ac:spMkLst>
+        </pc:spChg>
+        <pc:picChg chg="add mod">
+          <ac:chgData name="OPPLIGER Severine" userId="bbff5e40-effe-447c-9c8a-b2d02ae784db" providerId="ADAL" clId="{AEC6D4B4-88A1-4199-AA04-3D7D6F24A006}" dt="2023-12-18T16:16:50.433" v="632" actId="1076"/>
+          <ac:picMkLst>
+            <pc:docMk/>
+            <pc:sldMk cId="3120141481" sldId="259"/>
+            <ac:picMk id="26" creationId="{80D53CF9-77E9-AC3F-932F-8EB7508DB5D3}"/>
+          </ac:picMkLst>
+        </pc:picChg>
+        <pc:picChg chg="mod">
+          <ac:chgData name="OPPLIGER Severine" userId="bbff5e40-effe-447c-9c8a-b2d02ae784db" providerId="ADAL" clId="{AEC6D4B4-88A1-4199-AA04-3D7D6F24A006}" dt="2023-12-18T16:16:20.898" v="626" actId="1076"/>
+          <ac:picMkLst>
+            <pc:docMk/>
+            <pc:sldMk cId="3120141481" sldId="259"/>
+            <ac:picMk id="61" creationId="{B7583D33-3E09-C6BB-0E0E-15771F52BC23}"/>
+          </ac:picMkLst>
+        </pc:picChg>
+        <pc:picChg chg="mod">
+          <ac:chgData name="OPPLIGER Severine" userId="bbff5e40-effe-447c-9c8a-b2d02ae784db" providerId="ADAL" clId="{AEC6D4B4-88A1-4199-AA04-3D7D6F24A006}" dt="2023-12-18T16:13:59.084" v="613" actId="1076"/>
+          <ac:picMkLst>
+            <pc:docMk/>
+            <pc:sldMk cId="3120141481" sldId="259"/>
+            <ac:picMk id="2076" creationId="{7A1DC198-4F29-5D25-3AE9-F9EE71259DAC}"/>
+          </ac:picMkLst>
+        </pc:picChg>
+        <pc:cxnChg chg="add mod">
+          <ac:chgData name="OPPLIGER Severine" userId="bbff5e40-effe-447c-9c8a-b2d02ae784db" providerId="ADAL" clId="{AEC6D4B4-88A1-4199-AA04-3D7D6F24A006}" dt="2023-12-18T16:13:26.511" v="609" actId="1076"/>
+          <ac:cxnSpMkLst>
+            <pc:docMk/>
+            <pc:sldMk cId="3120141481" sldId="259"/>
+            <ac:cxnSpMk id="18" creationId="{BA73E8E8-91E7-E718-A871-6110F8C378F1}"/>
+          </ac:cxnSpMkLst>
+        </pc:cxnChg>
+        <pc:cxnChg chg="add mod">
+          <ac:chgData name="OPPLIGER Severine" userId="bbff5e40-effe-447c-9c8a-b2d02ae784db" providerId="ADAL" clId="{AEC6D4B4-88A1-4199-AA04-3D7D6F24A006}" dt="2023-12-18T16:13:35.221" v="611" actId="1076"/>
+          <ac:cxnSpMkLst>
+            <pc:docMk/>
+            <pc:sldMk cId="3120141481" sldId="259"/>
+            <ac:cxnSpMk id="19" creationId="{B7A5DF3E-393C-6105-645C-2194A4B306CD}"/>
+          </ac:cxnSpMkLst>
+        </pc:cxnChg>
+        <pc:cxnChg chg="mod">
+          <ac:chgData name="OPPLIGER Severine" userId="bbff5e40-effe-447c-9c8a-b2d02ae784db" providerId="ADAL" clId="{AEC6D4B4-88A1-4199-AA04-3D7D6F24A006}" dt="2023-12-18T16:14:44.568" v="616" actId="14100"/>
+          <ac:cxnSpMkLst>
+            <pc:docMk/>
+            <pc:sldMk cId="3120141481" sldId="259"/>
+            <ac:cxnSpMk id="2078" creationId="{1B1EA988-15C6-8970-1242-82872DED1CF0}"/>
+          </ac:cxnSpMkLst>
+        </pc:cxnChg>
+      </pc:sldChg>
+      <pc:sldChg chg="addSp delSp modSp mod">
+        <pc:chgData name="OPPLIGER Severine" userId="bbff5e40-effe-447c-9c8a-b2d02ae784db" providerId="ADAL" clId="{AEC6D4B4-88A1-4199-AA04-3D7D6F24A006}" dt="2023-12-18T16:17:37.853" v="639" actId="1076"/>
+        <pc:sldMkLst>
+          <pc:docMk/>
+          <pc:sldMk cId="713088759" sldId="260"/>
+        </pc:sldMkLst>
+        <pc:spChg chg="add del mod">
+          <ac:chgData name="OPPLIGER Severine" userId="bbff5e40-effe-447c-9c8a-b2d02ae784db" providerId="ADAL" clId="{AEC6D4B4-88A1-4199-AA04-3D7D6F24A006}" dt="2023-12-18T16:17:31.282" v="634"/>
+          <ac:spMkLst>
+            <pc:docMk/>
+            <pc:sldMk cId="713088759" sldId="260"/>
+            <ac:spMk id="6" creationId="{CAE3C7EA-2F07-87B1-A699-9CFE4955B2BA}"/>
+          </ac:spMkLst>
+        </pc:spChg>
+        <pc:picChg chg="del">
+          <ac:chgData name="OPPLIGER Severine" userId="bbff5e40-effe-447c-9c8a-b2d02ae784db" providerId="ADAL" clId="{AEC6D4B4-88A1-4199-AA04-3D7D6F24A006}" dt="2023-12-18T16:17:30.189" v="633" actId="478"/>
+          <ac:picMkLst>
+            <pc:docMk/>
+            <pc:sldMk cId="713088759" sldId="260"/>
+            <ac:picMk id="7" creationId="{32574692-BE79-ECC7-8DA0-96B5EBA29B57}"/>
+          </ac:picMkLst>
+        </pc:picChg>
+        <pc:picChg chg="add mod">
+          <ac:chgData name="OPPLIGER Severine" userId="bbff5e40-effe-447c-9c8a-b2d02ae784db" providerId="ADAL" clId="{AEC6D4B4-88A1-4199-AA04-3D7D6F24A006}" dt="2023-12-18T16:17:37.853" v="639" actId="1076"/>
+          <ac:picMkLst>
+            <pc:docMk/>
+            <pc:sldMk cId="713088759" sldId="260"/>
+            <ac:picMk id="11" creationId="{5054245E-5585-7E12-5D9D-BAC7543C7B63}"/>
+          </ac:picMkLst>
+        </pc:picChg>
+      </pc:sldChg>
+      <pc:sldChg chg="modSp mod">
+        <pc:chgData name="OPPLIGER Severine" userId="bbff5e40-effe-447c-9c8a-b2d02ae784db" providerId="ADAL" clId="{AEC6D4B4-88A1-4199-AA04-3D7D6F24A006}" dt="2023-12-18T16:08:14.761" v="548" actId="1076"/>
+        <pc:sldMkLst>
+          <pc:docMk/>
+          <pc:sldMk cId="4187522676" sldId="261"/>
+        </pc:sldMkLst>
+        <pc:spChg chg="mod">
+          <ac:chgData name="OPPLIGER Severine" userId="bbff5e40-effe-447c-9c8a-b2d02ae784db" providerId="ADAL" clId="{AEC6D4B4-88A1-4199-AA04-3D7D6F24A006}" dt="2023-12-18T16:08:14.761" v="548" actId="1076"/>
+          <ac:spMkLst>
+            <pc:docMk/>
+            <pc:sldMk cId="4187522676" sldId="261"/>
+            <ac:spMk id="2" creationId="{133305AB-E05D-9620-1D9D-87CA32F160B5}"/>
+          </ac:spMkLst>
+        </pc:spChg>
+        <pc:spChg chg="mod">
+          <ac:chgData name="OPPLIGER Severine" userId="bbff5e40-effe-447c-9c8a-b2d02ae784db" providerId="ADAL" clId="{AEC6D4B4-88A1-4199-AA04-3D7D6F24A006}" dt="2023-12-18T16:08:04.286" v="547" actId="255"/>
+          <ac:spMkLst>
+            <pc:docMk/>
+            <pc:sldMk cId="4187522676" sldId="261"/>
+            <ac:spMk id="3" creationId="{D51070DD-B70F-0E9F-54BE-88D5D50D0753}"/>
+          </ac:spMkLst>
+        </pc:spChg>
+      </pc:sldChg>
+      <pc:sldChg chg="modSp del mod">
+        <pc:chgData name="OPPLIGER Severine" userId="bbff5e40-effe-447c-9c8a-b2d02ae784db" providerId="ADAL" clId="{AEC6D4B4-88A1-4199-AA04-3D7D6F24A006}" dt="2023-12-18T16:19:28.106" v="672" actId="2696"/>
+        <pc:sldMkLst>
+          <pc:docMk/>
+          <pc:sldMk cId="434340359" sldId="262"/>
+        </pc:sldMkLst>
+        <pc:spChg chg="mod">
+          <ac:chgData name="OPPLIGER Severine" userId="bbff5e40-effe-447c-9c8a-b2d02ae784db" providerId="ADAL" clId="{AEC6D4B4-88A1-4199-AA04-3D7D6F24A006}" dt="2023-12-18T16:19:25.036" v="671" actId="20577"/>
+          <ac:spMkLst>
+            <pc:docMk/>
+            <pc:sldMk cId="434340359" sldId="262"/>
+            <ac:spMk id="3" creationId="{27250027-A24D-DBEE-6950-BE4B1917ABA8}"/>
+          </ac:spMkLst>
+        </pc:spChg>
+      </pc:sldChg>
+    </pc:docChg>
+  </pc:docChgLst>
   <pc:docChgLst>
     <pc:chgData name="OPPLIGER Severine" userId="bbff5e40-effe-447c-9c8a-b2d02ae784db" providerId="ADAL" clId="{A31E354D-2F64-44AE-9584-233072750931}"/>
     <pc:docChg chg="undo custSel addSld modSld">
@@ -5341,44 +5601,6 @@
           <a:chExt cx="0" cy="0"/>
         </a:xfrm>
       </p:grpSpPr>
-      <p:sp>
-        <p:nvSpPr>
-          <p:cNvPr id="2" name="Titre 1">
-            <a:extLst>
-              <a:ext uri="{FF2B5EF4-FFF2-40B4-BE49-F238E27FC236}">
-                <a16:creationId xmlns:a16="http://schemas.microsoft.com/office/drawing/2014/main" id="{1D9D951A-93C8-8169-7DB1-AF55C7050321}"/>
-              </a:ext>
-            </a:extLst>
-          </p:cNvPr>
-          <p:cNvSpPr>
-            <a:spLocks noGrp="1"/>
-          </p:cNvSpPr>
-          <p:nvPr>
-            <p:ph type="title"/>
-          </p:nvPr>
-        </p:nvSpPr>
-        <p:spPr>
-          <a:xfrm>
-            <a:off x="754968" y="-3372"/>
-            <a:ext cx="10058400" cy="1609344"/>
-          </a:xfrm>
-        </p:spPr>
-        <p:txBody>
-          <a:bodyPr/>
-          <a:lstStyle/>
-          <a:p>
-            <a:r>
-              <a:rPr lang="fr-CH" dirty="0"/>
-              <a:t>System </a:t>
-            </a:r>
-            <a:r>
-              <a:rPr lang="fr-CH" dirty="0" err="1"/>
-              <a:t>Overview</a:t>
-            </a:r>
-            <a:endParaRPr lang="fr-CH" dirty="0"/>
-          </a:p>
-        </p:txBody>
-      </p:sp>
       <p:pic>
         <p:nvPicPr>
           <p:cNvPr id="7" name="Espace réservé du contenu 6">
@@ -5872,6 +6094,47 @@
           </a:fontRef>
         </p:style>
       </p:cxnSp>
+      <p:sp>
+        <p:nvSpPr>
+          <p:cNvPr id="9" name="Titre 1">
+            <a:extLst>
+              <a:ext uri="{FF2B5EF4-FFF2-40B4-BE49-F238E27FC236}">
+                <a16:creationId xmlns:a16="http://schemas.microsoft.com/office/drawing/2014/main" id="{32D48665-5A0C-7CDC-7735-00A59BD97F0C}"/>
+              </a:ext>
+            </a:extLst>
+          </p:cNvPr>
+          <p:cNvSpPr>
+            <a:spLocks noGrp="1"/>
+          </p:cNvSpPr>
+          <p:nvPr>
+            <p:ph type="title"/>
+          </p:nvPr>
+        </p:nvSpPr>
+        <p:spPr>
+          <a:xfrm>
+            <a:off x="728472" y="18319"/>
+            <a:ext cx="10058400" cy="1290538"/>
+          </a:xfrm>
+        </p:spPr>
+        <p:txBody>
+          <a:bodyPr/>
+          <a:lstStyle/>
+          <a:p>
+            <a:r>
+              <a:rPr lang="fr-CH" dirty="0"/>
+              <a:t>Java </a:t>
+            </a:r>
+            <a:r>
+              <a:rPr lang="fr-CH" dirty="0" err="1"/>
+              <a:t>Implementation</a:t>
+            </a:r>
+            <a:r>
+              <a:rPr lang="fr-CH" dirty="0"/>
+              <a:t> (1/2)</a:t>
+            </a:r>
+          </a:p>
+        </p:txBody>
+      </p:sp>
     </p:spTree>
     <p:extLst>
       <p:ext uri="{BB962C8B-B14F-4D97-AF65-F5344CB8AC3E}">
@@ -6479,7 +6742,10 @@
               <a:rPr lang="fr-CH" dirty="0" err="1"/>
               <a:t>Implementation</a:t>
             </a:r>
-            <a:endParaRPr lang="fr-CH" dirty="0"/>
+            <a:r>
+              <a:rPr lang="fr-CH" dirty="0"/>
+              <a:t> (2/2)</a:t>
+            </a:r>
           </a:p>
         </p:txBody>
       </p:sp>
@@ -8165,7 +8431,7 @@
         </p:blipFill>
         <p:spPr>
           <a:xfrm>
-            <a:off x="4547122" y="3927606"/>
+            <a:off x="4657377" y="3927560"/>
             <a:ext cx="410675" cy="410675"/>
           </a:xfrm>
           <a:prstGeom prst="rect">
@@ -8209,58 +8475,6 @@
           </a:prstGeom>
         </p:spPr>
       </p:pic>
-      <p:sp>
-        <p:nvSpPr>
-          <p:cNvPr id="2048" name="Arc 2047">
-            <a:extLst>
-              <a:ext uri="{FF2B5EF4-FFF2-40B4-BE49-F238E27FC236}">
-                <a16:creationId xmlns:a16="http://schemas.microsoft.com/office/drawing/2014/main" id="{1D6FEC9C-70EB-CA61-65B4-B3A534508EFB}"/>
-              </a:ext>
-            </a:extLst>
-          </p:cNvPr>
-          <p:cNvSpPr/>
-          <p:nvPr/>
-        </p:nvSpPr>
-        <p:spPr>
-          <a:xfrm>
-            <a:off x="4012875" y="3320887"/>
-            <a:ext cx="2124273" cy="606718"/>
-          </a:xfrm>
-          <a:prstGeom prst="arc">
-            <a:avLst>
-              <a:gd name="adj1" fmla="val 365308"/>
-              <a:gd name="adj2" fmla="val 10530050"/>
-            </a:avLst>
-          </a:prstGeom>
-          <a:ln w="28575">
-            <a:solidFill>
-              <a:schemeClr val="tx1"/>
-            </a:solidFill>
-          </a:ln>
-        </p:spPr>
-        <p:style>
-          <a:lnRef idx="1">
-            <a:schemeClr val="accent1"/>
-          </a:lnRef>
-          <a:fillRef idx="0">
-            <a:schemeClr val="accent1"/>
-          </a:fillRef>
-          <a:effectRef idx="0">
-            <a:schemeClr val="accent1"/>
-          </a:effectRef>
-          <a:fontRef idx="minor">
-            <a:schemeClr val="tx1"/>
-          </a:fontRef>
-        </p:style>
-        <p:txBody>
-          <a:bodyPr rtlCol="0" anchor="ctr"/>
-          <a:lstStyle/>
-          <a:p>
-            <a:pPr algn="ctr"/>
-            <a:endParaRPr lang="fr-CH"/>
-          </a:p>
-        </p:txBody>
-      </p:sp>
       <p:cxnSp>
         <p:nvCxnSpPr>
           <p:cNvPr id="2051" name="Connecteur droit 2050">
@@ -8611,58 +8825,6 @@
           </a:fontRef>
         </p:style>
       </p:cxnSp>
-      <p:sp>
-        <p:nvSpPr>
-          <p:cNvPr id="2075" name="Arc 2074">
-            <a:extLst>
-              <a:ext uri="{FF2B5EF4-FFF2-40B4-BE49-F238E27FC236}">
-                <a16:creationId xmlns:a16="http://schemas.microsoft.com/office/drawing/2014/main" id="{E1D3CA26-B00F-B382-5C3B-6CB78971CEE8}"/>
-              </a:ext>
-            </a:extLst>
-          </p:cNvPr>
-          <p:cNvSpPr/>
-          <p:nvPr/>
-        </p:nvSpPr>
-        <p:spPr>
-          <a:xfrm rot="10800000">
-            <a:off x="3558502" y="5202620"/>
-            <a:ext cx="5410553" cy="1308689"/>
-          </a:xfrm>
-          <a:prstGeom prst="arc">
-            <a:avLst>
-              <a:gd name="adj1" fmla="val 10983331"/>
-              <a:gd name="adj2" fmla="val 21300954"/>
-            </a:avLst>
-          </a:prstGeom>
-          <a:ln w="28575">
-            <a:solidFill>
-              <a:schemeClr val="tx1"/>
-            </a:solidFill>
-          </a:ln>
-        </p:spPr>
-        <p:style>
-          <a:lnRef idx="1">
-            <a:schemeClr val="accent1"/>
-          </a:lnRef>
-          <a:fillRef idx="0">
-            <a:schemeClr val="accent1"/>
-          </a:fillRef>
-          <a:effectRef idx="0">
-            <a:schemeClr val="accent1"/>
-          </a:effectRef>
-          <a:fontRef idx="minor">
-            <a:schemeClr val="tx1"/>
-          </a:fontRef>
-        </p:style>
-        <p:txBody>
-          <a:bodyPr rtlCol="0" anchor="ctr"/>
-          <a:lstStyle/>
-          <a:p>
-            <a:pPr algn="ctr"/>
-            <a:endParaRPr lang="fr-CH"/>
-          </a:p>
-        </p:txBody>
-      </p:sp>
       <p:pic>
         <p:nvPicPr>
           <p:cNvPr id="2076" name="Graphique 2075" descr="Badge avec un remplissage uni">
@@ -8691,7 +8853,7 @@
         </p:blipFill>
         <p:spPr>
           <a:xfrm>
-            <a:off x="6263778" y="6081406"/>
+            <a:off x="4739935" y="6224717"/>
             <a:ext cx="410675" cy="410675"/>
           </a:xfrm>
           <a:prstGeom prst="rect">
@@ -8753,14 +8915,14 @@
           </p:cNvPr>
           <p:cNvCxnSpPr>
             <a:cxnSpLocks/>
-            <a:stCxn id="2075" idx="0"/>
+            <a:stCxn id="20" idx="0"/>
           </p:cNvCxnSpPr>
           <p:nvPr/>
         </p:nvCxnSpPr>
         <p:spPr>
           <a:xfrm flipH="1">
-            <a:off x="8747760" y="5997978"/>
-            <a:ext cx="157730" cy="22757"/>
+            <a:off x="8747760" y="6012646"/>
+            <a:ext cx="146851" cy="8089"/>
           </a:xfrm>
           <a:prstGeom prst="line">
             <a:avLst/>
@@ -8786,6 +8948,470 @@
           </a:fontRef>
         </p:style>
       </p:cxnSp>
+      <p:sp>
+        <p:nvSpPr>
+          <p:cNvPr id="3" name="Rectangle : coins arrondis 2">
+            <a:extLst>
+              <a:ext uri="{FF2B5EF4-FFF2-40B4-BE49-F238E27FC236}">
+                <a16:creationId xmlns:a16="http://schemas.microsoft.com/office/drawing/2014/main" id="{E376CE7F-5EF7-17E4-7E6A-6487DDF60EE1}"/>
+              </a:ext>
+            </a:extLst>
+          </p:cNvPr>
+          <p:cNvSpPr/>
+          <p:nvPr/>
+        </p:nvSpPr>
+        <p:spPr>
+          <a:xfrm>
+            <a:off x="3798464" y="3859744"/>
+            <a:ext cx="775763" cy="244273"/>
+          </a:xfrm>
+          <a:prstGeom prst="roundRect">
+            <a:avLst/>
+          </a:prstGeom>
+        </p:spPr>
+        <p:style>
+          <a:lnRef idx="3">
+            <a:schemeClr val="lt1"/>
+          </a:lnRef>
+          <a:fillRef idx="1">
+            <a:schemeClr val="accent5"/>
+          </a:fillRef>
+          <a:effectRef idx="1">
+            <a:schemeClr val="accent5"/>
+          </a:effectRef>
+          <a:fontRef idx="minor">
+            <a:schemeClr val="lt1"/>
+          </a:fontRef>
+        </p:style>
+        <p:txBody>
+          <a:bodyPr rtlCol="0" anchor="ctr"/>
+          <a:lstStyle/>
+          <a:p>
+            <a:pPr algn="ctr"/>
+            <a:r>
+              <a:rPr lang="fr-CH" sz="800" dirty="0"/>
+              <a:t>Observable</a:t>
+            </a:r>
+          </a:p>
+        </p:txBody>
+      </p:sp>
+      <p:sp>
+        <p:nvSpPr>
+          <p:cNvPr id="7" name="Rectangle : coins arrondis 6">
+            <a:extLst>
+              <a:ext uri="{FF2B5EF4-FFF2-40B4-BE49-F238E27FC236}">
+                <a16:creationId xmlns:a16="http://schemas.microsoft.com/office/drawing/2014/main" id="{FECBB849-ED76-E270-325C-2C0736792143}"/>
+              </a:ext>
+            </a:extLst>
+          </p:cNvPr>
+          <p:cNvSpPr/>
+          <p:nvPr/>
+        </p:nvSpPr>
+        <p:spPr>
+          <a:xfrm>
+            <a:off x="5290934" y="3861583"/>
+            <a:ext cx="664965" cy="244273"/>
+          </a:xfrm>
+          <a:prstGeom prst="roundRect">
+            <a:avLst/>
+          </a:prstGeom>
+        </p:spPr>
+        <p:style>
+          <a:lnRef idx="3">
+            <a:schemeClr val="lt1"/>
+          </a:lnRef>
+          <a:fillRef idx="1">
+            <a:schemeClr val="accent5"/>
+          </a:fillRef>
+          <a:effectRef idx="1">
+            <a:schemeClr val="accent5"/>
+          </a:effectRef>
+          <a:fontRef idx="minor">
+            <a:schemeClr val="lt1"/>
+          </a:fontRef>
+        </p:style>
+        <p:txBody>
+          <a:bodyPr rtlCol="0" anchor="ctr"/>
+          <a:lstStyle/>
+          <a:p>
+            <a:pPr algn="ctr"/>
+            <a:r>
+              <a:rPr lang="fr-CH" sz="800" dirty="0"/>
+              <a:t>Observer</a:t>
+            </a:r>
+          </a:p>
+        </p:txBody>
+      </p:sp>
+      <p:sp>
+        <p:nvSpPr>
+          <p:cNvPr id="2048" name="Arc 2047">
+            <a:extLst>
+              <a:ext uri="{FF2B5EF4-FFF2-40B4-BE49-F238E27FC236}">
+                <a16:creationId xmlns:a16="http://schemas.microsoft.com/office/drawing/2014/main" id="{1D6FEC9C-70EB-CA61-65B4-B3A534508EFB}"/>
+              </a:ext>
+            </a:extLst>
+          </p:cNvPr>
+          <p:cNvSpPr/>
+          <p:nvPr/>
+        </p:nvSpPr>
+        <p:spPr>
+          <a:xfrm>
+            <a:off x="4012875" y="3320887"/>
+            <a:ext cx="2124273" cy="606718"/>
+          </a:xfrm>
+          <a:prstGeom prst="arc">
+            <a:avLst>
+              <a:gd name="adj1" fmla="val 365308"/>
+              <a:gd name="adj2" fmla="val 10530050"/>
+            </a:avLst>
+          </a:prstGeom>
+          <a:ln w="28575">
+            <a:solidFill>
+              <a:schemeClr val="tx1"/>
+            </a:solidFill>
+          </a:ln>
+        </p:spPr>
+        <p:style>
+          <a:lnRef idx="1">
+            <a:schemeClr val="accent1"/>
+          </a:lnRef>
+          <a:fillRef idx="0">
+            <a:schemeClr val="accent1"/>
+          </a:fillRef>
+          <a:effectRef idx="0">
+            <a:schemeClr val="accent1"/>
+          </a:effectRef>
+          <a:fontRef idx="minor">
+            <a:schemeClr val="tx1"/>
+          </a:fontRef>
+        </p:style>
+        <p:txBody>
+          <a:bodyPr rtlCol="0" anchor="ctr"/>
+          <a:lstStyle/>
+          <a:p>
+            <a:pPr algn="ctr"/>
+            <a:endParaRPr lang="fr-CH"/>
+          </a:p>
+        </p:txBody>
+      </p:sp>
+      <p:sp>
+        <p:nvSpPr>
+          <p:cNvPr id="10" name="Rectangle : coins arrondis 9">
+            <a:extLst>
+              <a:ext uri="{FF2B5EF4-FFF2-40B4-BE49-F238E27FC236}">
+                <a16:creationId xmlns:a16="http://schemas.microsoft.com/office/drawing/2014/main" id="{80B2DD38-EEE7-A815-C6EA-8A0BFF2DF9BF}"/>
+              </a:ext>
+            </a:extLst>
+          </p:cNvPr>
+          <p:cNvSpPr/>
+          <p:nvPr/>
+        </p:nvSpPr>
+        <p:spPr>
+          <a:xfrm>
+            <a:off x="3890063" y="6082839"/>
+            <a:ext cx="775763" cy="244273"/>
+          </a:xfrm>
+          <a:prstGeom prst="roundRect">
+            <a:avLst/>
+          </a:prstGeom>
+        </p:spPr>
+        <p:style>
+          <a:lnRef idx="3">
+            <a:schemeClr val="lt1"/>
+          </a:lnRef>
+          <a:fillRef idx="1">
+            <a:schemeClr val="accent5"/>
+          </a:fillRef>
+          <a:effectRef idx="1">
+            <a:schemeClr val="accent5"/>
+          </a:effectRef>
+          <a:fontRef idx="minor">
+            <a:schemeClr val="lt1"/>
+          </a:fontRef>
+        </p:style>
+        <p:txBody>
+          <a:bodyPr rtlCol="0" anchor="ctr"/>
+          <a:lstStyle/>
+          <a:p>
+            <a:pPr algn="ctr"/>
+            <a:r>
+              <a:rPr lang="fr-CH" sz="800" dirty="0"/>
+              <a:t>Observable</a:t>
+            </a:r>
+          </a:p>
+        </p:txBody>
+      </p:sp>
+      <p:cxnSp>
+        <p:nvCxnSpPr>
+          <p:cNvPr id="18" name="Connecteur droit 17">
+            <a:extLst>
+              <a:ext uri="{FF2B5EF4-FFF2-40B4-BE49-F238E27FC236}">
+                <a16:creationId xmlns:a16="http://schemas.microsoft.com/office/drawing/2014/main" id="{BA73E8E8-91E7-E718-A871-6110F8C378F1}"/>
+              </a:ext>
+            </a:extLst>
+          </p:cNvPr>
+          <p:cNvCxnSpPr/>
+          <p:nvPr/>
+        </p:nvCxnSpPr>
+        <p:spPr>
+          <a:xfrm flipH="1">
+            <a:off x="6007633" y="5987380"/>
+            <a:ext cx="17696" cy="171696"/>
+          </a:xfrm>
+          <a:prstGeom prst="line">
+            <a:avLst/>
+          </a:prstGeom>
+          <a:ln w="28575">
+            <a:solidFill>
+              <a:schemeClr val="tx1"/>
+            </a:solidFill>
+          </a:ln>
+        </p:spPr>
+        <p:style>
+          <a:lnRef idx="1">
+            <a:schemeClr val="accent1"/>
+          </a:lnRef>
+          <a:fillRef idx="0">
+            <a:schemeClr val="accent1"/>
+          </a:fillRef>
+          <a:effectRef idx="0">
+            <a:schemeClr val="accent1"/>
+          </a:effectRef>
+          <a:fontRef idx="minor">
+            <a:schemeClr val="tx1"/>
+          </a:fontRef>
+        </p:style>
+      </p:cxnSp>
+      <p:cxnSp>
+        <p:nvCxnSpPr>
+          <p:cNvPr id="19" name="Connecteur droit 18">
+            <a:extLst>
+              <a:ext uri="{FF2B5EF4-FFF2-40B4-BE49-F238E27FC236}">
+                <a16:creationId xmlns:a16="http://schemas.microsoft.com/office/drawing/2014/main" id="{B7A5DF3E-393C-6105-645C-2194A4B306CD}"/>
+              </a:ext>
+            </a:extLst>
+          </p:cNvPr>
+          <p:cNvCxnSpPr>
+            <a:cxnSpLocks/>
+          </p:cNvCxnSpPr>
+          <p:nvPr/>
+        </p:nvCxnSpPr>
+        <p:spPr>
+          <a:xfrm>
+            <a:off x="5859415" y="5982901"/>
+            <a:ext cx="171592" cy="15759"/>
+          </a:xfrm>
+          <a:prstGeom prst="line">
+            <a:avLst/>
+          </a:prstGeom>
+          <a:ln w="28575">
+            <a:solidFill>
+              <a:schemeClr val="tx1"/>
+            </a:solidFill>
+          </a:ln>
+        </p:spPr>
+        <p:style>
+          <a:lnRef idx="1">
+            <a:schemeClr val="accent1"/>
+          </a:lnRef>
+          <a:fillRef idx="0">
+            <a:schemeClr val="accent1"/>
+          </a:fillRef>
+          <a:effectRef idx="0">
+            <a:schemeClr val="accent1"/>
+          </a:effectRef>
+          <a:fontRef idx="minor">
+            <a:schemeClr val="tx1"/>
+          </a:fontRef>
+        </p:style>
+      </p:cxnSp>
+      <p:sp>
+        <p:nvSpPr>
+          <p:cNvPr id="20" name="Arc 19">
+            <a:extLst>
+              <a:ext uri="{FF2B5EF4-FFF2-40B4-BE49-F238E27FC236}">
+                <a16:creationId xmlns:a16="http://schemas.microsoft.com/office/drawing/2014/main" id="{15158C23-223D-ECB2-F076-924EAC62C54F}"/>
+              </a:ext>
+            </a:extLst>
+          </p:cNvPr>
+          <p:cNvSpPr/>
+          <p:nvPr/>
+        </p:nvSpPr>
+        <p:spPr>
+          <a:xfrm>
+            <a:off x="6837463" y="5603154"/>
+            <a:ext cx="2124273" cy="606718"/>
+          </a:xfrm>
+          <a:prstGeom prst="arc">
+            <a:avLst>
+              <a:gd name="adj1" fmla="val 365308"/>
+              <a:gd name="adj2" fmla="val 10530050"/>
+            </a:avLst>
+          </a:prstGeom>
+          <a:ln w="28575">
+            <a:solidFill>
+              <a:schemeClr val="tx1"/>
+            </a:solidFill>
+          </a:ln>
+        </p:spPr>
+        <p:style>
+          <a:lnRef idx="1">
+            <a:schemeClr val="accent1"/>
+          </a:lnRef>
+          <a:fillRef idx="0">
+            <a:schemeClr val="accent1"/>
+          </a:fillRef>
+          <a:effectRef idx="0">
+            <a:schemeClr val="accent1"/>
+          </a:effectRef>
+          <a:fontRef idx="minor">
+            <a:schemeClr val="tx1"/>
+          </a:fontRef>
+        </p:style>
+        <p:txBody>
+          <a:bodyPr rtlCol="0" anchor="ctr"/>
+          <a:lstStyle/>
+          <a:p>
+            <a:pPr algn="ctr"/>
+            <a:endParaRPr lang="fr-CH"/>
+          </a:p>
+        </p:txBody>
+      </p:sp>
+      <p:sp>
+        <p:nvSpPr>
+          <p:cNvPr id="22" name="Rectangle : coins arrondis 21">
+            <a:extLst>
+              <a:ext uri="{FF2B5EF4-FFF2-40B4-BE49-F238E27FC236}">
+                <a16:creationId xmlns:a16="http://schemas.microsoft.com/office/drawing/2014/main" id="{45B0C264-B2D8-3107-234B-234806B9BB57}"/>
+              </a:ext>
+            </a:extLst>
+          </p:cNvPr>
+          <p:cNvSpPr/>
+          <p:nvPr/>
+        </p:nvSpPr>
+        <p:spPr>
+          <a:xfrm>
+            <a:off x="5317111" y="6132691"/>
+            <a:ext cx="664965" cy="244273"/>
+          </a:xfrm>
+          <a:prstGeom prst="roundRect">
+            <a:avLst/>
+          </a:prstGeom>
+        </p:spPr>
+        <p:style>
+          <a:lnRef idx="3">
+            <a:schemeClr val="lt1"/>
+          </a:lnRef>
+          <a:fillRef idx="1">
+            <a:schemeClr val="accent5"/>
+          </a:fillRef>
+          <a:effectRef idx="1">
+            <a:schemeClr val="accent5"/>
+          </a:effectRef>
+          <a:fontRef idx="minor">
+            <a:schemeClr val="lt1"/>
+          </a:fontRef>
+        </p:style>
+        <p:txBody>
+          <a:bodyPr rtlCol="0" anchor="ctr"/>
+          <a:lstStyle/>
+          <a:p>
+            <a:pPr algn="ctr"/>
+            <a:r>
+              <a:rPr lang="fr-CH" sz="800" dirty="0"/>
+              <a:t>Observer</a:t>
+            </a:r>
+          </a:p>
+        </p:txBody>
+      </p:sp>
+      <p:sp>
+        <p:nvSpPr>
+          <p:cNvPr id="17" name="Arc 16">
+            <a:extLst>
+              <a:ext uri="{FF2B5EF4-FFF2-40B4-BE49-F238E27FC236}">
+                <a16:creationId xmlns:a16="http://schemas.microsoft.com/office/drawing/2014/main" id="{E2352A55-F42B-175B-CC1F-0F12E05C5D4E}"/>
+              </a:ext>
+            </a:extLst>
+          </p:cNvPr>
+          <p:cNvSpPr/>
+          <p:nvPr/>
+        </p:nvSpPr>
+        <p:spPr>
+          <a:xfrm>
+            <a:off x="3971727" y="5581413"/>
+            <a:ext cx="2124273" cy="606718"/>
+          </a:xfrm>
+          <a:prstGeom prst="arc">
+            <a:avLst>
+              <a:gd name="adj1" fmla="val 365308"/>
+              <a:gd name="adj2" fmla="val 10530050"/>
+            </a:avLst>
+          </a:prstGeom>
+          <a:ln w="28575">
+            <a:solidFill>
+              <a:schemeClr val="tx1"/>
+            </a:solidFill>
+          </a:ln>
+        </p:spPr>
+        <p:style>
+          <a:lnRef idx="1">
+            <a:schemeClr val="accent1"/>
+          </a:lnRef>
+          <a:fillRef idx="0">
+            <a:schemeClr val="accent1"/>
+          </a:fillRef>
+          <a:effectRef idx="0">
+            <a:schemeClr val="accent1"/>
+          </a:effectRef>
+          <a:fontRef idx="minor">
+            <a:schemeClr val="tx1"/>
+          </a:fontRef>
+        </p:style>
+        <p:txBody>
+          <a:bodyPr rtlCol="0" anchor="ctr"/>
+          <a:lstStyle/>
+          <a:p>
+            <a:pPr algn="ctr"/>
+            <a:endParaRPr lang="fr-CH"/>
+          </a:p>
+        </p:txBody>
+      </p:sp>
+      <p:pic>
+        <p:nvPicPr>
+          <p:cNvPr id="26" name="Graphique 25" descr="Badge 3 avec un remplissage uni">
+            <a:extLst>
+              <a:ext uri="{FF2B5EF4-FFF2-40B4-BE49-F238E27FC236}">
+                <a16:creationId xmlns:a16="http://schemas.microsoft.com/office/drawing/2014/main" id="{80D53CF9-77E9-AC3F-932F-8EB7508DB5D3}"/>
+              </a:ext>
+            </a:extLst>
+          </p:cNvPr>
+          <p:cNvPicPr>
+            <a:picLocks noChangeAspect="1"/>
+          </p:cNvPicPr>
+          <p:nvPr/>
+        </p:nvPicPr>
+        <p:blipFill>
+          <a:blip r:embed="rId25">
+            <a:extLst>
+              <a:ext uri="{96DAC541-7B7A-43D3-8B79-37D633B846F1}">
+                <asvg:svgBlip xmlns:asvg="http://schemas.microsoft.com/office/drawing/2016/SVG/main" r:embed="rId26"/>
+              </a:ext>
+            </a:extLst>
+          </a:blip>
+          <a:stretch>
+            <a:fillRect/>
+          </a:stretch>
+        </p:blipFill>
+        <p:spPr>
+          <a:xfrm>
+            <a:off x="7692018" y="6213898"/>
+            <a:ext cx="415162" cy="415162"/>
+          </a:xfrm>
+          <a:prstGeom prst="rect">
+            <a:avLst/>
+          </a:prstGeom>
+        </p:spPr>
+      </p:pic>
     </p:spTree>
     <p:extLst>
       <p:ext uri="{BB962C8B-B14F-4D97-AF65-F5344CB8AC3E}">
@@ -9922,68 +10548,15 @@
                                   </p:childTnLst>
                                 </p:cTn>
                               </p:par>
-                            </p:childTnLst>
-                          </p:cTn>
-                        </p:par>
-                      </p:childTnLst>
-                    </p:cTn>
-                  </p:par>
-                  <p:par>
-                    <p:cTn id="103" fill="hold">
-                      <p:stCondLst>
-                        <p:cond delay="indefinite"/>
-                      </p:stCondLst>
-                      <p:childTnLst>
-                        <p:par>
-                          <p:cTn id="104" fill="hold">
-                            <p:stCondLst>
-                              <p:cond delay="0"/>
-                            </p:stCondLst>
-                            <p:childTnLst>
                               <p:par>
-                                <p:cTn id="105" presetID="10" presetClass="entr" presetSubtype="0" fill="hold" grpId="0" nodeType="clickEffect">
+                                <p:cTn id="103" presetID="10" presetClass="entr" presetSubtype="0" fill="hold" nodeType="withEffect">
                                   <p:stCondLst>
                                     <p:cond delay="0"/>
                                   </p:stCondLst>
                                   <p:childTnLst>
                                     <p:set>
                                       <p:cBhvr>
-                                        <p:cTn id="106" dur="1" fill="hold">
-                                          <p:stCondLst>
-                                            <p:cond delay="0"/>
-                                          </p:stCondLst>
-                                        </p:cTn>
-                                        <p:tgtEl>
-                                          <p:spTgt spid="2075"/>
-                                        </p:tgtEl>
-                                        <p:attrNameLst>
-                                          <p:attrName>style.visibility</p:attrName>
-                                        </p:attrNameLst>
-                                      </p:cBhvr>
-                                      <p:to>
-                                        <p:strVal val="visible"/>
-                                      </p:to>
-                                    </p:set>
-                                    <p:animEffect transition="in" filter="fade">
-                                      <p:cBhvr>
-                                        <p:cTn id="107" dur="500"/>
-                                        <p:tgtEl>
-                                          <p:spTgt spid="2075"/>
-                                        </p:tgtEl>
-                                      </p:cBhvr>
-                                    </p:animEffect>
-                                  </p:childTnLst>
-                                </p:cTn>
-                              </p:par>
-                              <p:par>
-                                <p:cTn id="108" presetID="10" presetClass="entr" presetSubtype="0" fill="hold" nodeType="withEffect">
-                                  <p:stCondLst>
-                                    <p:cond delay="0"/>
-                                  </p:stCondLst>
-                                  <p:childTnLst>
-                                    <p:set>
-                                      <p:cBhvr>
-                                        <p:cTn id="109" dur="1" fill="hold">
+                                        <p:cTn id="104" dur="1" fill="hold">
                                           <p:stCondLst>
                                             <p:cond delay="0"/>
                                           </p:stCondLst>
@@ -10001,7 +10574,7 @@
                                     </p:set>
                                     <p:animEffect transition="in" filter="fade">
                                       <p:cBhvr>
-                                        <p:cTn id="110" dur="500"/>
+                                        <p:cTn id="105" dur="500"/>
                                         <p:tgtEl>
                                           <p:spTgt spid="2076"/>
                                         </p:tgtEl>
@@ -10011,14 +10584,14 @@
                                 </p:cTn>
                               </p:par>
                               <p:par>
-                                <p:cTn id="111" presetID="10" presetClass="entr" presetSubtype="0" fill="hold" nodeType="withEffect">
+                                <p:cTn id="106" presetID="10" presetClass="entr" presetSubtype="0" fill="hold" nodeType="withEffect">
                                   <p:stCondLst>
                                     <p:cond delay="0"/>
                                   </p:stCondLst>
                                   <p:childTnLst>
                                     <p:set>
                                       <p:cBhvr>
-                                        <p:cTn id="112" dur="1" fill="hold">
+                                        <p:cTn id="107" dur="1" fill="hold">
                                           <p:stCondLst>
                                             <p:cond delay="0"/>
                                           </p:stCondLst>
@@ -10036,7 +10609,7 @@
                                     </p:set>
                                     <p:animEffect transition="in" filter="fade">
                                       <p:cBhvr>
-                                        <p:cTn id="113" dur="500"/>
+                                        <p:cTn id="108" dur="500"/>
                                         <p:tgtEl>
                                           <p:spTgt spid="2077"/>
                                         </p:tgtEl>
@@ -10046,14 +10619,14 @@
                                 </p:cTn>
                               </p:par>
                               <p:par>
-                                <p:cTn id="114" presetID="10" presetClass="entr" presetSubtype="0" fill="hold" nodeType="withEffect">
+                                <p:cTn id="109" presetID="10" presetClass="entr" presetSubtype="0" fill="hold" nodeType="withEffect">
                                   <p:stCondLst>
                                     <p:cond delay="0"/>
                                   </p:stCondLst>
                                   <p:childTnLst>
                                     <p:set>
                                       <p:cBhvr>
-                                        <p:cTn id="115" dur="1" fill="hold">
+                                        <p:cTn id="110" dur="1" fill="hold">
                                           <p:stCondLst>
                                             <p:cond delay="0"/>
                                           </p:stCondLst>
@@ -10071,7 +10644,7 @@
                                     </p:set>
                                     <p:animEffect transition="in" filter="fade">
                                       <p:cBhvr>
-                                        <p:cTn id="116" dur="500"/>
+                                        <p:cTn id="111" dur="500"/>
                                         <p:tgtEl>
                                           <p:spTgt spid="2078"/>
                                         </p:tgtEl>
@@ -10087,26 +10660,26 @@
                     </p:cTn>
                   </p:par>
                   <p:par>
-                    <p:cTn id="117" fill="hold">
+                    <p:cTn id="112" fill="hold">
                       <p:stCondLst>
                         <p:cond delay="indefinite"/>
                       </p:stCondLst>
                       <p:childTnLst>
                         <p:par>
-                          <p:cTn id="118" fill="hold">
+                          <p:cTn id="113" fill="hold">
                             <p:stCondLst>
                               <p:cond delay="0"/>
                             </p:stCondLst>
                             <p:childTnLst>
                               <p:par>
-                                <p:cTn id="119" presetID="10" presetClass="entr" presetSubtype="0" fill="hold" nodeType="clickEffect">
+                                <p:cTn id="114" presetID="10" presetClass="entr" presetSubtype="0" fill="hold" nodeType="clickEffect">
                                   <p:stCondLst>
                                     <p:cond delay="0"/>
                                   </p:stCondLst>
                                   <p:childTnLst>
                                     <p:set>
                                       <p:cBhvr>
-                                        <p:cTn id="120" dur="1" fill="hold">
+                                        <p:cTn id="115" dur="1" fill="hold">
                                           <p:stCondLst>
                                             <p:cond delay="0"/>
                                           </p:stCondLst>
@@ -10124,7 +10697,7 @@
                                     </p:set>
                                     <p:animEffect transition="in" filter="fade">
                                       <p:cBhvr>
-                                        <p:cTn id="121" dur="500"/>
+                                        <p:cTn id="116" dur="500"/>
                                         <p:tgtEl>
                                           <p:spTgt spid="2060"/>
                                         </p:tgtEl>
@@ -10134,14 +10707,14 @@
                                 </p:cTn>
                               </p:par>
                               <p:par>
-                                <p:cTn id="122" presetID="10" presetClass="entr" presetSubtype="0" fill="hold" nodeType="withEffect">
+                                <p:cTn id="117" presetID="10" presetClass="entr" presetSubtype="0" fill="hold" nodeType="withEffect">
                                   <p:stCondLst>
                                     <p:cond delay="0"/>
                                   </p:stCondLst>
                                   <p:childTnLst>
                                     <p:set>
                                       <p:cBhvr>
-                                        <p:cTn id="123" dur="1" fill="hold">
+                                        <p:cTn id="118" dur="1" fill="hold">
                                           <p:stCondLst>
                                             <p:cond delay="0"/>
                                           </p:stCondLst>
@@ -10159,7 +10732,7 @@
                                     </p:set>
                                     <p:animEffect transition="in" filter="fade">
                                       <p:cBhvr>
-                                        <p:cTn id="124" dur="500"/>
+                                        <p:cTn id="119" dur="500"/>
                                         <p:tgtEl>
                                           <p:spTgt spid="2058"/>
                                         </p:tgtEl>
@@ -10169,14 +10742,14 @@
                                 </p:cTn>
                               </p:par>
                               <p:par>
-                                <p:cTn id="125" presetID="10" presetClass="entr" presetSubtype="0" fill="hold" nodeType="withEffect">
+                                <p:cTn id="120" presetID="10" presetClass="entr" presetSubtype="0" fill="hold" nodeType="withEffect">
                                   <p:stCondLst>
                                     <p:cond delay="0"/>
                                   </p:stCondLst>
                                   <p:childTnLst>
                                     <p:set>
                                       <p:cBhvr>
-                                        <p:cTn id="126" dur="1" fill="hold">
+                                        <p:cTn id="121" dur="1" fill="hold">
                                           <p:stCondLst>
                                             <p:cond delay="0"/>
                                           </p:stCondLst>
@@ -10194,9 +10767,185 @@
                                     </p:set>
                                     <p:animEffect transition="in" filter="fade">
                                       <p:cBhvr>
+                                        <p:cTn id="122" dur="500"/>
+                                        <p:tgtEl>
+                                          <p:spTgt spid="29"/>
+                                        </p:tgtEl>
+                                      </p:cBhvr>
+                                    </p:animEffect>
+                                  </p:childTnLst>
+                                </p:cTn>
+                              </p:par>
+                            </p:childTnLst>
+                          </p:cTn>
+                        </p:par>
+                      </p:childTnLst>
+                    </p:cTn>
+                  </p:par>
+                  <p:par>
+                    <p:cTn id="123" fill="hold">
+                      <p:stCondLst>
+                        <p:cond delay="indefinite"/>
+                      </p:stCondLst>
+                      <p:childTnLst>
+                        <p:par>
+                          <p:cTn id="124" fill="hold">
+                            <p:stCondLst>
+                              <p:cond delay="0"/>
+                            </p:stCondLst>
+                            <p:childTnLst>
+                              <p:par>
+                                <p:cTn id="125" presetID="10" presetClass="entr" presetSubtype="0" fill="hold" grpId="0" nodeType="clickEffect">
+                                  <p:stCondLst>
+                                    <p:cond delay="0"/>
+                                  </p:stCondLst>
+                                  <p:childTnLst>
+                                    <p:set>
+                                      <p:cBhvr>
+                                        <p:cTn id="126" dur="1" fill="hold">
+                                          <p:stCondLst>
+                                            <p:cond delay="0"/>
+                                          </p:stCondLst>
+                                        </p:cTn>
+                                        <p:tgtEl>
+                                          <p:spTgt spid="17"/>
+                                        </p:tgtEl>
+                                        <p:attrNameLst>
+                                          <p:attrName>style.visibility</p:attrName>
+                                        </p:attrNameLst>
+                                      </p:cBhvr>
+                                      <p:to>
+                                        <p:strVal val="visible"/>
+                                      </p:to>
+                                    </p:set>
+                                    <p:animEffect transition="in" filter="fade">
+                                      <p:cBhvr>
                                         <p:cTn id="127" dur="500"/>
                                         <p:tgtEl>
-                                          <p:spTgt spid="29"/>
+                                          <p:spTgt spid="17"/>
+                                        </p:tgtEl>
+                                      </p:cBhvr>
+                                    </p:animEffect>
+                                  </p:childTnLst>
+                                </p:cTn>
+                              </p:par>
+                              <p:par>
+                                <p:cTn id="128" presetID="10" presetClass="entr" presetSubtype="0" fill="hold" nodeType="withEffect">
+                                  <p:stCondLst>
+                                    <p:cond delay="0"/>
+                                  </p:stCondLst>
+                                  <p:childTnLst>
+                                    <p:set>
+                                      <p:cBhvr>
+                                        <p:cTn id="129" dur="1" fill="hold">
+                                          <p:stCondLst>
+                                            <p:cond delay="0"/>
+                                          </p:stCondLst>
+                                        </p:cTn>
+                                        <p:tgtEl>
+                                          <p:spTgt spid="18"/>
+                                        </p:tgtEl>
+                                        <p:attrNameLst>
+                                          <p:attrName>style.visibility</p:attrName>
+                                        </p:attrNameLst>
+                                      </p:cBhvr>
+                                      <p:to>
+                                        <p:strVal val="visible"/>
+                                      </p:to>
+                                    </p:set>
+                                    <p:animEffect transition="in" filter="fade">
+                                      <p:cBhvr>
+                                        <p:cTn id="130" dur="500"/>
+                                        <p:tgtEl>
+                                          <p:spTgt spid="18"/>
+                                        </p:tgtEl>
+                                      </p:cBhvr>
+                                    </p:animEffect>
+                                  </p:childTnLst>
+                                </p:cTn>
+                              </p:par>
+                              <p:par>
+                                <p:cTn id="131" presetID="10" presetClass="entr" presetSubtype="0" fill="hold" nodeType="withEffect">
+                                  <p:stCondLst>
+                                    <p:cond delay="0"/>
+                                  </p:stCondLst>
+                                  <p:childTnLst>
+                                    <p:set>
+                                      <p:cBhvr>
+                                        <p:cTn id="132" dur="1" fill="hold">
+                                          <p:stCondLst>
+                                            <p:cond delay="0"/>
+                                          </p:stCondLst>
+                                        </p:cTn>
+                                        <p:tgtEl>
+                                          <p:spTgt spid="19"/>
+                                        </p:tgtEl>
+                                        <p:attrNameLst>
+                                          <p:attrName>style.visibility</p:attrName>
+                                        </p:attrNameLst>
+                                      </p:cBhvr>
+                                      <p:to>
+                                        <p:strVal val="visible"/>
+                                      </p:to>
+                                    </p:set>
+                                    <p:animEffect transition="in" filter="fade">
+                                      <p:cBhvr>
+                                        <p:cTn id="133" dur="500"/>
+                                        <p:tgtEl>
+                                          <p:spTgt spid="19"/>
+                                        </p:tgtEl>
+                                      </p:cBhvr>
+                                    </p:animEffect>
+                                  </p:childTnLst>
+                                </p:cTn>
+                              </p:par>
+                            </p:childTnLst>
+                          </p:cTn>
+                        </p:par>
+                      </p:childTnLst>
+                    </p:cTn>
+                  </p:par>
+                  <p:par>
+                    <p:cTn id="134" fill="hold">
+                      <p:stCondLst>
+                        <p:cond delay="indefinite"/>
+                      </p:stCondLst>
+                      <p:childTnLst>
+                        <p:par>
+                          <p:cTn id="135" fill="hold">
+                            <p:stCondLst>
+                              <p:cond delay="0"/>
+                            </p:stCondLst>
+                            <p:childTnLst>
+                              <p:par>
+                                <p:cTn id="136" presetID="10" presetClass="entr" presetSubtype="0" fill="hold" grpId="0" nodeType="clickEffect">
+                                  <p:stCondLst>
+                                    <p:cond delay="0"/>
+                                  </p:stCondLst>
+                                  <p:childTnLst>
+                                    <p:set>
+                                      <p:cBhvr>
+                                        <p:cTn id="137" dur="1" fill="hold">
+                                          <p:stCondLst>
+                                            <p:cond delay="0"/>
+                                          </p:stCondLst>
+                                        </p:cTn>
+                                        <p:tgtEl>
+                                          <p:spTgt spid="20"/>
+                                        </p:tgtEl>
+                                        <p:attrNameLst>
+                                          <p:attrName>style.visibility</p:attrName>
+                                        </p:attrNameLst>
+                                      </p:cBhvr>
+                                      <p:to>
+                                        <p:strVal val="visible"/>
+                                      </p:to>
+                                    </p:set>
+                                    <p:animEffect transition="in" filter="fade">
+                                      <p:cBhvr>
+                                        <p:cTn id="138" dur="500"/>
+                                        <p:tgtEl>
+                                          <p:spTgt spid="20"/>
                                         </p:tgtEl>
                                       </p:cBhvr>
                                     </p:animEffect>
@@ -10239,9 +10988,10 @@
       <p:bldP spid="47" grpId="0" animBg="1"/>
       <p:bldP spid="50" grpId="0" animBg="1"/>
       <p:bldP spid="59" grpId="0" animBg="1"/>
+      <p:bldP spid="2068" grpId="0" animBg="1"/>
       <p:bldP spid="2048" grpId="0" animBg="1"/>
-      <p:bldP spid="2068" grpId="0" animBg="1"/>
-      <p:bldP spid="2075" grpId="0" animBg="1"/>
+      <p:bldP spid="20" grpId="0" animBg="1"/>
+      <p:bldP spid="17" grpId="0" animBg="1"/>
     </p:bldLst>
   </p:timing>
 </p:sld>
@@ -10299,35 +11049,6 @@
           </a:p>
         </p:txBody>
       </p:sp>
-      <p:pic>
-        <p:nvPicPr>
-          <p:cNvPr id="7" name="Espace réservé du contenu 6">
-            <a:extLst>
-              <a:ext uri="{FF2B5EF4-FFF2-40B4-BE49-F238E27FC236}">
-                <a16:creationId xmlns:a16="http://schemas.microsoft.com/office/drawing/2014/main" id="{32574692-BE79-ECC7-8DA0-96B5EBA29B57}"/>
-              </a:ext>
-            </a:extLst>
-          </p:cNvPr>
-          <p:cNvPicPr>
-            <a:picLocks noGrp="1" noChangeAspect="1"/>
-          </p:cNvPicPr>
-          <p:nvPr>
-            <p:ph idx="1"/>
-          </p:nvPr>
-        </p:nvPicPr>
-        <p:blipFill>
-          <a:blip r:embed="rId2"/>
-          <a:stretch>
-            <a:fillRect/>
-          </a:stretch>
-        </p:blipFill>
-        <p:spPr>
-          <a:xfrm>
-            <a:off x="5899909" y="2272441"/>
-            <a:ext cx="5647470" cy="3469992"/>
-          </a:xfrm>
-        </p:spPr>
-      </p:pic>
       <p:sp>
         <p:nvSpPr>
           <p:cNvPr id="4" name="Espace réservé du pied de page 3">
@@ -10424,7 +11145,7 @@
               <a:buNone/>
               <a:defRPr sz="5400" kern="1200" cap="all" baseline="0">
                 <a:blipFill>
-                  <a:blip r:embed="rId3">
+                  <a:blip r:embed="rId2">
                     <a:extLst>
                       <a:ext uri="{28A0092B-C50C-407E-A947-70E740481C1C}">
                         <a14:useLocalDpi xmlns:a14="http://schemas.microsoft.com/office/drawing/2010/main" val="0"/>
@@ -10493,7 +11214,7 @@
               <a:buNone/>
               <a:defRPr sz="5400" kern="1200" cap="all" baseline="0">
                 <a:blipFill>
-                  <a:blip r:embed="rId3">
+                  <a:blip r:embed="rId2">
                     <a:extLst>
                       <a:ext uri="{28A0092B-C50C-407E-A947-70E740481C1C}">
                         <a14:useLocalDpi xmlns:a14="http://schemas.microsoft.com/office/drawing/2010/main" val="0"/>
@@ -10516,6 +11237,35 @@
           </a:p>
         </p:txBody>
       </p:sp>
+      <p:pic>
+        <p:nvPicPr>
+          <p:cNvPr id="11" name="Espace réservé du contenu 10" descr="Une image contenant texte, capture d’écran, affichage, logiciel&#10;&#10;Description générée automatiquement">
+            <a:extLst>
+              <a:ext uri="{FF2B5EF4-FFF2-40B4-BE49-F238E27FC236}">
+                <a16:creationId xmlns:a16="http://schemas.microsoft.com/office/drawing/2014/main" id="{5054245E-5585-7E12-5D9D-BAC7543C7B63}"/>
+              </a:ext>
+            </a:extLst>
+          </p:cNvPr>
+          <p:cNvPicPr>
+            <a:picLocks noGrp="1" noChangeAspect="1"/>
+          </p:cNvPicPr>
+          <p:nvPr>
+            <p:ph idx="1"/>
+          </p:nvPr>
+        </p:nvPicPr>
+        <p:blipFill>
+          <a:blip r:embed="rId3"/>
+          <a:stretch>
+            <a:fillRect/>
+          </a:stretch>
+        </p:blipFill>
+        <p:spPr>
+          <a:xfrm>
+            <a:off x="5743452" y="2270233"/>
+            <a:ext cx="5659116" cy="3716866"/>
+          </a:xfrm>
+        </p:spPr>
+      </p:pic>
     </p:spTree>
     <p:extLst>
       <p:ext uri="{BB962C8B-B14F-4D97-AF65-F5344CB8AC3E}">
@@ -10562,7 +11312,12 @@
             <p:ph type="title"/>
           </p:nvPr>
         </p:nvSpPr>
-        <p:spPr/>
+        <p:spPr>
+          <a:xfrm>
+            <a:off x="856488" y="0"/>
+            <a:ext cx="10058400" cy="1609344"/>
+          </a:xfrm>
+        </p:spPr>
         <p:txBody>
           <a:bodyPr/>
           <a:lstStyle/>
@@ -10593,16 +11348,166 @@
         </p:nvSpPr>
         <p:spPr/>
         <p:txBody>
-          <a:bodyPr/>
+          <a:bodyPr>
+            <a:normAutofit/>
+          </a:bodyPr>
           <a:lstStyle/>
           <a:p>
             <a:r>
+              <a:rPr lang="fr-CH" u="sng" dirty="0"/>
+              <a:t>GUI</a:t>
+            </a:r>
+            <a:r>
               <a:rPr lang="fr-CH" dirty="0"/>
-              <a:t>The </a:t>
+              <a:t>:</a:t>
+            </a:r>
+          </a:p>
+          <a:p>
+            <a:pPr lvl="1"/>
+            <a:r>
+              <a:rPr lang="fr-CH" sz="2000" u="sng" dirty="0" err="1"/>
+              <a:t>Sliders</a:t>
+            </a:r>
+            <a:r>
+              <a:rPr lang="fr-CH" sz="2000" dirty="0"/>
+              <a:t>: action (</a:t>
+            </a:r>
+            <a:r>
+              <a:rPr lang="fr-CH" sz="2000" dirty="0" err="1"/>
+              <a:t>publish</a:t>
+            </a:r>
+            <a:r>
+              <a:rPr lang="fr-CH" sz="2000" dirty="0"/>
+              <a:t>) at </a:t>
+            </a:r>
+            <a:r>
+              <a:rPr lang="fr-CH" sz="2000" dirty="0" err="1"/>
+              <a:t>each</a:t>
+            </a:r>
+            <a:r>
+              <a:rPr lang="fr-CH" sz="2000" dirty="0"/>
+              <a:t> </a:t>
+            </a:r>
+            <a:r>
+              <a:rPr lang="fr-CH" sz="2000" dirty="0" err="1"/>
+              <a:t>step</a:t>
+            </a:r>
+            <a:r>
+              <a:rPr lang="fr-CH" sz="2000" dirty="0"/>
+              <a:t> </a:t>
+            </a:r>
+            <a:r>
+              <a:rPr lang="fr-CH" sz="2000" dirty="0" err="1"/>
+              <a:t>while</a:t>
+            </a:r>
+            <a:r>
+              <a:rPr lang="fr-CH" sz="2000" dirty="0"/>
+              <a:t> </a:t>
+            </a:r>
+            <a:r>
+              <a:rPr lang="fr-CH" sz="2000" dirty="0" err="1"/>
+              <a:t>we</a:t>
+            </a:r>
+            <a:r>
+              <a:rPr lang="fr-CH" sz="2000" dirty="0"/>
+              <a:t> move </a:t>
+            </a:r>
+            <a:r>
+              <a:rPr lang="fr-CH" sz="2000" dirty="0" err="1"/>
+              <a:t>it</a:t>
+            </a:r>
+            <a:r>
+              <a:rPr lang="fr-CH" sz="2000" dirty="0"/>
+              <a:t> (not </a:t>
+            </a:r>
+            <a:r>
+              <a:rPr lang="fr-CH" sz="2000" dirty="0" err="1"/>
+              <a:t>only</a:t>
+            </a:r>
+            <a:r>
+              <a:rPr lang="fr-CH" sz="2000" dirty="0"/>
+              <a:t> </a:t>
+            </a:r>
+            <a:r>
+              <a:rPr lang="fr-CH" sz="2000" dirty="0" err="1"/>
+              <a:t>when</a:t>
+            </a:r>
+            <a:r>
+              <a:rPr lang="fr-CH" sz="2000" dirty="0"/>
+              <a:t> mouse </a:t>
+            </a:r>
+            <a:r>
+              <a:rPr lang="fr-CH" sz="2000" dirty="0" err="1"/>
+              <a:t>realised</a:t>
+            </a:r>
+            <a:r>
+              <a:rPr lang="fr-CH" sz="2000" dirty="0"/>
+              <a:t>)</a:t>
+            </a:r>
+          </a:p>
+          <a:p>
+            <a:pPr marL="274320" lvl="1" indent="0">
+              <a:buNone/>
+            </a:pPr>
+            <a:r>
+              <a:rPr lang="fr-CH" sz="2000" dirty="0"/>
+              <a:t>	</a:t>
+            </a:r>
+            <a:r>
+              <a:rPr lang="fr-CH" sz="2000" dirty="0">
+                <a:sym typeface="Symbol" panose="05050102010706020507" pitchFamily="18" charset="2"/>
+              </a:rPr>
+              <a:t> </a:t>
+            </a:r>
+            <a:r>
+              <a:rPr lang="fr-CH" sz="2000" dirty="0" err="1"/>
+              <a:t>fixed</a:t>
+            </a:r>
+            <a:r>
+              <a:rPr lang="fr-CH" sz="2000" dirty="0"/>
+              <a:t> on Java but </a:t>
+            </a:r>
+            <a:r>
+              <a:rPr lang="fr-CH" sz="2000" dirty="0" err="1"/>
+              <a:t>seems</a:t>
+            </a:r>
+            <a:r>
+              <a:rPr lang="fr-CH" sz="2000" dirty="0"/>
+              <a:t> impossible on Python</a:t>
+            </a:r>
+          </a:p>
+          <a:p>
+            <a:r>
+              <a:rPr lang="fr-CH" u="sng" dirty="0"/>
+              <a:t>Battery </a:t>
+            </a:r>
+            <a:r>
+              <a:rPr lang="fr-CH" u="sng" dirty="0" err="1"/>
+              <a:t>status</a:t>
+            </a:r>
+            <a:r>
+              <a:rPr lang="fr-CH" dirty="0"/>
+              <a:t>: </a:t>
             </a:r>
             <a:r>
               <a:rPr lang="fr-CH" dirty="0" err="1"/>
-              <a:t>sliders</a:t>
+              <a:t>is</a:t>
+            </a:r>
+            <a:r>
+              <a:rPr lang="fr-CH" dirty="0"/>
+              <a:t> not </a:t>
+            </a:r>
+            <a:r>
+              <a:rPr lang="fr-CH" dirty="0" err="1"/>
+              <a:t>really</a:t>
+            </a:r>
+            <a:r>
+              <a:rPr lang="fr-CH" dirty="0"/>
+              <a:t> reliable (shows 80 </a:t>
+            </a:r>
+            <a:r>
+              <a:rPr lang="fr-CH" dirty="0" err="1"/>
+              <a:t>when</a:t>
             </a:r>
             <a:r>
               <a:rPr lang="fr-CH" dirty="0"/>
@@ -10610,7 +11515,7 @@
             </a:r>
             <a:r>
               <a:rPr lang="fr-CH" dirty="0" err="1"/>
-              <a:t>which</a:t>
+              <a:t>battery</a:t>
             </a:r>
             <a:r>
               <a:rPr lang="fr-CH" dirty="0"/>
@@ -10618,89 +11523,6 @@
             </a:r>
             <a:r>
               <a:rPr lang="fr-CH" dirty="0" err="1"/>
-              <a:t>publish</a:t>
-            </a:r>
-            <a:r>
-              <a:rPr lang="fr-CH" dirty="0"/>
-              <a:t> </a:t>
-            </a:r>
-            <a:r>
-              <a:rPr lang="fr-CH" dirty="0" err="1"/>
-              <a:t>also</a:t>
-            </a:r>
-            <a:r>
-              <a:rPr lang="fr-CH" dirty="0"/>
-              <a:t> </a:t>
-            </a:r>
-            <a:r>
-              <a:rPr lang="fr-CH" dirty="0" err="1"/>
-              <a:t>when</a:t>
-            </a:r>
-            <a:r>
-              <a:rPr lang="fr-CH" dirty="0"/>
-              <a:t> the mouse </a:t>
-            </a:r>
-            <a:r>
-              <a:rPr lang="fr-CH" dirty="0" err="1"/>
-              <a:t>is</a:t>
-            </a:r>
-            <a:r>
-              <a:rPr lang="fr-CH" dirty="0"/>
-              <a:t> not </a:t>
-            </a:r>
-            <a:r>
-              <a:rPr lang="fr-CH" dirty="0" err="1"/>
-              <a:t>released</a:t>
-            </a:r>
-            <a:endParaRPr lang="fr-CH" dirty="0"/>
-          </a:p>
-          <a:p>
-            <a:r>
-              <a:rPr lang="fr-CH" dirty="0"/>
-              <a:t>Battery </a:t>
-            </a:r>
-            <a:r>
-              <a:rPr lang="fr-CH" dirty="0" err="1"/>
-              <a:t>status</a:t>
-            </a:r>
-            <a:r>
-              <a:rPr lang="fr-CH" dirty="0"/>
-              <a:t> </a:t>
-            </a:r>
-            <a:r>
-              <a:rPr lang="fr-CH" dirty="0" err="1"/>
-              <a:t>is</a:t>
-            </a:r>
-            <a:r>
-              <a:rPr lang="fr-CH" dirty="0"/>
-              <a:t> not </a:t>
-            </a:r>
-            <a:r>
-              <a:rPr lang="fr-CH" dirty="0" err="1"/>
-              <a:t>really</a:t>
-            </a:r>
-            <a:r>
-              <a:rPr lang="fr-CH" dirty="0"/>
-              <a:t> reliable (shows 80 </a:t>
-            </a:r>
-            <a:r>
-              <a:rPr lang="fr-CH" dirty="0" err="1"/>
-              <a:t>when</a:t>
-            </a:r>
-            <a:r>
-              <a:rPr lang="fr-CH" dirty="0"/>
-              <a:t> </a:t>
-            </a:r>
-            <a:r>
-              <a:rPr lang="fr-CH" dirty="0" err="1"/>
-              <a:t>battery</a:t>
-            </a:r>
-            <a:r>
-              <a:rPr lang="fr-CH" dirty="0"/>
-              <a:t> </a:t>
-            </a:r>
-            <a:r>
-              <a:rPr lang="fr-CH" dirty="0" err="1"/>
               <a:t>is</a:t>
             </a:r>
             <a:r>
@@ -10715,6 +11537,58 @@
               <a:rPr lang="fr-CH" dirty="0"/>
               <a:t>)</a:t>
             </a:r>
+          </a:p>
+          <a:p>
+            <a:r>
+              <a:rPr lang="fr-CH" u="sng" dirty="0"/>
+              <a:t>Concurrent </a:t>
+            </a:r>
+            <a:r>
+              <a:rPr lang="fr-CH" u="sng" dirty="0" err="1"/>
+              <a:t>programming</a:t>
+            </a:r>
+            <a:r>
+              <a:rPr lang="fr-CH" dirty="0"/>
+              <a:t>: no Java interaction </a:t>
+            </a:r>
+            <a:r>
+              <a:rPr lang="fr-CH" dirty="0" err="1"/>
+              <a:t>with</a:t>
+            </a:r>
+            <a:r>
+              <a:rPr lang="fr-CH" dirty="0"/>
+              <a:t> MQTT emergency topic </a:t>
+            </a:r>
+          </a:p>
+          <a:p>
+            <a:pPr marL="0" indent="0">
+              <a:buNone/>
+            </a:pPr>
+            <a:r>
+              <a:rPr lang="fr-CH" dirty="0">
+                <a:sym typeface="Symbol" panose="05050102010706020507" pitchFamily="18" charset="2"/>
+              </a:rPr>
+              <a:t>	 no </a:t>
+            </a:r>
+            <a:r>
+              <a:rPr lang="fr-CH" dirty="0" err="1">
+                <a:sym typeface="Symbol" panose="05050102010706020507" pitchFamily="18" charset="2"/>
+              </a:rPr>
+              <a:t>external</a:t>
+            </a:r>
+            <a:r>
+              <a:rPr lang="fr-CH" dirty="0">
+                <a:sym typeface="Symbol" panose="05050102010706020507" pitchFamily="18" charset="2"/>
+              </a:rPr>
+              <a:t> emergency activation </a:t>
+            </a:r>
+            <a:r>
+              <a:rPr lang="fr-CH" dirty="0" err="1">
+                <a:sym typeface="Symbol" panose="05050102010706020507" pitchFamily="18" charset="2"/>
+              </a:rPr>
+              <a:t>detected</a:t>
+            </a:r>
+            <a:endParaRPr lang="fr-CH" dirty="0"/>
           </a:p>
         </p:txBody>
       </p:sp>
@@ -10780,215 +11654,6 @@
     <p:extLst>
       <p:ext uri="{BB962C8B-B14F-4D97-AF65-F5344CB8AC3E}">
         <p14:creationId xmlns:p14="http://schemas.microsoft.com/office/powerpoint/2010/main" val="4187522676"/>
-      </p:ext>
-    </p:extLst>
-  </p:cSld>
-  <p:clrMapOvr>
-    <a:masterClrMapping/>
-  </p:clrMapOvr>
-</p:sld>
-</file>
-
-<file path=ppt/slides/slide7.xml><?xml version="1.0" encoding="utf-8"?>
-<p:sld xmlns:a="http://schemas.openxmlformats.org/drawingml/2006/main" xmlns:r="http://schemas.openxmlformats.org/officeDocument/2006/relationships" xmlns:p="http://schemas.openxmlformats.org/presentationml/2006/main">
-  <p:cSld>
-    <p:spTree>
-      <p:nvGrpSpPr>
-        <p:cNvPr id="1" name=""/>
-        <p:cNvGrpSpPr/>
-        <p:nvPr/>
-      </p:nvGrpSpPr>
-      <p:grpSpPr>
-        <a:xfrm>
-          <a:off x="0" y="0"/>
-          <a:ext cx="0" cy="0"/>
-          <a:chOff x="0" y="0"/>
-          <a:chExt cx="0" cy="0"/>
-        </a:xfrm>
-      </p:grpSpPr>
-      <p:sp>
-        <p:nvSpPr>
-          <p:cNvPr id="2" name="Titre 1">
-            <a:extLst>
-              <a:ext uri="{FF2B5EF4-FFF2-40B4-BE49-F238E27FC236}">
-                <a16:creationId xmlns:a16="http://schemas.microsoft.com/office/drawing/2014/main" id="{FADBA2A3-090B-635B-DC2D-059D3E2363EB}"/>
-              </a:ext>
-            </a:extLst>
-          </p:cNvPr>
-          <p:cNvSpPr>
-            <a:spLocks noGrp="1"/>
-          </p:cNvSpPr>
-          <p:nvPr>
-            <p:ph type="title"/>
-          </p:nvPr>
-        </p:nvSpPr>
-        <p:spPr/>
-        <p:txBody>
-          <a:bodyPr/>
-          <a:lstStyle/>
-          <a:p>
-            <a:r>
-              <a:rPr lang="fr-CH" dirty="0" err="1"/>
-              <a:t>Could</a:t>
-            </a:r>
-            <a:r>
-              <a:rPr lang="fr-CH" dirty="0"/>
-              <a:t> </a:t>
-            </a:r>
-            <a:r>
-              <a:rPr lang="fr-CH" dirty="0" err="1"/>
-              <a:t>be</a:t>
-            </a:r>
-            <a:r>
-              <a:rPr lang="fr-CH" dirty="0"/>
-              <a:t> </a:t>
-            </a:r>
-            <a:r>
-              <a:rPr lang="fr-CH" dirty="0" err="1"/>
-              <a:t>added</a:t>
-            </a:r>
-            <a:endParaRPr lang="fr-CH" dirty="0"/>
-          </a:p>
-        </p:txBody>
-      </p:sp>
-      <p:sp>
-        <p:nvSpPr>
-          <p:cNvPr id="3" name="Espace réservé du contenu 2">
-            <a:extLst>
-              <a:ext uri="{FF2B5EF4-FFF2-40B4-BE49-F238E27FC236}">
-                <a16:creationId xmlns:a16="http://schemas.microsoft.com/office/drawing/2014/main" id="{27250027-A24D-DBEE-6950-BE4B1917ABA8}"/>
-              </a:ext>
-            </a:extLst>
-          </p:cNvPr>
-          <p:cNvSpPr>
-            <a:spLocks noGrp="1"/>
-          </p:cNvSpPr>
-          <p:nvPr>
-            <p:ph idx="1"/>
-          </p:nvPr>
-        </p:nvSpPr>
-        <p:spPr/>
-        <p:txBody>
-          <a:bodyPr/>
-          <a:lstStyle/>
-          <a:p>
-            <a:r>
-              <a:rPr lang="fr-CH" dirty="0"/>
-              <a:t>A </a:t>
-            </a:r>
-            <a:r>
-              <a:rPr lang="fr-CH" dirty="0" err="1"/>
-              <a:t>listener</a:t>
-            </a:r>
-            <a:r>
-              <a:rPr lang="fr-CH" dirty="0"/>
-              <a:t> on the Java </a:t>
-            </a:r>
-            <a:r>
-              <a:rPr lang="fr-CH" dirty="0" err="1"/>
-              <a:t>implementation</a:t>
-            </a:r>
-            <a:r>
-              <a:rPr lang="fr-CH" dirty="0"/>
-              <a:t> to a «emergency» topic to </a:t>
-            </a:r>
-            <a:r>
-              <a:rPr lang="fr-CH" dirty="0" err="1"/>
-              <a:t>be</a:t>
-            </a:r>
-            <a:r>
-              <a:rPr lang="fr-CH" dirty="0"/>
-              <a:t> </a:t>
-            </a:r>
-            <a:r>
-              <a:rPr lang="fr-CH" dirty="0" err="1"/>
-              <a:t>informed</a:t>
-            </a:r>
-            <a:r>
-              <a:rPr lang="fr-CH" dirty="0"/>
-              <a:t> if </a:t>
-            </a:r>
-            <a:r>
-              <a:rPr lang="fr-CH" dirty="0" err="1"/>
-              <a:t>another</a:t>
-            </a:r>
-            <a:r>
-              <a:rPr lang="fr-CH" dirty="0"/>
-              <a:t> user </a:t>
-            </a:r>
-            <a:r>
-              <a:rPr lang="fr-CH" dirty="0" err="1"/>
-              <a:t>activates</a:t>
-            </a:r>
-            <a:r>
-              <a:rPr lang="fr-CH" dirty="0"/>
-              <a:t> emergency.</a:t>
-            </a:r>
-          </a:p>
-        </p:txBody>
-      </p:sp>
-      <p:sp>
-        <p:nvSpPr>
-          <p:cNvPr id="4" name="Espace réservé du pied de page 3">
-            <a:extLst>
-              <a:ext uri="{FF2B5EF4-FFF2-40B4-BE49-F238E27FC236}">
-                <a16:creationId xmlns:a16="http://schemas.microsoft.com/office/drawing/2014/main" id="{7E5CDD4D-A5E4-21BC-BD4F-A9F9AD4F5F20}"/>
-              </a:ext>
-            </a:extLst>
-          </p:cNvPr>
-          <p:cNvSpPr>
-            <a:spLocks noGrp="1"/>
-          </p:cNvSpPr>
-          <p:nvPr>
-            <p:ph type="ftr" sz="quarter" idx="11"/>
-          </p:nvPr>
-        </p:nvSpPr>
-        <p:spPr/>
-        <p:txBody>
-          <a:bodyPr/>
-          <a:lstStyle/>
-          <a:p>
-            <a:r>
-              <a:rPr lang="en-US"/>
-              <a:t>Hyperdrive project 2023 - Group D</a:t>
-            </a:r>
-            <a:endParaRPr lang="en-US" dirty="0"/>
-          </a:p>
-        </p:txBody>
-      </p:sp>
-      <p:sp>
-        <p:nvSpPr>
-          <p:cNvPr id="5" name="Espace réservé du numéro de diapositive 4">
-            <a:extLst>
-              <a:ext uri="{FF2B5EF4-FFF2-40B4-BE49-F238E27FC236}">
-                <a16:creationId xmlns:a16="http://schemas.microsoft.com/office/drawing/2014/main" id="{D5E89578-FB80-E548-F34E-62C58B7F5988}"/>
-              </a:ext>
-            </a:extLst>
-          </p:cNvPr>
-          <p:cNvSpPr>
-            <a:spLocks noGrp="1"/>
-          </p:cNvSpPr>
-          <p:nvPr>
-            <p:ph type="sldNum" sz="quarter" idx="12"/>
-          </p:nvPr>
-        </p:nvSpPr>
-        <p:spPr/>
-        <p:txBody>
-          <a:bodyPr/>
-          <a:lstStyle/>
-          <a:p>
-            <a:fld id="{6D22F896-40B5-4ADD-8801-0D06FADFA095}" type="slidenum">
-              <a:rPr lang="en-US" smtClean="0"/>
-              <a:t>7</a:t>
-            </a:fld>
-            <a:endParaRPr lang="en-US" dirty="0"/>
-          </a:p>
-        </p:txBody>
-      </p:sp>
-    </p:spTree>
-    <p:extLst>
-      <p:ext uri="{BB962C8B-B14F-4D97-AF65-F5344CB8AC3E}">
-        <p14:creationId xmlns:p14="http://schemas.microsoft.com/office/powerpoint/2010/main" val="434340359"/>
       </p:ext>
     </p:extLst>
   </p:cSld>

</xml_diff>

<commit_message>
Complete PowerPoint with overview schema + python GUI image
</commit_message>
<xml_diff>
--- a/Hyperdrive Project - Presentation.pptx
+++ b/Hyperdrive Project - Presentation.pptx
@@ -5,15 +5,16 @@
     <p:sldMasterId id="2147483660" r:id="rId1"/>
   </p:sldMasterIdLst>
   <p:notesMasterIdLst>
-    <p:notesMasterId r:id="rId8"/>
+    <p:notesMasterId r:id="rId9"/>
   </p:notesMasterIdLst>
   <p:sldIdLst>
     <p:sldId id="256" r:id="rId2"/>
     <p:sldId id="257" r:id="rId3"/>
-    <p:sldId id="260" r:id="rId4"/>
-    <p:sldId id="262" r:id="rId5"/>
-    <p:sldId id="259" r:id="rId6"/>
-    <p:sldId id="261" r:id="rId7"/>
+    <p:sldId id="263" r:id="rId4"/>
+    <p:sldId id="260" r:id="rId5"/>
+    <p:sldId id="262" r:id="rId6"/>
+    <p:sldId id="259" r:id="rId7"/>
+    <p:sldId id="261" r:id="rId8"/>
   </p:sldIdLst>
   <p:sldSz cx="12192000" cy="6858000"/>
   <p:notesSz cx="6858000" cy="9144000"/>
@@ -123,10 +124,365 @@
 <file path=ppt/revisionInfo.xml><?xml version="1.0" encoding="utf-8"?>
 <p1510:revInfo xmlns:a="http://schemas.openxmlformats.org/drawingml/2006/main" xmlns:r="http://schemas.openxmlformats.org/officeDocument/2006/relationships" xmlns:p1510="http://schemas.microsoft.com/office/powerpoint/2015/10/main">
   <p1510:revLst>
+    <p1510:client id="{38B5E84A-0765-4FC9-B808-886DFAA9DD9B}" v="24" dt="2023-12-18T22:01:23.959"/>
     <p1510:client id="{A31E354D-2F64-44AE-9584-233072750931}" v="42" dt="2023-12-18T12:24:28.862"/>
     <p1510:client id="{AEC6D4B4-88A1-4199-AA04-3D7D6F24A006}" v="342" dt="2023-12-18T20:59:06.768"/>
   </p1510:revLst>
 </p1510:revInfo>
+</file>
+
+<file path=ppt/changesInfos/changesInfo1.xml><?xml version="1.0" encoding="utf-8"?>
+<pc:chgInfo xmlns:a="http://schemas.openxmlformats.org/drawingml/2006/main" xmlns:r="http://schemas.openxmlformats.org/officeDocument/2006/relationships" xmlns:ac="http://schemas.microsoft.com/office/drawing/2013/main/command" xmlns:pc="http://schemas.microsoft.com/office/powerpoint/2013/main/command">
+  <pc:docChgLst>
+    <pc:chgData name="OPPLIGER Severine" userId="bbff5e40-effe-447c-9c8a-b2d02ae784db" providerId="ADAL" clId="{38B5E84A-0765-4FC9-B808-886DFAA9DD9B}"/>
+    <pc:docChg chg="custSel addSld modSld">
+      <pc:chgData name="OPPLIGER Severine" userId="bbff5e40-effe-447c-9c8a-b2d02ae784db" providerId="ADAL" clId="{38B5E84A-0765-4FC9-B808-886DFAA9DD9B}" dt="2023-12-18T22:03:22.808" v="190" actId="1076"/>
+      <pc:docMkLst>
+        <pc:docMk/>
+      </pc:docMkLst>
+      <pc:sldChg chg="modSp mod">
+        <pc:chgData name="OPPLIGER Severine" userId="bbff5e40-effe-447c-9c8a-b2d02ae784db" providerId="ADAL" clId="{38B5E84A-0765-4FC9-B808-886DFAA9DD9B}" dt="2023-12-18T22:03:22.808" v="190" actId="1076"/>
+        <pc:sldMkLst>
+          <pc:docMk/>
+          <pc:sldMk cId="217377641" sldId="257"/>
+        </pc:sldMkLst>
+        <pc:spChg chg="mod">
+          <ac:chgData name="OPPLIGER Severine" userId="bbff5e40-effe-447c-9c8a-b2d02ae784db" providerId="ADAL" clId="{38B5E84A-0765-4FC9-B808-886DFAA9DD9B}" dt="2023-12-18T22:03:22.808" v="190" actId="1076"/>
+          <ac:spMkLst>
+            <pc:docMk/>
+            <pc:sldMk cId="217377641" sldId="257"/>
+            <ac:spMk id="2" creationId="{2016D198-E88E-165E-BA7A-8E7FC3EABB79}"/>
+          </ac:spMkLst>
+        </pc:spChg>
+      </pc:sldChg>
+      <pc:sldChg chg="addSp delSp modSp mod modAnim">
+        <pc:chgData name="OPPLIGER Severine" userId="bbff5e40-effe-447c-9c8a-b2d02ae784db" providerId="ADAL" clId="{38B5E84A-0765-4FC9-B808-886DFAA9DD9B}" dt="2023-12-18T21:37:32.877" v="34" actId="1076"/>
+        <pc:sldMkLst>
+          <pc:docMk/>
+          <pc:sldMk cId="3120141481" sldId="259"/>
+        </pc:sldMkLst>
+        <pc:spChg chg="add mod">
+          <ac:chgData name="OPPLIGER Severine" userId="bbff5e40-effe-447c-9c8a-b2d02ae784db" providerId="ADAL" clId="{38B5E84A-0765-4FC9-B808-886DFAA9DD9B}" dt="2023-12-18T21:37:32.877" v="34" actId="1076"/>
+          <ac:spMkLst>
+            <pc:docMk/>
+            <pc:sldMk cId="3120141481" sldId="259"/>
+            <ac:spMk id="11" creationId="{94C13DC0-B844-52A0-93C2-331AD5B8590F}"/>
+          </ac:spMkLst>
+        </pc:spChg>
+        <pc:spChg chg="del">
+          <ac:chgData name="OPPLIGER Severine" userId="bbff5e40-effe-447c-9c8a-b2d02ae784db" providerId="ADAL" clId="{38B5E84A-0765-4FC9-B808-886DFAA9DD9B}" dt="2023-12-18T21:35:58.949" v="19" actId="478"/>
+          <ac:spMkLst>
+            <pc:docMk/>
+            <pc:sldMk cId="3120141481" sldId="259"/>
+            <ac:spMk id="12" creationId="{3B18238C-0DBD-7A4A-1645-CCFEBF9DE7EA}"/>
+          </ac:spMkLst>
+        </pc:spChg>
+        <pc:spChg chg="del mod">
+          <ac:chgData name="OPPLIGER Severine" userId="bbff5e40-effe-447c-9c8a-b2d02ae784db" providerId="ADAL" clId="{38B5E84A-0765-4FC9-B808-886DFAA9DD9B}" dt="2023-12-18T21:36:18.077" v="24" actId="478"/>
+          <ac:spMkLst>
+            <pc:docMk/>
+            <pc:sldMk cId="3120141481" sldId="259"/>
+            <ac:spMk id="13" creationId="{292E8436-2E55-23C5-0587-BEDB26D0D5EB}"/>
+          </ac:spMkLst>
+        </pc:spChg>
+        <pc:spChg chg="add mod">
+          <ac:chgData name="OPPLIGER Severine" userId="bbff5e40-effe-447c-9c8a-b2d02ae784db" providerId="ADAL" clId="{38B5E84A-0765-4FC9-B808-886DFAA9DD9B}" dt="2023-12-18T21:36:22.335" v="25" actId="1076"/>
+          <ac:spMkLst>
+            <pc:docMk/>
+            <pc:sldMk cId="3120141481" sldId="259"/>
+            <ac:spMk id="15" creationId="{E03209A1-9280-78DB-EF5B-5941AB5BE03B}"/>
+          </ac:spMkLst>
+        </pc:spChg>
+        <pc:spChg chg="del">
+          <ac:chgData name="OPPLIGER Severine" userId="bbff5e40-effe-447c-9c8a-b2d02ae784db" providerId="ADAL" clId="{38B5E84A-0765-4FC9-B808-886DFAA9DD9B}" dt="2023-12-18T21:36:02.438" v="20" actId="478"/>
+          <ac:spMkLst>
+            <pc:docMk/>
+            <pc:sldMk cId="3120141481" sldId="259"/>
+            <ac:spMk id="32" creationId="{76502CCF-B178-CE0B-3479-BEDC9C3D9CC5}"/>
+          </ac:spMkLst>
+        </pc:spChg>
+        <pc:picChg chg="add mod ord">
+          <ac:chgData name="OPPLIGER Severine" userId="bbff5e40-effe-447c-9c8a-b2d02ae784db" providerId="ADAL" clId="{38B5E84A-0765-4FC9-B808-886DFAA9DD9B}" dt="2023-12-18T21:36:43.595" v="28" actId="167"/>
+          <ac:picMkLst>
+            <pc:docMk/>
+            <pc:sldMk cId="3120141481" sldId="259"/>
+            <ac:picMk id="16" creationId="{2D30F1AD-B2FC-8B5F-78E3-E28F43C57C27}"/>
+          </ac:picMkLst>
+        </pc:picChg>
+        <pc:picChg chg="add mod ord">
+          <ac:chgData name="OPPLIGER Severine" userId="bbff5e40-effe-447c-9c8a-b2d02ae784db" providerId="ADAL" clId="{38B5E84A-0765-4FC9-B808-886DFAA9DD9B}" dt="2023-12-18T21:37:24.636" v="33" actId="1076"/>
+          <ac:picMkLst>
+            <pc:docMk/>
+            <pc:sldMk cId="3120141481" sldId="259"/>
+            <ac:picMk id="21" creationId="{B98CC158-633F-525B-0557-F83256378929}"/>
+          </ac:picMkLst>
+        </pc:picChg>
+      </pc:sldChg>
+      <pc:sldChg chg="addSp modSp mod">
+        <pc:chgData name="OPPLIGER Severine" userId="bbff5e40-effe-447c-9c8a-b2d02ae784db" providerId="ADAL" clId="{38B5E84A-0765-4FC9-B808-886DFAA9DD9B}" dt="2023-12-18T22:02:37.212" v="186" actId="1076"/>
+        <pc:sldMkLst>
+          <pc:docMk/>
+          <pc:sldMk cId="713088759" sldId="260"/>
+        </pc:sldMkLst>
+        <pc:spChg chg="mod">
+          <ac:chgData name="OPPLIGER Severine" userId="bbff5e40-effe-447c-9c8a-b2d02ae784db" providerId="ADAL" clId="{38B5E84A-0765-4FC9-B808-886DFAA9DD9B}" dt="2023-12-18T22:01:36.745" v="172" actId="1076"/>
+          <ac:spMkLst>
+            <pc:docMk/>
+            <pc:sldMk cId="713088759" sldId="260"/>
+            <ac:spMk id="2" creationId="{71889CED-957C-DE18-0996-5264CD0284F0}"/>
+          </ac:spMkLst>
+        </pc:spChg>
+        <pc:spChg chg="mod">
+          <ac:chgData name="OPPLIGER Severine" userId="bbff5e40-effe-447c-9c8a-b2d02ae784db" providerId="ADAL" clId="{38B5E84A-0765-4FC9-B808-886DFAA9DD9B}" dt="2023-12-18T22:02:08.480" v="180" actId="14100"/>
+          <ac:spMkLst>
+            <pc:docMk/>
+            <pc:sldMk cId="713088759" sldId="260"/>
+            <ac:spMk id="8" creationId="{2434B391-7495-CA90-A8D6-677ADB0FE6DE}"/>
+          </ac:spMkLst>
+        </pc:spChg>
+        <pc:spChg chg="mod">
+          <ac:chgData name="OPPLIGER Severine" userId="bbff5e40-effe-447c-9c8a-b2d02ae784db" providerId="ADAL" clId="{38B5E84A-0765-4FC9-B808-886DFAA9DD9B}" dt="2023-12-18T22:02:37.212" v="186" actId="1076"/>
+          <ac:spMkLst>
+            <pc:docMk/>
+            <pc:sldMk cId="713088759" sldId="260"/>
+            <ac:spMk id="9" creationId="{EE30545B-AE53-1CA7-DE2B-DBCD4633A904}"/>
+          </ac:spMkLst>
+        </pc:spChg>
+        <pc:picChg chg="add mod">
+          <ac:chgData name="OPPLIGER Severine" userId="bbff5e40-effe-447c-9c8a-b2d02ae784db" providerId="ADAL" clId="{38B5E84A-0765-4FC9-B808-886DFAA9DD9B}" dt="2023-12-18T22:01:56.308" v="177" actId="14100"/>
+          <ac:picMkLst>
+            <pc:docMk/>
+            <pc:sldMk cId="713088759" sldId="260"/>
+            <ac:picMk id="6" creationId="{D090D852-1A54-78C9-8348-7A54800DD64C}"/>
+          </ac:picMkLst>
+        </pc:picChg>
+        <pc:picChg chg="mod">
+          <ac:chgData name="OPPLIGER Severine" userId="bbff5e40-effe-447c-9c8a-b2d02ae784db" providerId="ADAL" clId="{38B5E84A-0765-4FC9-B808-886DFAA9DD9B}" dt="2023-12-18T22:02:18.813" v="182" actId="1076"/>
+          <ac:picMkLst>
+            <pc:docMk/>
+            <pc:sldMk cId="713088759" sldId="260"/>
+            <ac:picMk id="11" creationId="{5054245E-5585-7E12-5D9D-BAC7543C7B63}"/>
+          </ac:picMkLst>
+        </pc:picChg>
+      </pc:sldChg>
+      <pc:sldChg chg="addSp delSp modSp new mod delAnim modAnim">
+        <pc:chgData name="OPPLIGER Severine" userId="bbff5e40-effe-447c-9c8a-b2d02ae784db" providerId="ADAL" clId="{38B5E84A-0765-4FC9-B808-886DFAA9DD9B}" dt="2023-12-18T22:03:13.284" v="189" actId="1076"/>
+        <pc:sldMkLst>
+          <pc:docMk/>
+          <pc:sldMk cId="488630872" sldId="263"/>
+        </pc:sldMkLst>
+        <pc:spChg chg="mod">
+          <ac:chgData name="OPPLIGER Severine" userId="bbff5e40-effe-447c-9c8a-b2d02ae784db" providerId="ADAL" clId="{38B5E84A-0765-4FC9-B808-886DFAA9DD9B}" dt="2023-12-18T22:03:13.284" v="189" actId="1076"/>
+          <ac:spMkLst>
+            <pc:docMk/>
+            <pc:sldMk cId="488630872" sldId="263"/>
+            <ac:spMk id="2" creationId="{52FF9B09-9774-AD79-F4AD-DCB530488F35}"/>
+          </ac:spMkLst>
+        </pc:spChg>
+        <pc:spChg chg="del">
+          <ac:chgData name="OPPLIGER Severine" userId="bbff5e40-effe-447c-9c8a-b2d02ae784db" providerId="ADAL" clId="{38B5E84A-0765-4FC9-B808-886DFAA9DD9B}" dt="2023-12-18T21:38:12.788" v="35" actId="478"/>
+          <ac:spMkLst>
+            <pc:docMk/>
+            <pc:sldMk cId="488630872" sldId="263"/>
+            <ac:spMk id="3" creationId="{1AB5D36D-3352-CE57-26E1-A7EF88AEAACF}"/>
+          </ac:spMkLst>
+        </pc:spChg>
+        <pc:spChg chg="add del mod">
+          <ac:chgData name="OPPLIGER Severine" userId="bbff5e40-effe-447c-9c8a-b2d02ae784db" providerId="ADAL" clId="{38B5E84A-0765-4FC9-B808-886DFAA9DD9B}" dt="2023-12-18T21:56:48.118" v="117" actId="478"/>
+          <ac:spMkLst>
+            <pc:docMk/>
+            <pc:sldMk cId="488630872" sldId="263"/>
+            <ac:spMk id="8" creationId="{0F0FF756-0454-72C4-DF24-39E308F3CEC2}"/>
+          </ac:spMkLst>
+        </pc:spChg>
+        <pc:spChg chg="add mod">
+          <ac:chgData name="OPPLIGER Severine" userId="bbff5e40-effe-447c-9c8a-b2d02ae784db" providerId="ADAL" clId="{38B5E84A-0765-4FC9-B808-886DFAA9DD9B}" dt="2023-12-18T21:46:47.350" v="74" actId="14100"/>
+          <ac:spMkLst>
+            <pc:docMk/>
+            <pc:sldMk cId="488630872" sldId="263"/>
+            <ac:spMk id="10" creationId="{C2F6DDB7-528B-C771-EF29-BB9B6CE87FD7}"/>
+          </ac:spMkLst>
+        </pc:spChg>
+        <pc:spChg chg="add mod">
+          <ac:chgData name="OPPLIGER Severine" userId="bbff5e40-effe-447c-9c8a-b2d02ae784db" providerId="ADAL" clId="{38B5E84A-0765-4FC9-B808-886DFAA9DD9B}" dt="2023-12-18T21:46:12.249" v="67" actId="1076"/>
+          <ac:spMkLst>
+            <pc:docMk/>
+            <pc:sldMk cId="488630872" sldId="263"/>
+            <ac:spMk id="16" creationId="{22C57F44-630C-C5CC-A0E9-AD3B4D4AA5E6}"/>
+          </ac:spMkLst>
+        </pc:spChg>
+        <pc:spChg chg="add mod">
+          <ac:chgData name="OPPLIGER Severine" userId="bbff5e40-effe-447c-9c8a-b2d02ae784db" providerId="ADAL" clId="{38B5E84A-0765-4FC9-B808-886DFAA9DD9B}" dt="2023-12-18T21:46:12.249" v="67" actId="1076"/>
+          <ac:spMkLst>
+            <pc:docMk/>
+            <pc:sldMk cId="488630872" sldId="263"/>
+            <ac:spMk id="17" creationId="{846C6A01-CA8A-4841-FAD2-421060D27219}"/>
+          </ac:spMkLst>
+        </pc:spChg>
+        <pc:spChg chg="add mod">
+          <ac:chgData name="OPPLIGER Severine" userId="bbff5e40-effe-447c-9c8a-b2d02ae784db" providerId="ADAL" clId="{38B5E84A-0765-4FC9-B808-886DFAA9DD9B}" dt="2023-12-18T21:46:17.513" v="68" actId="1076"/>
+          <ac:spMkLst>
+            <pc:docMk/>
+            <pc:sldMk cId="488630872" sldId="263"/>
+            <ac:spMk id="18" creationId="{6CAD756A-E358-2A7E-276F-56CEEB1E453E}"/>
+          </ac:spMkLst>
+        </pc:spChg>
+        <pc:spChg chg="add del mod">
+          <ac:chgData name="OPPLIGER Severine" userId="bbff5e40-effe-447c-9c8a-b2d02ae784db" providerId="ADAL" clId="{38B5E84A-0765-4FC9-B808-886DFAA9DD9B}" dt="2023-12-18T21:54:49.601" v="89" actId="478"/>
+          <ac:spMkLst>
+            <pc:docMk/>
+            <pc:sldMk cId="488630872" sldId="263"/>
+            <ac:spMk id="25" creationId="{B58F5E2A-9FD5-459F-DED2-C4FBDD5F41CB}"/>
+          </ac:spMkLst>
+        </pc:spChg>
+        <pc:spChg chg="add mod">
+          <ac:chgData name="OPPLIGER Severine" userId="bbff5e40-effe-447c-9c8a-b2d02ae784db" providerId="ADAL" clId="{38B5E84A-0765-4FC9-B808-886DFAA9DD9B}" dt="2023-12-18T21:56:02.810" v="108" actId="14100"/>
+          <ac:spMkLst>
+            <pc:docMk/>
+            <pc:sldMk cId="488630872" sldId="263"/>
+            <ac:spMk id="26" creationId="{DE64E025-9BB9-7EC3-AB8B-324BC0A96352}"/>
+          </ac:spMkLst>
+        </pc:spChg>
+        <pc:spChg chg="add mod">
+          <ac:chgData name="OPPLIGER Severine" userId="bbff5e40-effe-447c-9c8a-b2d02ae784db" providerId="ADAL" clId="{38B5E84A-0765-4FC9-B808-886DFAA9DD9B}" dt="2023-12-18T21:56:31.193" v="112" actId="1076"/>
+          <ac:spMkLst>
+            <pc:docMk/>
+            <pc:sldMk cId="488630872" sldId="263"/>
+            <ac:spMk id="27" creationId="{10921A93-EAEC-362F-BC08-4515403A20F9}"/>
+          </ac:spMkLst>
+        </pc:spChg>
+        <pc:spChg chg="add mod">
+          <ac:chgData name="OPPLIGER Severine" userId="bbff5e40-effe-447c-9c8a-b2d02ae784db" providerId="ADAL" clId="{38B5E84A-0765-4FC9-B808-886DFAA9DD9B}" dt="2023-12-18T21:56:37.226" v="113" actId="1076"/>
+          <ac:spMkLst>
+            <pc:docMk/>
+            <pc:sldMk cId="488630872" sldId="263"/>
+            <ac:spMk id="28" creationId="{0A3CAD15-C647-0F00-BFC1-E434342A74FA}"/>
+          </ac:spMkLst>
+        </pc:spChg>
+        <pc:spChg chg="add mod">
+          <ac:chgData name="OPPLIGER Severine" userId="bbff5e40-effe-447c-9c8a-b2d02ae784db" providerId="ADAL" clId="{38B5E84A-0765-4FC9-B808-886DFAA9DD9B}" dt="2023-12-18T21:58:01.634" v="138" actId="20577"/>
+          <ac:spMkLst>
+            <pc:docMk/>
+            <pc:sldMk cId="488630872" sldId="263"/>
+            <ac:spMk id="29" creationId="{E02DEC4D-357B-32D7-2F87-55D7F036EE16}"/>
+          </ac:spMkLst>
+        </pc:spChg>
+        <pc:spChg chg="add mod">
+          <ac:chgData name="OPPLIGER Severine" userId="bbff5e40-effe-447c-9c8a-b2d02ae784db" providerId="ADAL" clId="{38B5E84A-0765-4FC9-B808-886DFAA9DD9B}" dt="2023-12-18T21:58:56.044" v="166" actId="1076"/>
+          <ac:spMkLst>
+            <pc:docMk/>
+            <pc:sldMk cId="488630872" sldId="263"/>
+            <ac:spMk id="30" creationId="{562BBF8F-4FA3-5345-1865-4CB7961B9813}"/>
+          </ac:spMkLst>
+        </pc:spChg>
+        <pc:spChg chg="add mod">
+          <ac:chgData name="OPPLIGER Severine" userId="bbff5e40-effe-447c-9c8a-b2d02ae784db" providerId="ADAL" clId="{38B5E84A-0765-4FC9-B808-886DFAA9DD9B}" dt="2023-12-18T21:58:31.654" v="165" actId="20577"/>
+          <ac:spMkLst>
+            <pc:docMk/>
+            <pc:sldMk cId="488630872" sldId="263"/>
+            <ac:spMk id="31" creationId="{0822DE42-039A-17E2-E651-0AFCCD20A0E5}"/>
+          </ac:spMkLst>
+        </pc:spChg>
+        <pc:picChg chg="add mod">
+          <ac:chgData name="OPPLIGER Severine" userId="bbff5e40-effe-447c-9c8a-b2d02ae784db" providerId="ADAL" clId="{38B5E84A-0765-4FC9-B808-886DFAA9DD9B}" dt="2023-12-18T21:56:41.871" v="115" actId="14100"/>
+          <ac:picMkLst>
+            <pc:docMk/>
+            <pc:sldMk cId="488630872" sldId="263"/>
+            <ac:picMk id="6" creationId="{2B6A0708-AE18-D239-7F2A-C5CCC01CEF45}"/>
+          </ac:picMkLst>
+        </pc:picChg>
+        <pc:picChg chg="add mod ord">
+          <ac:chgData name="OPPLIGER Severine" userId="bbff5e40-effe-447c-9c8a-b2d02ae784db" providerId="ADAL" clId="{38B5E84A-0765-4FC9-B808-886DFAA9DD9B}" dt="2023-12-18T21:57:25.380" v="121" actId="2085"/>
+          <ac:picMkLst>
+            <pc:docMk/>
+            <pc:sldMk cId="488630872" sldId="263"/>
+            <ac:picMk id="7" creationId="{D93C8E67-93A0-D1AC-1D1A-E384445632F5}"/>
+          </ac:picMkLst>
+        </pc:picChg>
+        <pc:picChg chg="add mod">
+          <ac:chgData name="OPPLIGER Severine" userId="bbff5e40-effe-447c-9c8a-b2d02ae784db" providerId="ADAL" clId="{38B5E84A-0765-4FC9-B808-886DFAA9DD9B}" dt="2023-12-18T21:56:44.466" v="116" actId="14100"/>
+          <ac:picMkLst>
+            <pc:docMk/>
+            <pc:sldMk cId="488630872" sldId="263"/>
+            <ac:picMk id="9" creationId="{C3ABCD60-1F42-4E4E-529B-3C6485243B2D}"/>
+          </ac:picMkLst>
+        </pc:picChg>
+        <pc:picChg chg="add mod">
+          <ac:chgData name="OPPLIGER Severine" userId="bbff5e40-effe-447c-9c8a-b2d02ae784db" providerId="ADAL" clId="{38B5E84A-0765-4FC9-B808-886DFAA9DD9B}" dt="2023-12-18T21:57:01.497" v="119" actId="207"/>
+          <ac:picMkLst>
+            <pc:docMk/>
+            <pc:sldMk cId="488630872" sldId="263"/>
+            <ac:picMk id="12" creationId="{AE0D2066-454F-8428-8768-1B86436EC811}"/>
+          </ac:picMkLst>
+        </pc:picChg>
+        <pc:picChg chg="add mod">
+          <ac:chgData name="OPPLIGER Severine" userId="bbff5e40-effe-447c-9c8a-b2d02ae784db" providerId="ADAL" clId="{38B5E84A-0765-4FC9-B808-886DFAA9DD9B}" dt="2023-12-18T21:46:00.975" v="66" actId="1076"/>
+          <ac:picMkLst>
+            <pc:docMk/>
+            <pc:sldMk cId="488630872" sldId="263"/>
+            <ac:picMk id="13" creationId="{AA689DAD-B405-8294-B4F0-0E3338E109D8}"/>
+          </ac:picMkLst>
+        </pc:picChg>
+        <pc:picChg chg="add mod">
+          <ac:chgData name="OPPLIGER Severine" userId="bbff5e40-effe-447c-9c8a-b2d02ae784db" providerId="ADAL" clId="{38B5E84A-0765-4FC9-B808-886DFAA9DD9B}" dt="2023-12-18T21:46:12.249" v="67" actId="1076"/>
+          <ac:picMkLst>
+            <pc:docMk/>
+            <pc:sldMk cId="488630872" sldId="263"/>
+            <ac:picMk id="14" creationId="{D49316FF-81F7-20DE-5FCC-F952FA76BB0A}"/>
+          </ac:picMkLst>
+        </pc:picChg>
+        <pc:picChg chg="add mod">
+          <ac:chgData name="OPPLIGER Severine" userId="bbff5e40-effe-447c-9c8a-b2d02ae784db" providerId="ADAL" clId="{38B5E84A-0765-4FC9-B808-886DFAA9DD9B}" dt="2023-12-18T21:46:12.249" v="67" actId="1076"/>
+          <ac:picMkLst>
+            <pc:docMk/>
+            <pc:sldMk cId="488630872" sldId="263"/>
+            <ac:picMk id="15" creationId="{EDCB1D3D-699B-947B-C457-D5ECA1B97643}"/>
+          </ac:picMkLst>
+        </pc:picChg>
+        <pc:picChg chg="add mod">
+          <ac:chgData name="OPPLIGER Severine" userId="bbff5e40-effe-447c-9c8a-b2d02ae784db" providerId="ADAL" clId="{38B5E84A-0765-4FC9-B808-886DFAA9DD9B}" dt="2023-12-18T21:46:28.886" v="70" actId="1076"/>
+          <ac:picMkLst>
+            <pc:docMk/>
+            <pc:sldMk cId="488630872" sldId="263"/>
+            <ac:picMk id="19" creationId="{A9732E1F-2AC5-12A0-8848-6327E6DE7AD3}"/>
+          </ac:picMkLst>
+        </pc:picChg>
+        <pc:picChg chg="add mod">
+          <ac:chgData name="OPPLIGER Severine" userId="bbff5e40-effe-447c-9c8a-b2d02ae784db" providerId="ADAL" clId="{38B5E84A-0765-4FC9-B808-886DFAA9DD9B}" dt="2023-12-18T21:46:22.435" v="69" actId="1076"/>
+          <ac:picMkLst>
+            <pc:docMk/>
+            <pc:sldMk cId="488630872" sldId="263"/>
+            <ac:picMk id="20" creationId="{B67F5C0F-FF04-1152-D27D-34C1E9D7B16A}"/>
+          </ac:picMkLst>
+        </pc:picChg>
+        <pc:picChg chg="add mod">
+          <ac:chgData name="OPPLIGER Severine" userId="bbff5e40-effe-447c-9c8a-b2d02ae784db" providerId="ADAL" clId="{38B5E84A-0765-4FC9-B808-886DFAA9DD9B}" dt="2023-12-18T21:46:35.982" v="71" actId="1076"/>
+          <ac:picMkLst>
+            <pc:docMk/>
+            <pc:sldMk cId="488630872" sldId="263"/>
+            <ac:picMk id="21" creationId="{B8CDF9FD-643A-FE70-4F25-8AF76FF8DC7C}"/>
+          </ac:picMkLst>
+        </pc:picChg>
+        <pc:picChg chg="add mod">
+          <ac:chgData name="OPPLIGER Severine" userId="bbff5e40-effe-447c-9c8a-b2d02ae784db" providerId="ADAL" clId="{38B5E84A-0765-4FC9-B808-886DFAA9DD9B}" dt="2023-12-18T21:57:33" v="122" actId="1076"/>
+          <ac:picMkLst>
+            <pc:docMk/>
+            <pc:sldMk cId="488630872" sldId="263"/>
+            <ac:picMk id="22" creationId="{760D17E0-5614-7E3C-F02E-AA615FDD4B1D}"/>
+          </ac:picMkLst>
+        </pc:picChg>
+        <pc:picChg chg="add mod">
+          <ac:chgData name="OPPLIGER Severine" userId="bbff5e40-effe-447c-9c8a-b2d02ae784db" providerId="ADAL" clId="{38B5E84A-0765-4FC9-B808-886DFAA9DD9B}" dt="2023-12-18T21:54:17.691" v="85" actId="208"/>
+          <ac:picMkLst>
+            <pc:docMk/>
+            <pc:sldMk cId="488630872" sldId="263"/>
+            <ac:picMk id="24" creationId="{0694F063-3847-8376-86E8-44D4315715F5}"/>
+          </ac:picMkLst>
+        </pc:picChg>
+      </pc:sldChg>
+    </pc:docChg>
+  </pc:docChgLst>
+</pc:chgInfo>
 </file>
 
 <file path=ppt/notesMasters/notesMaster1.xml><?xml version="1.0" encoding="utf-8"?>
@@ -4909,7 +5265,12 @@
             <p:ph type="title"/>
           </p:nvPr>
         </p:nvSpPr>
-        <p:spPr/>
+        <p:spPr>
+          <a:xfrm>
+            <a:off x="1066800" y="220091"/>
+            <a:ext cx="10058400" cy="1273048"/>
+          </a:xfrm>
+        </p:spPr>
         <p:txBody>
           <a:bodyPr/>
           <a:lstStyle/>
@@ -5072,7 +5433,7 @@
           <p:cNvPr id="2" name="Titre 1">
             <a:extLst>
               <a:ext uri="{FF2B5EF4-FFF2-40B4-BE49-F238E27FC236}">
-                <a16:creationId xmlns:a16="http://schemas.microsoft.com/office/drawing/2014/main" id="{71889CED-957C-DE18-0996-5264CD0284F0}"/>
+                <a16:creationId xmlns:a16="http://schemas.microsoft.com/office/drawing/2014/main" id="{52FF9B09-9774-AD79-F4AD-DCB530488F35}"/>
               </a:ext>
             </a:extLst>
           </p:cNvPr>
@@ -5085,20 +5446,23 @@
         </p:nvSpPr>
         <p:spPr>
           <a:xfrm>
-            <a:off x="1069848" y="484632"/>
-            <a:ext cx="10058400" cy="749808"/>
+            <a:off x="752381" y="355580"/>
+            <a:ext cx="10058400" cy="968248"/>
           </a:xfrm>
         </p:spPr>
         <p:txBody>
-          <a:bodyPr>
-            <a:normAutofit fontScale="90000"/>
-          </a:bodyPr>
+          <a:bodyPr/>
           <a:lstStyle/>
           <a:p>
             <a:r>
               <a:rPr lang="fr-CH" dirty="0"/>
-              <a:t>GUI</a:t>
-            </a:r>
+              <a:t>System </a:t>
+            </a:r>
+            <a:r>
+              <a:rPr lang="fr-CH" dirty="0" err="1"/>
+              <a:t>overview</a:t>
+            </a:r>
+            <a:endParaRPr lang="fr-CH" dirty="0"/>
           </a:p>
         </p:txBody>
       </p:sp>
@@ -5107,7 +5471,7 @@
           <p:cNvPr id="4" name="Espace réservé du pied de page 3">
             <a:extLst>
               <a:ext uri="{FF2B5EF4-FFF2-40B4-BE49-F238E27FC236}">
-                <a16:creationId xmlns:a16="http://schemas.microsoft.com/office/drawing/2014/main" id="{A97F0B2A-0A35-04A6-C5F1-655E4B92EB0C}"/>
+                <a16:creationId xmlns:a16="http://schemas.microsoft.com/office/drawing/2014/main" id="{7B1B17E6-8BC5-C251-5224-DB129108FD9C}"/>
               </a:ext>
             </a:extLst>
           </p:cNvPr>
@@ -5136,7 +5500,7 @@
           <p:cNvPr id="5" name="Espace réservé du numéro de diapositive 4">
             <a:extLst>
               <a:ext uri="{FF2B5EF4-FFF2-40B4-BE49-F238E27FC236}">
-                <a16:creationId xmlns:a16="http://schemas.microsoft.com/office/drawing/2014/main" id="{443FB19D-4432-3E9A-4659-B1FAEEF4D828}"/>
+                <a16:creationId xmlns:a16="http://schemas.microsoft.com/office/drawing/2014/main" id="{C30449DA-0BE8-A7D0-637F-3E49F9424F8C}"/>
               </a:ext>
             </a:extLst>
           </p:cNvPr>
@@ -5160,6 +5524,1654 @@
           </a:p>
         </p:txBody>
       </p:sp>
+      <p:pic>
+        <p:nvPicPr>
+          <p:cNvPr id="6" name="Graphique 5" descr="Oreille contour">
+            <a:extLst>
+              <a:ext uri="{FF2B5EF4-FFF2-40B4-BE49-F238E27FC236}">
+                <a16:creationId xmlns:a16="http://schemas.microsoft.com/office/drawing/2014/main" id="{2B6A0708-AE18-D239-7F2A-C5CCC01CEF45}"/>
+              </a:ext>
+            </a:extLst>
+          </p:cNvPr>
+          <p:cNvPicPr>
+            <a:picLocks noChangeAspect="1"/>
+          </p:cNvPicPr>
+          <p:nvPr/>
+        </p:nvPicPr>
+        <p:blipFill>
+          <a:blip r:embed="rId2">
+            <a:extLst>
+              <a:ext uri="{96DAC541-7B7A-43D3-8B79-37D633B846F1}">
+                <asvg:svgBlip xmlns:asvg="http://schemas.microsoft.com/office/drawing/2016/SVG/main" r:embed="rId3"/>
+              </a:ext>
+            </a:extLst>
+          </a:blip>
+          <a:stretch>
+            <a:fillRect/>
+          </a:stretch>
+        </p:blipFill>
+        <p:spPr>
+          <a:xfrm flipH="1">
+            <a:off x="4763505" y="3839464"/>
+            <a:ext cx="728759" cy="703615"/>
+          </a:xfrm>
+          <a:prstGeom prst="rect">
+            <a:avLst/>
+          </a:prstGeom>
+        </p:spPr>
+      </p:pic>
+      <p:pic>
+        <p:nvPicPr>
+          <p:cNvPr id="9" name="Graphique 8" descr="Envoyer contour">
+            <a:extLst>
+              <a:ext uri="{FF2B5EF4-FFF2-40B4-BE49-F238E27FC236}">
+                <a16:creationId xmlns:a16="http://schemas.microsoft.com/office/drawing/2014/main" id="{C3ABCD60-1F42-4E4E-529B-3C6485243B2D}"/>
+              </a:ext>
+            </a:extLst>
+          </p:cNvPr>
+          <p:cNvPicPr>
+            <a:picLocks noChangeAspect="1"/>
+          </p:cNvPicPr>
+          <p:nvPr/>
+        </p:nvPicPr>
+        <p:blipFill>
+          <a:blip r:embed="rId4">
+            <a:extLst>
+              <a:ext uri="{96DAC541-7B7A-43D3-8B79-37D633B846F1}">
+                <asvg:svgBlip xmlns:asvg="http://schemas.microsoft.com/office/drawing/2016/SVG/main" r:embed="rId5"/>
+              </a:ext>
+            </a:extLst>
+          </a:blip>
+          <a:stretch>
+            <a:fillRect/>
+          </a:stretch>
+        </p:blipFill>
+        <p:spPr>
+          <a:xfrm>
+            <a:off x="4732866" y="2298717"/>
+            <a:ext cx="599568" cy="599568"/>
+          </a:xfrm>
+          <a:prstGeom prst="rect">
+            <a:avLst/>
+          </a:prstGeom>
+        </p:spPr>
+      </p:pic>
+      <p:sp>
+        <p:nvSpPr>
+          <p:cNvPr id="10" name="Flèche : droite 9">
+            <a:extLst>
+              <a:ext uri="{FF2B5EF4-FFF2-40B4-BE49-F238E27FC236}">
+                <a16:creationId xmlns:a16="http://schemas.microsoft.com/office/drawing/2014/main" id="{C2F6DDB7-528B-C771-EF29-BB9B6CE87FD7}"/>
+              </a:ext>
+            </a:extLst>
+          </p:cNvPr>
+          <p:cNvSpPr/>
+          <p:nvPr/>
+        </p:nvSpPr>
+        <p:spPr>
+          <a:xfrm rot="969958">
+            <a:off x="4575323" y="2807870"/>
+            <a:ext cx="841826" cy="380219"/>
+          </a:xfrm>
+          <a:prstGeom prst="rightArrow">
+            <a:avLst/>
+          </a:prstGeom>
+          <a:solidFill>
+            <a:schemeClr val="accent2"/>
+          </a:solidFill>
+          <a:ln>
+            <a:solidFill>
+              <a:schemeClr val="accent2"/>
+            </a:solidFill>
+          </a:ln>
+        </p:spPr>
+        <p:style>
+          <a:lnRef idx="2">
+            <a:schemeClr val="accent1">
+              <a:shade val="15000"/>
+            </a:schemeClr>
+          </a:lnRef>
+          <a:fillRef idx="1">
+            <a:schemeClr val="accent1"/>
+          </a:fillRef>
+          <a:effectRef idx="0">
+            <a:schemeClr val="accent1"/>
+          </a:effectRef>
+          <a:fontRef idx="minor">
+            <a:schemeClr val="lt1"/>
+          </a:fontRef>
+        </p:style>
+        <p:txBody>
+          <a:bodyPr rtlCol="0" anchor="ctr"/>
+          <a:lstStyle/>
+          <a:p>
+            <a:pPr algn="ctr"/>
+            <a:r>
+              <a:rPr lang="fr-CH" sz="1100" dirty="0"/>
+              <a:t>MQTT</a:t>
+            </a:r>
+          </a:p>
+        </p:txBody>
+      </p:sp>
+      <p:pic>
+        <p:nvPicPr>
+          <p:cNvPr id="12" name="Graphique 11" descr="Écran avec un remplissage uni">
+            <a:extLst>
+              <a:ext uri="{FF2B5EF4-FFF2-40B4-BE49-F238E27FC236}">
+                <a16:creationId xmlns:a16="http://schemas.microsoft.com/office/drawing/2014/main" id="{AE0D2066-454F-8428-8768-1B86436EC811}"/>
+              </a:ext>
+            </a:extLst>
+          </p:cNvPr>
+          <p:cNvPicPr>
+            <a:picLocks noChangeAspect="1"/>
+          </p:cNvPicPr>
+          <p:nvPr/>
+        </p:nvPicPr>
+        <p:blipFill>
+          <a:blip r:embed="rId6">
+            <a:extLst>
+              <a:ext uri="{96DAC541-7B7A-43D3-8B79-37D633B846F1}">
+                <asvg:svgBlip xmlns:asvg="http://schemas.microsoft.com/office/drawing/2016/SVG/main" r:embed="rId7"/>
+              </a:ext>
+            </a:extLst>
+          </a:blip>
+          <a:stretch>
+            <a:fillRect/>
+          </a:stretch>
+        </p:blipFill>
+        <p:spPr>
+          <a:xfrm>
+            <a:off x="375167" y="1840535"/>
+            <a:ext cx="3642752" cy="3642752"/>
+          </a:xfrm>
+          <a:prstGeom prst="rect">
+            <a:avLst/>
+          </a:prstGeom>
+        </p:spPr>
+      </p:pic>
+      <p:pic>
+        <p:nvPicPr>
+          <p:cNvPr id="13" name="Picture 2" descr="Slider - Free ui icons">
+            <a:extLst>
+              <a:ext uri="{FF2B5EF4-FFF2-40B4-BE49-F238E27FC236}">
+                <a16:creationId xmlns:a16="http://schemas.microsoft.com/office/drawing/2014/main" id="{AA689DAD-B405-8294-B4F0-0E3338E109D8}"/>
+              </a:ext>
+            </a:extLst>
+          </p:cNvPr>
+          <p:cNvPicPr>
+            <a:picLocks noChangeAspect="1" noChangeArrowheads="1"/>
+          </p:cNvPicPr>
+          <p:nvPr/>
+        </p:nvPicPr>
+        <p:blipFill>
+          <a:blip r:embed="rId8">
+            <a:extLst>
+              <a:ext uri="{28A0092B-C50C-407E-A947-70E740481C1C}">
+                <a14:useLocalDpi xmlns:a14="http://schemas.microsoft.com/office/drawing/2010/main" val="0"/>
+              </a:ext>
+            </a:extLst>
+          </a:blip>
+          <a:srcRect/>
+          <a:stretch>
+            <a:fillRect/>
+          </a:stretch>
+        </p:blipFill>
+        <p:spPr bwMode="auto">
+          <a:xfrm>
+            <a:off x="1069848" y="2611201"/>
+            <a:ext cx="740085" cy="740085"/>
+          </a:xfrm>
+          <a:prstGeom prst="rect">
+            <a:avLst/>
+          </a:prstGeom>
+          <a:noFill/>
+          <a:extLst>
+            <a:ext uri="{909E8E84-426E-40DD-AFC4-6F175D3DCCD1}">
+              <a14:hiddenFill xmlns:a14="http://schemas.microsoft.com/office/drawing/2010/main">
+                <a:solidFill>
+                  <a:srgbClr val="FFFFFF"/>
+                </a:solidFill>
+              </a14:hiddenFill>
+            </a:ext>
+          </a:extLst>
+        </p:spPr>
+      </p:pic>
+      <p:pic>
+        <p:nvPicPr>
+          <p:cNvPr id="14" name="Picture 6" descr="Radio button off - User Interface &amp; Gesture Icons">
+            <a:extLst>
+              <a:ext uri="{FF2B5EF4-FFF2-40B4-BE49-F238E27FC236}">
+                <a16:creationId xmlns:a16="http://schemas.microsoft.com/office/drawing/2014/main" id="{D49316FF-81F7-20DE-5FCC-F952FA76BB0A}"/>
+              </a:ext>
+            </a:extLst>
+          </p:cNvPr>
+          <p:cNvPicPr>
+            <a:picLocks noChangeAspect="1" noChangeArrowheads="1"/>
+          </p:cNvPicPr>
+          <p:nvPr/>
+        </p:nvPicPr>
+        <p:blipFill>
+          <a:blip r:embed="rId9">
+            <a:extLst>
+              <a:ext uri="{28A0092B-C50C-407E-A947-70E740481C1C}">
+                <a14:useLocalDpi xmlns:a14="http://schemas.microsoft.com/office/drawing/2010/main" val="0"/>
+              </a:ext>
+            </a:extLst>
+          </a:blip>
+          <a:srcRect/>
+          <a:stretch>
+            <a:fillRect/>
+          </a:stretch>
+        </p:blipFill>
+        <p:spPr bwMode="auto">
+          <a:xfrm>
+            <a:off x="1984859" y="2794028"/>
+            <a:ext cx="275164" cy="275164"/>
+          </a:xfrm>
+          <a:prstGeom prst="rect">
+            <a:avLst/>
+          </a:prstGeom>
+          <a:noFill/>
+          <a:extLst>
+            <a:ext uri="{909E8E84-426E-40DD-AFC4-6F175D3DCCD1}">
+              <a14:hiddenFill xmlns:a14="http://schemas.microsoft.com/office/drawing/2010/main">
+                <a:solidFill>
+                  <a:srgbClr val="FFFFFF"/>
+                </a:solidFill>
+              </a14:hiddenFill>
+            </a:ext>
+          </a:extLst>
+        </p:spPr>
+      </p:pic>
+      <p:pic>
+        <p:nvPicPr>
+          <p:cNvPr id="15" name="Picture 8" descr="Radio Button Vector SVG Icon (6) - SVG Repo">
+            <a:extLst>
+              <a:ext uri="{FF2B5EF4-FFF2-40B4-BE49-F238E27FC236}">
+                <a16:creationId xmlns:a16="http://schemas.microsoft.com/office/drawing/2014/main" id="{EDCB1D3D-699B-947B-C457-D5ECA1B97643}"/>
+              </a:ext>
+            </a:extLst>
+          </p:cNvPr>
+          <p:cNvPicPr>
+            <a:picLocks noChangeAspect="1" noChangeArrowheads="1"/>
+          </p:cNvPicPr>
+          <p:nvPr/>
+        </p:nvPicPr>
+        <p:blipFill>
+          <a:blip r:embed="rId10">
+            <a:extLst>
+              <a:ext uri="{28A0092B-C50C-407E-A947-70E740481C1C}">
+                <a14:useLocalDpi xmlns:a14="http://schemas.microsoft.com/office/drawing/2010/main" val="0"/>
+              </a:ext>
+            </a:extLst>
+          </a:blip>
+          <a:srcRect/>
+          <a:stretch>
+            <a:fillRect/>
+          </a:stretch>
+        </p:blipFill>
+        <p:spPr bwMode="auto">
+          <a:xfrm>
+            <a:off x="2707292" y="2794028"/>
+            <a:ext cx="278597" cy="278597"/>
+          </a:xfrm>
+          <a:prstGeom prst="rect">
+            <a:avLst/>
+          </a:prstGeom>
+          <a:noFill/>
+          <a:extLst>
+            <a:ext uri="{909E8E84-426E-40DD-AFC4-6F175D3DCCD1}">
+              <a14:hiddenFill xmlns:a14="http://schemas.microsoft.com/office/drawing/2010/main">
+                <a:solidFill>
+                  <a:srgbClr val="FFFFFF"/>
+                </a:solidFill>
+              </a14:hiddenFill>
+            </a:ext>
+          </a:extLst>
+        </p:spPr>
+      </p:pic>
+      <p:sp>
+        <p:nvSpPr>
+          <p:cNvPr id="16" name="ZoneTexte 15">
+            <a:extLst>
+              <a:ext uri="{FF2B5EF4-FFF2-40B4-BE49-F238E27FC236}">
+                <a16:creationId xmlns:a16="http://schemas.microsoft.com/office/drawing/2014/main" id="{22C57F44-630C-C5CC-A0E9-AD3B4D4AA5E6}"/>
+              </a:ext>
+            </a:extLst>
+          </p:cNvPr>
+          <p:cNvSpPr txBox="1"/>
+          <p:nvPr/>
+        </p:nvSpPr>
+        <p:spPr>
+          <a:xfrm>
+            <a:off x="2196543" y="2742298"/>
+            <a:ext cx="502061" cy="369332"/>
+          </a:xfrm>
+          <a:prstGeom prst="rect">
+            <a:avLst/>
+          </a:prstGeom>
+          <a:noFill/>
+        </p:spPr>
+        <p:txBody>
+          <a:bodyPr wrap="none" rtlCol="0">
+            <a:spAutoFit/>
+          </a:bodyPr>
+          <a:lstStyle/>
+          <a:p>
+            <a:r>
+              <a:rPr lang="fr-CH" dirty="0"/>
+              <a:t>On</a:t>
+            </a:r>
+          </a:p>
+        </p:txBody>
+      </p:sp>
+      <p:sp>
+        <p:nvSpPr>
+          <p:cNvPr id="17" name="ZoneTexte 16">
+            <a:extLst>
+              <a:ext uri="{FF2B5EF4-FFF2-40B4-BE49-F238E27FC236}">
+                <a16:creationId xmlns:a16="http://schemas.microsoft.com/office/drawing/2014/main" id="{846C6A01-CA8A-4841-FAD2-421060D27219}"/>
+              </a:ext>
+            </a:extLst>
+          </p:cNvPr>
+          <p:cNvSpPr txBox="1"/>
+          <p:nvPr/>
+        </p:nvSpPr>
+        <p:spPr>
+          <a:xfrm>
+            <a:off x="2917947" y="2745924"/>
+            <a:ext cx="505908" cy="369332"/>
+          </a:xfrm>
+          <a:prstGeom prst="rect">
+            <a:avLst/>
+          </a:prstGeom>
+          <a:noFill/>
+        </p:spPr>
+        <p:txBody>
+          <a:bodyPr wrap="none" rtlCol="0">
+            <a:spAutoFit/>
+          </a:bodyPr>
+          <a:lstStyle/>
+          <a:p>
+            <a:r>
+              <a:rPr lang="fr-CH" dirty="0"/>
+              <a:t>Off</a:t>
+            </a:r>
+          </a:p>
+        </p:txBody>
+      </p:sp>
+      <p:sp>
+        <p:nvSpPr>
+          <p:cNvPr id="18" name="Rectangle : coins arrondis 17">
+            <a:extLst>
+              <a:ext uri="{FF2B5EF4-FFF2-40B4-BE49-F238E27FC236}">
+                <a16:creationId xmlns:a16="http://schemas.microsoft.com/office/drawing/2014/main" id="{6CAD756A-E358-2A7E-276F-56CEEB1E453E}"/>
+              </a:ext>
+            </a:extLst>
+          </p:cNvPr>
+          <p:cNvSpPr/>
+          <p:nvPr/>
+        </p:nvSpPr>
+        <p:spPr>
+          <a:xfrm>
+            <a:off x="1036139" y="3369782"/>
+            <a:ext cx="1187048" cy="210911"/>
+          </a:xfrm>
+          <a:prstGeom prst="roundRect">
+            <a:avLst/>
+          </a:prstGeom>
+          <a:solidFill>
+            <a:schemeClr val="tx2">
+              <a:lumMod val="20000"/>
+              <a:lumOff val="80000"/>
+            </a:schemeClr>
+          </a:solidFill>
+          <a:effectLst>
+            <a:outerShdw blurRad="50800" dist="38100" dir="8100000" algn="tr" rotWithShape="0">
+              <a:prstClr val="black">
+                <a:alpha val="40000"/>
+              </a:prstClr>
+            </a:outerShdw>
+          </a:effectLst>
+        </p:spPr>
+        <p:style>
+          <a:lnRef idx="2">
+            <a:schemeClr val="dk1"/>
+          </a:lnRef>
+          <a:fillRef idx="1">
+            <a:schemeClr val="lt1"/>
+          </a:fillRef>
+          <a:effectRef idx="0">
+            <a:schemeClr val="dk1"/>
+          </a:effectRef>
+          <a:fontRef idx="minor">
+            <a:schemeClr val="dk1"/>
+          </a:fontRef>
+        </p:style>
+        <p:txBody>
+          <a:bodyPr rtlCol="0" anchor="ctr"/>
+          <a:lstStyle/>
+          <a:p>
+            <a:pPr algn="ctr"/>
+            <a:r>
+              <a:rPr lang="fr-CH" sz="1400" dirty="0"/>
+              <a:t>Emergency</a:t>
+            </a:r>
+            <a:endParaRPr lang="fr-CH" dirty="0"/>
+          </a:p>
+        </p:txBody>
+      </p:sp>
+      <p:pic>
+        <p:nvPicPr>
+          <p:cNvPr id="19" name="Graphique 18" descr="Curseur avec un remplissage uni">
+            <a:extLst>
+              <a:ext uri="{FF2B5EF4-FFF2-40B4-BE49-F238E27FC236}">
+                <a16:creationId xmlns:a16="http://schemas.microsoft.com/office/drawing/2014/main" id="{A9732E1F-2AC5-12A0-8848-6327E6DE7AD3}"/>
+              </a:ext>
+            </a:extLst>
+          </p:cNvPr>
+          <p:cNvPicPr>
+            <a:picLocks noChangeAspect="1"/>
+          </p:cNvPicPr>
+          <p:nvPr/>
+        </p:nvPicPr>
+        <p:blipFill>
+          <a:blip r:embed="rId11">
+            <a:extLst>
+              <a:ext uri="{96DAC541-7B7A-43D3-8B79-37D633B846F1}">
+                <asvg:svgBlip xmlns:asvg="http://schemas.microsoft.com/office/drawing/2016/SVG/main" r:embed="rId12"/>
+              </a:ext>
+            </a:extLst>
+          </a:blip>
+          <a:stretch>
+            <a:fillRect/>
+          </a:stretch>
+        </p:blipFill>
+        <p:spPr>
+          <a:xfrm>
+            <a:off x="2049786" y="3444750"/>
+            <a:ext cx="406960" cy="406960"/>
+          </a:xfrm>
+          <a:prstGeom prst="rect">
+            <a:avLst/>
+          </a:prstGeom>
+        </p:spPr>
+      </p:pic>
+      <p:pic>
+        <p:nvPicPr>
+          <p:cNvPr id="20" name="Picture 10" descr="Paragraph text - User Interface &amp; Gesture Icons">
+            <a:extLst>
+              <a:ext uri="{FF2B5EF4-FFF2-40B4-BE49-F238E27FC236}">
+                <a16:creationId xmlns:a16="http://schemas.microsoft.com/office/drawing/2014/main" id="{B67F5C0F-FF04-1152-D27D-34C1E9D7B16A}"/>
+              </a:ext>
+            </a:extLst>
+          </p:cNvPr>
+          <p:cNvPicPr>
+            <a:picLocks noChangeAspect="1" noChangeArrowheads="1"/>
+          </p:cNvPicPr>
+          <p:nvPr/>
+        </p:nvPicPr>
+        <p:blipFill>
+          <a:blip r:embed="rId13">
+            <a:extLst>
+              <a:ext uri="{28A0092B-C50C-407E-A947-70E740481C1C}">
+                <a14:useLocalDpi xmlns:a14="http://schemas.microsoft.com/office/drawing/2010/main" val="0"/>
+              </a:ext>
+            </a:extLst>
+          </a:blip>
+          <a:srcRect/>
+          <a:stretch>
+            <a:fillRect/>
+          </a:stretch>
+        </p:blipFill>
+        <p:spPr bwMode="auto">
+          <a:xfrm>
+            <a:off x="2626967" y="3310623"/>
+            <a:ext cx="621947" cy="621947"/>
+          </a:xfrm>
+          <a:prstGeom prst="rect">
+            <a:avLst/>
+          </a:prstGeom>
+          <a:noFill/>
+          <a:extLst>
+            <a:ext uri="{909E8E84-426E-40DD-AFC4-6F175D3DCCD1}">
+              <a14:hiddenFill xmlns:a14="http://schemas.microsoft.com/office/drawing/2010/main">
+                <a:solidFill>
+                  <a:srgbClr val="FFFFFF"/>
+                </a:solidFill>
+              </a14:hiddenFill>
+            </a:ext>
+          </a:extLst>
+        </p:spPr>
+      </p:pic>
+      <p:pic>
+        <p:nvPicPr>
+          <p:cNvPr id="21" name="Picture 12" descr="Progress bar icon">
+            <a:extLst>
+              <a:ext uri="{FF2B5EF4-FFF2-40B4-BE49-F238E27FC236}">
+                <a16:creationId xmlns:a16="http://schemas.microsoft.com/office/drawing/2014/main" id="{B8CDF9FD-643A-FE70-4F25-8AF76FF8DC7C}"/>
+              </a:ext>
+            </a:extLst>
+          </p:cNvPr>
+          <p:cNvPicPr>
+            <a:picLocks noChangeAspect="1" noChangeArrowheads="1"/>
+          </p:cNvPicPr>
+          <p:nvPr/>
+        </p:nvPicPr>
+        <p:blipFill>
+          <a:blip r:embed="rId14">
+            <a:extLst>
+              <a:ext uri="{28A0092B-C50C-407E-A947-70E740481C1C}">
+                <a14:useLocalDpi xmlns:a14="http://schemas.microsoft.com/office/drawing/2010/main" val="0"/>
+              </a:ext>
+            </a:extLst>
+          </a:blip>
+          <a:srcRect/>
+          <a:stretch>
+            <a:fillRect/>
+          </a:stretch>
+        </p:blipFill>
+        <p:spPr bwMode="auto">
+          <a:xfrm>
+            <a:off x="1069848" y="3489355"/>
+            <a:ext cx="895808" cy="895808"/>
+          </a:xfrm>
+          <a:prstGeom prst="rect">
+            <a:avLst/>
+          </a:prstGeom>
+          <a:noFill/>
+          <a:extLst>
+            <a:ext uri="{909E8E84-426E-40DD-AFC4-6F175D3DCCD1}">
+              <a14:hiddenFill xmlns:a14="http://schemas.microsoft.com/office/drawing/2010/main">
+                <a:solidFill>
+                  <a:srgbClr val="FFFFFF"/>
+                </a:solidFill>
+              </a14:hiddenFill>
+            </a:ext>
+          </a:extLst>
+        </p:spPr>
+      </p:pic>
+      <p:pic>
+        <p:nvPicPr>
+          <p:cNvPr id="22" name="Image 21" descr="Une image contenant diagramme, texte, Plan, ligne&#10;&#10;Description générée automatiquement">
+            <a:extLst>
+              <a:ext uri="{FF2B5EF4-FFF2-40B4-BE49-F238E27FC236}">
+                <a16:creationId xmlns:a16="http://schemas.microsoft.com/office/drawing/2014/main" id="{760D17E0-5614-7E3C-F02E-AA615FDD4B1D}"/>
+              </a:ext>
+            </a:extLst>
+          </p:cNvPr>
+          <p:cNvPicPr>
+            <a:picLocks noChangeAspect="1"/>
+          </p:cNvPicPr>
+          <p:nvPr/>
+        </p:nvPicPr>
+        <p:blipFill>
+          <a:blip r:embed="rId15"/>
+          <a:stretch>
+            <a:fillRect/>
+          </a:stretch>
+        </p:blipFill>
+        <p:spPr>
+          <a:xfrm>
+            <a:off x="8598643" y="2698196"/>
+            <a:ext cx="2912745" cy="2199005"/>
+          </a:xfrm>
+          <a:prstGeom prst="rect">
+            <a:avLst/>
+          </a:prstGeom>
+        </p:spPr>
+      </p:pic>
+      <p:pic>
+        <p:nvPicPr>
+          <p:cNvPr id="24" name="Graphique 23" descr="Poulpe avec un remplissage uni">
+            <a:extLst>
+              <a:ext uri="{FF2B5EF4-FFF2-40B4-BE49-F238E27FC236}">
+                <a16:creationId xmlns:a16="http://schemas.microsoft.com/office/drawing/2014/main" id="{0694F063-3847-8376-86E8-44D4315715F5}"/>
+              </a:ext>
+            </a:extLst>
+          </p:cNvPr>
+          <p:cNvPicPr>
+            <a:picLocks noChangeAspect="1"/>
+          </p:cNvPicPr>
+          <p:nvPr/>
+        </p:nvPicPr>
+        <p:blipFill>
+          <a:blip r:embed="rId16">
+            <a:extLst>
+              <a:ext uri="{96DAC541-7B7A-43D3-8B79-37D633B846F1}">
+                <asvg:svgBlip xmlns:asvg="http://schemas.microsoft.com/office/drawing/2016/SVG/main" r:embed="rId17"/>
+              </a:ext>
+            </a:extLst>
+          </a:blip>
+          <a:stretch>
+            <a:fillRect/>
+          </a:stretch>
+        </p:blipFill>
+        <p:spPr>
+          <a:xfrm>
+            <a:off x="5638800" y="2573638"/>
+            <a:ext cx="1312562" cy="1312562"/>
+          </a:xfrm>
+          <a:prstGeom prst="rect">
+            <a:avLst/>
+          </a:prstGeom>
+        </p:spPr>
+      </p:pic>
+      <p:pic>
+        <p:nvPicPr>
+          <p:cNvPr id="7" name="Graphique 6" descr="Voiture avec un remplissage uni">
+            <a:extLst>
+              <a:ext uri="{FF2B5EF4-FFF2-40B4-BE49-F238E27FC236}">
+                <a16:creationId xmlns:a16="http://schemas.microsoft.com/office/drawing/2014/main" id="{D93C8E67-93A0-D1AC-1D1A-E384445632F5}"/>
+              </a:ext>
+            </a:extLst>
+          </p:cNvPr>
+          <p:cNvPicPr>
+            <a:picLocks noChangeAspect="1"/>
+          </p:cNvPicPr>
+          <p:nvPr/>
+        </p:nvPicPr>
+        <p:blipFill>
+          <a:blip r:embed="rId18">
+            <a:extLst>
+              <a:ext uri="{96DAC541-7B7A-43D3-8B79-37D633B846F1}">
+                <asvg:svgBlip xmlns:asvg="http://schemas.microsoft.com/office/drawing/2016/SVG/main" r:embed="rId19"/>
+              </a:ext>
+            </a:extLst>
+          </a:blip>
+          <a:stretch>
+            <a:fillRect/>
+          </a:stretch>
+        </p:blipFill>
+        <p:spPr>
+          <a:xfrm>
+            <a:off x="9060202" y="2083579"/>
+            <a:ext cx="914400" cy="914400"/>
+          </a:xfrm>
+          <a:prstGeom prst="rect">
+            <a:avLst/>
+          </a:prstGeom>
+        </p:spPr>
+      </p:pic>
+      <p:sp>
+        <p:nvSpPr>
+          <p:cNvPr id="26" name="Flèche : gauche 25">
+            <a:extLst>
+              <a:ext uri="{FF2B5EF4-FFF2-40B4-BE49-F238E27FC236}">
+                <a16:creationId xmlns:a16="http://schemas.microsoft.com/office/drawing/2014/main" id="{DE64E025-9BB9-7EC3-AB8B-324BC0A96352}"/>
+              </a:ext>
+            </a:extLst>
+          </p:cNvPr>
+          <p:cNvSpPr/>
+          <p:nvPr/>
+        </p:nvSpPr>
+        <p:spPr>
+          <a:xfrm rot="20032995">
+            <a:off x="7026205" y="2712138"/>
+            <a:ext cx="821421" cy="401741"/>
+          </a:xfrm>
+          <a:prstGeom prst="leftArrow">
+            <a:avLst/>
+          </a:prstGeom>
+          <a:solidFill>
+            <a:schemeClr val="accent2"/>
+          </a:solidFill>
+          <a:ln>
+            <a:noFill/>
+          </a:ln>
+        </p:spPr>
+        <p:style>
+          <a:lnRef idx="2">
+            <a:schemeClr val="accent1">
+              <a:shade val="15000"/>
+            </a:schemeClr>
+          </a:lnRef>
+          <a:fillRef idx="1">
+            <a:schemeClr val="accent1"/>
+          </a:fillRef>
+          <a:effectRef idx="0">
+            <a:schemeClr val="accent1"/>
+          </a:effectRef>
+          <a:fontRef idx="minor">
+            <a:schemeClr val="lt1"/>
+          </a:fontRef>
+        </p:style>
+        <p:txBody>
+          <a:bodyPr rtlCol="0" anchor="ctr"/>
+          <a:lstStyle/>
+          <a:p>
+            <a:pPr algn="ctr"/>
+            <a:r>
+              <a:rPr lang="fr-CH" sz="1100" dirty="0"/>
+              <a:t>MQTT</a:t>
+            </a:r>
+            <a:endParaRPr lang="fr-CH" dirty="0"/>
+          </a:p>
+        </p:txBody>
+      </p:sp>
+      <p:sp>
+        <p:nvSpPr>
+          <p:cNvPr id="27" name="Flèche : droite 26">
+            <a:extLst>
+              <a:ext uri="{FF2B5EF4-FFF2-40B4-BE49-F238E27FC236}">
+                <a16:creationId xmlns:a16="http://schemas.microsoft.com/office/drawing/2014/main" id="{10921A93-EAEC-362F-BC08-4515403A20F9}"/>
+              </a:ext>
+            </a:extLst>
+          </p:cNvPr>
+          <p:cNvSpPr/>
+          <p:nvPr/>
+        </p:nvSpPr>
+        <p:spPr>
+          <a:xfrm rot="20033872">
+            <a:off x="7200540" y="3215718"/>
+            <a:ext cx="834257" cy="375544"/>
+          </a:xfrm>
+          <a:prstGeom prst="rightArrow">
+            <a:avLst/>
+          </a:prstGeom>
+          <a:solidFill>
+            <a:schemeClr val="accent2"/>
+          </a:solidFill>
+          <a:ln>
+            <a:solidFill>
+              <a:schemeClr val="accent2"/>
+            </a:solidFill>
+          </a:ln>
+        </p:spPr>
+        <p:style>
+          <a:lnRef idx="2">
+            <a:schemeClr val="accent1">
+              <a:shade val="15000"/>
+            </a:schemeClr>
+          </a:lnRef>
+          <a:fillRef idx="1">
+            <a:schemeClr val="accent1"/>
+          </a:fillRef>
+          <a:effectRef idx="0">
+            <a:schemeClr val="accent1"/>
+          </a:effectRef>
+          <a:fontRef idx="minor">
+            <a:schemeClr val="lt1"/>
+          </a:fontRef>
+        </p:style>
+        <p:txBody>
+          <a:bodyPr rtlCol="0" anchor="ctr"/>
+          <a:lstStyle/>
+          <a:p>
+            <a:pPr algn="ctr"/>
+            <a:r>
+              <a:rPr lang="fr-CH" sz="1100" dirty="0"/>
+              <a:t>MQTT</a:t>
+            </a:r>
+          </a:p>
+        </p:txBody>
+      </p:sp>
+      <p:sp>
+        <p:nvSpPr>
+          <p:cNvPr id="28" name="Flèche : gauche 27">
+            <a:extLst>
+              <a:ext uri="{FF2B5EF4-FFF2-40B4-BE49-F238E27FC236}">
+                <a16:creationId xmlns:a16="http://schemas.microsoft.com/office/drawing/2014/main" id="{0A3CAD15-C647-0F00-BFC1-E434342A74FA}"/>
+              </a:ext>
+            </a:extLst>
+          </p:cNvPr>
+          <p:cNvSpPr/>
+          <p:nvPr/>
+        </p:nvSpPr>
+        <p:spPr>
+          <a:xfrm rot="20032995">
+            <a:off x="4521271" y="3535244"/>
+            <a:ext cx="821421" cy="401741"/>
+          </a:xfrm>
+          <a:prstGeom prst="leftArrow">
+            <a:avLst/>
+          </a:prstGeom>
+          <a:solidFill>
+            <a:schemeClr val="accent2"/>
+          </a:solidFill>
+          <a:ln>
+            <a:noFill/>
+          </a:ln>
+        </p:spPr>
+        <p:style>
+          <a:lnRef idx="2">
+            <a:schemeClr val="accent1">
+              <a:shade val="15000"/>
+            </a:schemeClr>
+          </a:lnRef>
+          <a:fillRef idx="1">
+            <a:schemeClr val="accent1"/>
+          </a:fillRef>
+          <a:effectRef idx="0">
+            <a:schemeClr val="accent1"/>
+          </a:effectRef>
+          <a:fontRef idx="minor">
+            <a:schemeClr val="lt1"/>
+          </a:fontRef>
+        </p:style>
+        <p:txBody>
+          <a:bodyPr rtlCol="0" anchor="ctr"/>
+          <a:lstStyle/>
+          <a:p>
+            <a:pPr algn="ctr"/>
+            <a:r>
+              <a:rPr lang="fr-CH" sz="1100" dirty="0"/>
+              <a:t>MQTT</a:t>
+            </a:r>
+            <a:endParaRPr lang="fr-CH" dirty="0"/>
+          </a:p>
+        </p:txBody>
+      </p:sp>
+      <p:sp>
+        <p:nvSpPr>
+          <p:cNvPr id="29" name="ZoneTexte 28">
+            <a:extLst>
+              <a:ext uri="{FF2B5EF4-FFF2-40B4-BE49-F238E27FC236}">
+                <a16:creationId xmlns:a16="http://schemas.microsoft.com/office/drawing/2014/main" id="{E02DEC4D-357B-32D7-2F87-55D7F036EE16}"/>
+              </a:ext>
+            </a:extLst>
+          </p:cNvPr>
+          <p:cNvSpPr txBox="1"/>
+          <p:nvPr/>
+        </p:nvSpPr>
+        <p:spPr>
+          <a:xfrm>
+            <a:off x="4399280" y="1950720"/>
+            <a:ext cx="1382301" cy="369332"/>
+          </a:xfrm>
+          <a:prstGeom prst="rect">
+            <a:avLst/>
+          </a:prstGeom>
+          <a:noFill/>
+        </p:spPr>
+        <p:txBody>
+          <a:bodyPr wrap="none" rtlCol="0">
+            <a:spAutoFit/>
+          </a:bodyPr>
+          <a:lstStyle/>
+          <a:p>
+            <a:r>
+              <a:rPr lang="fr-CH" dirty="0"/>
+              <a:t>publication</a:t>
+            </a:r>
+          </a:p>
+        </p:txBody>
+      </p:sp>
+      <p:sp>
+        <p:nvSpPr>
+          <p:cNvPr id="30" name="ZoneTexte 29">
+            <a:extLst>
+              <a:ext uri="{FF2B5EF4-FFF2-40B4-BE49-F238E27FC236}">
+                <a16:creationId xmlns:a16="http://schemas.microsoft.com/office/drawing/2014/main" id="{562BBF8F-4FA3-5345-1865-4CB7961B9813}"/>
+              </a:ext>
+            </a:extLst>
+          </p:cNvPr>
+          <p:cNvSpPr txBox="1"/>
+          <p:nvPr/>
+        </p:nvSpPr>
+        <p:spPr>
+          <a:xfrm>
+            <a:off x="4372805" y="4495564"/>
+            <a:ext cx="1510157" cy="369332"/>
+          </a:xfrm>
+          <a:prstGeom prst="rect">
+            <a:avLst/>
+          </a:prstGeom>
+          <a:noFill/>
+        </p:spPr>
+        <p:txBody>
+          <a:bodyPr wrap="none" rtlCol="0">
+            <a:spAutoFit/>
+          </a:bodyPr>
+          <a:lstStyle/>
+          <a:p>
+            <a:r>
+              <a:rPr lang="fr-CH" dirty="0" err="1"/>
+              <a:t>subscription</a:t>
+            </a:r>
+            <a:endParaRPr lang="fr-CH" dirty="0"/>
+          </a:p>
+        </p:txBody>
+      </p:sp>
+      <p:sp>
+        <p:nvSpPr>
+          <p:cNvPr id="31" name="ZoneTexte 30">
+            <a:extLst>
+              <a:ext uri="{FF2B5EF4-FFF2-40B4-BE49-F238E27FC236}">
+                <a16:creationId xmlns:a16="http://schemas.microsoft.com/office/drawing/2014/main" id="{0822DE42-039A-17E2-E651-0AFCCD20A0E5}"/>
+              </a:ext>
+            </a:extLst>
+          </p:cNvPr>
+          <p:cNvSpPr txBox="1"/>
+          <p:nvPr/>
+        </p:nvSpPr>
+        <p:spPr>
+          <a:xfrm>
+            <a:off x="5690823" y="2300814"/>
+            <a:ext cx="1619289" cy="369332"/>
+          </a:xfrm>
+          <a:prstGeom prst="rect">
+            <a:avLst/>
+          </a:prstGeom>
+          <a:noFill/>
+        </p:spPr>
+        <p:txBody>
+          <a:bodyPr wrap="none" rtlCol="0">
+            <a:spAutoFit/>
+          </a:bodyPr>
+          <a:lstStyle/>
+          <a:p>
+            <a:r>
+              <a:rPr lang="fr-CH" dirty="0"/>
+              <a:t>MQTT broker</a:t>
+            </a:r>
+          </a:p>
+        </p:txBody>
+      </p:sp>
+    </p:spTree>
+    <p:extLst>
+      <p:ext uri="{BB962C8B-B14F-4D97-AF65-F5344CB8AC3E}">
+        <p14:creationId xmlns:p14="http://schemas.microsoft.com/office/powerpoint/2010/main" val="488630872"/>
+      </p:ext>
+    </p:extLst>
+  </p:cSld>
+  <p:clrMapOvr>
+    <a:masterClrMapping/>
+  </p:clrMapOvr>
+  <p:timing>
+    <p:tnLst>
+      <p:par>
+        <p:cTn id="1" dur="indefinite" restart="never" nodeType="tmRoot">
+          <p:childTnLst>
+            <p:seq concurrent="1" nextAc="seek">
+              <p:cTn id="2" dur="indefinite" nodeType="mainSeq">
+                <p:childTnLst>
+                  <p:par>
+                    <p:cTn id="3" fill="hold">
+                      <p:stCondLst>
+                        <p:cond delay="indefinite"/>
+                      </p:stCondLst>
+                      <p:childTnLst>
+                        <p:par>
+                          <p:cTn id="4" fill="hold">
+                            <p:stCondLst>
+                              <p:cond delay="0"/>
+                            </p:stCondLst>
+                            <p:childTnLst>
+                              <p:par>
+                                <p:cTn id="5" presetID="10" presetClass="entr" presetSubtype="0" fill="hold" nodeType="clickEffect">
+                                  <p:stCondLst>
+                                    <p:cond delay="0"/>
+                                  </p:stCondLst>
+                                  <p:childTnLst>
+                                    <p:set>
+                                      <p:cBhvr>
+                                        <p:cTn id="6" dur="1" fill="hold">
+                                          <p:stCondLst>
+                                            <p:cond delay="0"/>
+                                          </p:stCondLst>
+                                        </p:cTn>
+                                        <p:tgtEl>
+                                          <p:spTgt spid="9"/>
+                                        </p:tgtEl>
+                                        <p:attrNameLst>
+                                          <p:attrName>style.visibility</p:attrName>
+                                        </p:attrNameLst>
+                                      </p:cBhvr>
+                                      <p:to>
+                                        <p:strVal val="visible"/>
+                                      </p:to>
+                                    </p:set>
+                                    <p:animEffect transition="in" filter="fade">
+                                      <p:cBhvr>
+                                        <p:cTn id="7" dur="500"/>
+                                        <p:tgtEl>
+                                          <p:spTgt spid="9"/>
+                                        </p:tgtEl>
+                                      </p:cBhvr>
+                                    </p:animEffect>
+                                  </p:childTnLst>
+                                </p:cTn>
+                              </p:par>
+                            </p:childTnLst>
+                          </p:cTn>
+                        </p:par>
+                      </p:childTnLst>
+                    </p:cTn>
+                  </p:par>
+                  <p:par>
+                    <p:cTn id="8" fill="hold">
+                      <p:stCondLst>
+                        <p:cond delay="indefinite"/>
+                      </p:stCondLst>
+                      <p:childTnLst>
+                        <p:par>
+                          <p:cTn id="9" fill="hold">
+                            <p:stCondLst>
+                              <p:cond delay="0"/>
+                            </p:stCondLst>
+                            <p:childTnLst>
+                              <p:par>
+                                <p:cTn id="10" presetID="10" presetClass="entr" presetSubtype="0" fill="hold" nodeType="clickEffect">
+                                  <p:stCondLst>
+                                    <p:cond delay="0"/>
+                                  </p:stCondLst>
+                                  <p:childTnLst>
+                                    <p:set>
+                                      <p:cBhvr>
+                                        <p:cTn id="11" dur="1" fill="hold">
+                                          <p:stCondLst>
+                                            <p:cond delay="0"/>
+                                          </p:stCondLst>
+                                        </p:cTn>
+                                        <p:tgtEl>
+                                          <p:spTgt spid="6"/>
+                                        </p:tgtEl>
+                                        <p:attrNameLst>
+                                          <p:attrName>style.visibility</p:attrName>
+                                        </p:attrNameLst>
+                                      </p:cBhvr>
+                                      <p:to>
+                                        <p:strVal val="visible"/>
+                                      </p:to>
+                                    </p:set>
+                                    <p:animEffect transition="in" filter="fade">
+                                      <p:cBhvr>
+                                        <p:cTn id="12" dur="500"/>
+                                        <p:tgtEl>
+                                          <p:spTgt spid="6"/>
+                                        </p:tgtEl>
+                                      </p:cBhvr>
+                                    </p:animEffect>
+                                  </p:childTnLst>
+                                </p:cTn>
+                              </p:par>
+                              <p:par>
+                                <p:cTn id="13" presetID="10" presetClass="entr" presetSubtype="0" fill="hold" nodeType="withEffect">
+                                  <p:stCondLst>
+                                    <p:cond delay="0"/>
+                                  </p:stCondLst>
+                                  <p:childTnLst>
+                                    <p:set>
+                                      <p:cBhvr>
+                                        <p:cTn id="14" dur="1" fill="hold">
+                                          <p:stCondLst>
+                                            <p:cond delay="0"/>
+                                          </p:stCondLst>
+                                        </p:cTn>
+                                        <p:tgtEl>
+                                          <p:spTgt spid="7"/>
+                                        </p:tgtEl>
+                                        <p:attrNameLst>
+                                          <p:attrName>style.visibility</p:attrName>
+                                        </p:attrNameLst>
+                                      </p:cBhvr>
+                                      <p:to>
+                                        <p:strVal val="visible"/>
+                                      </p:to>
+                                    </p:set>
+                                    <p:animEffect transition="in" filter="fade">
+                                      <p:cBhvr>
+                                        <p:cTn id="15" dur="500"/>
+                                        <p:tgtEl>
+                                          <p:spTgt spid="7"/>
+                                        </p:tgtEl>
+                                      </p:cBhvr>
+                                    </p:animEffect>
+                                  </p:childTnLst>
+                                </p:cTn>
+                              </p:par>
+                              <p:par>
+                                <p:cTn id="16" presetID="10" presetClass="entr" presetSubtype="0" fill="hold" grpId="0" nodeType="withEffect">
+                                  <p:stCondLst>
+                                    <p:cond delay="0"/>
+                                  </p:stCondLst>
+                                  <p:childTnLst>
+                                    <p:set>
+                                      <p:cBhvr>
+                                        <p:cTn id="17" dur="1" fill="hold">
+                                          <p:stCondLst>
+                                            <p:cond delay="0"/>
+                                          </p:stCondLst>
+                                        </p:cTn>
+                                        <p:tgtEl>
+                                          <p:spTgt spid="10"/>
+                                        </p:tgtEl>
+                                        <p:attrNameLst>
+                                          <p:attrName>style.visibility</p:attrName>
+                                        </p:attrNameLst>
+                                      </p:cBhvr>
+                                      <p:to>
+                                        <p:strVal val="visible"/>
+                                      </p:to>
+                                    </p:set>
+                                    <p:animEffect transition="in" filter="fade">
+                                      <p:cBhvr>
+                                        <p:cTn id="18" dur="500"/>
+                                        <p:tgtEl>
+                                          <p:spTgt spid="10"/>
+                                        </p:tgtEl>
+                                      </p:cBhvr>
+                                    </p:animEffect>
+                                  </p:childTnLst>
+                                </p:cTn>
+                              </p:par>
+                              <p:par>
+                                <p:cTn id="19" presetID="10" presetClass="entr" presetSubtype="0" fill="hold" nodeType="withEffect">
+                                  <p:stCondLst>
+                                    <p:cond delay="0"/>
+                                  </p:stCondLst>
+                                  <p:childTnLst>
+                                    <p:set>
+                                      <p:cBhvr>
+                                        <p:cTn id="20" dur="1" fill="hold">
+                                          <p:stCondLst>
+                                            <p:cond delay="0"/>
+                                          </p:stCondLst>
+                                        </p:cTn>
+                                        <p:tgtEl>
+                                          <p:spTgt spid="13"/>
+                                        </p:tgtEl>
+                                        <p:attrNameLst>
+                                          <p:attrName>style.visibility</p:attrName>
+                                        </p:attrNameLst>
+                                      </p:cBhvr>
+                                      <p:to>
+                                        <p:strVal val="visible"/>
+                                      </p:to>
+                                    </p:set>
+                                    <p:animEffect transition="in" filter="fade">
+                                      <p:cBhvr>
+                                        <p:cTn id="21" dur="500"/>
+                                        <p:tgtEl>
+                                          <p:spTgt spid="13"/>
+                                        </p:tgtEl>
+                                      </p:cBhvr>
+                                    </p:animEffect>
+                                  </p:childTnLst>
+                                </p:cTn>
+                              </p:par>
+                              <p:par>
+                                <p:cTn id="22" presetID="10" presetClass="entr" presetSubtype="0" fill="hold" nodeType="withEffect">
+                                  <p:stCondLst>
+                                    <p:cond delay="0"/>
+                                  </p:stCondLst>
+                                  <p:childTnLst>
+                                    <p:set>
+                                      <p:cBhvr>
+                                        <p:cTn id="23" dur="1" fill="hold">
+                                          <p:stCondLst>
+                                            <p:cond delay="0"/>
+                                          </p:stCondLst>
+                                        </p:cTn>
+                                        <p:tgtEl>
+                                          <p:spTgt spid="14"/>
+                                        </p:tgtEl>
+                                        <p:attrNameLst>
+                                          <p:attrName>style.visibility</p:attrName>
+                                        </p:attrNameLst>
+                                      </p:cBhvr>
+                                      <p:to>
+                                        <p:strVal val="visible"/>
+                                      </p:to>
+                                    </p:set>
+                                    <p:animEffect transition="in" filter="fade">
+                                      <p:cBhvr>
+                                        <p:cTn id="24" dur="500"/>
+                                        <p:tgtEl>
+                                          <p:spTgt spid="14"/>
+                                        </p:tgtEl>
+                                      </p:cBhvr>
+                                    </p:animEffect>
+                                  </p:childTnLst>
+                                </p:cTn>
+                              </p:par>
+                              <p:par>
+                                <p:cTn id="25" presetID="10" presetClass="entr" presetSubtype="0" fill="hold" nodeType="withEffect">
+                                  <p:stCondLst>
+                                    <p:cond delay="0"/>
+                                  </p:stCondLst>
+                                  <p:childTnLst>
+                                    <p:set>
+                                      <p:cBhvr>
+                                        <p:cTn id="26" dur="1" fill="hold">
+                                          <p:stCondLst>
+                                            <p:cond delay="0"/>
+                                          </p:stCondLst>
+                                        </p:cTn>
+                                        <p:tgtEl>
+                                          <p:spTgt spid="15"/>
+                                        </p:tgtEl>
+                                        <p:attrNameLst>
+                                          <p:attrName>style.visibility</p:attrName>
+                                        </p:attrNameLst>
+                                      </p:cBhvr>
+                                      <p:to>
+                                        <p:strVal val="visible"/>
+                                      </p:to>
+                                    </p:set>
+                                    <p:animEffect transition="in" filter="fade">
+                                      <p:cBhvr>
+                                        <p:cTn id="27" dur="500"/>
+                                        <p:tgtEl>
+                                          <p:spTgt spid="15"/>
+                                        </p:tgtEl>
+                                      </p:cBhvr>
+                                    </p:animEffect>
+                                  </p:childTnLst>
+                                </p:cTn>
+                              </p:par>
+                              <p:par>
+                                <p:cTn id="28" presetID="10" presetClass="entr" presetSubtype="0" fill="hold" grpId="0" nodeType="withEffect">
+                                  <p:stCondLst>
+                                    <p:cond delay="0"/>
+                                  </p:stCondLst>
+                                  <p:childTnLst>
+                                    <p:set>
+                                      <p:cBhvr>
+                                        <p:cTn id="29" dur="1" fill="hold">
+                                          <p:stCondLst>
+                                            <p:cond delay="0"/>
+                                          </p:stCondLst>
+                                        </p:cTn>
+                                        <p:tgtEl>
+                                          <p:spTgt spid="16"/>
+                                        </p:tgtEl>
+                                        <p:attrNameLst>
+                                          <p:attrName>style.visibility</p:attrName>
+                                        </p:attrNameLst>
+                                      </p:cBhvr>
+                                      <p:to>
+                                        <p:strVal val="visible"/>
+                                      </p:to>
+                                    </p:set>
+                                    <p:animEffect transition="in" filter="fade">
+                                      <p:cBhvr>
+                                        <p:cTn id="30" dur="500"/>
+                                        <p:tgtEl>
+                                          <p:spTgt spid="16"/>
+                                        </p:tgtEl>
+                                      </p:cBhvr>
+                                    </p:animEffect>
+                                  </p:childTnLst>
+                                </p:cTn>
+                              </p:par>
+                              <p:par>
+                                <p:cTn id="31" presetID="10" presetClass="entr" presetSubtype="0" fill="hold" grpId="0" nodeType="withEffect">
+                                  <p:stCondLst>
+                                    <p:cond delay="0"/>
+                                  </p:stCondLst>
+                                  <p:childTnLst>
+                                    <p:set>
+                                      <p:cBhvr>
+                                        <p:cTn id="32" dur="1" fill="hold">
+                                          <p:stCondLst>
+                                            <p:cond delay="0"/>
+                                          </p:stCondLst>
+                                        </p:cTn>
+                                        <p:tgtEl>
+                                          <p:spTgt spid="17"/>
+                                        </p:tgtEl>
+                                        <p:attrNameLst>
+                                          <p:attrName>style.visibility</p:attrName>
+                                        </p:attrNameLst>
+                                      </p:cBhvr>
+                                      <p:to>
+                                        <p:strVal val="visible"/>
+                                      </p:to>
+                                    </p:set>
+                                    <p:animEffect transition="in" filter="fade">
+                                      <p:cBhvr>
+                                        <p:cTn id="33" dur="500"/>
+                                        <p:tgtEl>
+                                          <p:spTgt spid="17"/>
+                                        </p:tgtEl>
+                                      </p:cBhvr>
+                                    </p:animEffect>
+                                  </p:childTnLst>
+                                </p:cTn>
+                              </p:par>
+                              <p:par>
+                                <p:cTn id="34" presetID="10" presetClass="entr" presetSubtype="0" fill="hold" grpId="0" nodeType="withEffect">
+                                  <p:stCondLst>
+                                    <p:cond delay="0"/>
+                                  </p:stCondLst>
+                                  <p:childTnLst>
+                                    <p:set>
+                                      <p:cBhvr>
+                                        <p:cTn id="35" dur="1" fill="hold">
+                                          <p:stCondLst>
+                                            <p:cond delay="0"/>
+                                          </p:stCondLst>
+                                        </p:cTn>
+                                        <p:tgtEl>
+                                          <p:spTgt spid="18"/>
+                                        </p:tgtEl>
+                                        <p:attrNameLst>
+                                          <p:attrName>style.visibility</p:attrName>
+                                        </p:attrNameLst>
+                                      </p:cBhvr>
+                                      <p:to>
+                                        <p:strVal val="visible"/>
+                                      </p:to>
+                                    </p:set>
+                                    <p:animEffect transition="in" filter="fade">
+                                      <p:cBhvr>
+                                        <p:cTn id="36" dur="500"/>
+                                        <p:tgtEl>
+                                          <p:spTgt spid="18"/>
+                                        </p:tgtEl>
+                                      </p:cBhvr>
+                                    </p:animEffect>
+                                  </p:childTnLst>
+                                </p:cTn>
+                              </p:par>
+                              <p:par>
+                                <p:cTn id="37" presetID="10" presetClass="entr" presetSubtype="0" fill="hold" nodeType="withEffect">
+                                  <p:stCondLst>
+                                    <p:cond delay="0"/>
+                                  </p:stCondLst>
+                                  <p:childTnLst>
+                                    <p:set>
+                                      <p:cBhvr>
+                                        <p:cTn id="38" dur="1" fill="hold">
+                                          <p:stCondLst>
+                                            <p:cond delay="0"/>
+                                          </p:stCondLst>
+                                        </p:cTn>
+                                        <p:tgtEl>
+                                          <p:spTgt spid="19"/>
+                                        </p:tgtEl>
+                                        <p:attrNameLst>
+                                          <p:attrName>style.visibility</p:attrName>
+                                        </p:attrNameLst>
+                                      </p:cBhvr>
+                                      <p:to>
+                                        <p:strVal val="visible"/>
+                                      </p:to>
+                                    </p:set>
+                                    <p:animEffect transition="in" filter="fade">
+                                      <p:cBhvr>
+                                        <p:cTn id="39" dur="500"/>
+                                        <p:tgtEl>
+                                          <p:spTgt spid="19"/>
+                                        </p:tgtEl>
+                                      </p:cBhvr>
+                                    </p:animEffect>
+                                  </p:childTnLst>
+                                </p:cTn>
+                              </p:par>
+                            </p:childTnLst>
+                          </p:cTn>
+                        </p:par>
+                      </p:childTnLst>
+                    </p:cTn>
+                  </p:par>
+                  <p:par>
+                    <p:cTn id="40" fill="hold">
+                      <p:stCondLst>
+                        <p:cond delay="indefinite"/>
+                      </p:stCondLst>
+                      <p:childTnLst>
+                        <p:par>
+                          <p:cTn id="41" fill="hold">
+                            <p:stCondLst>
+                              <p:cond delay="0"/>
+                            </p:stCondLst>
+                            <p:childTnLst>
+                              <p:par>
+                                <p:cTn id="42" presetID="10" presetClass="entr" presetSubtype="0" fill="hold" nodeType="clickEffect">
+                                  <p:stCondLst>
+                                    <p:cond delay="0"/>
+                                  </p:stCondLst>
+                                  <p:childTnLst>
+                                    <p:set>
+                                      <p:cBhvr>
+                                        <p:cTn id="43" dur="1" fill="hold">
+                                          <p:stCondLst>
+                                            <p:cond delay="0"/>
+                                          </p:stCondLst>
+                                        </p:cTn>
+                                        <p:tgtEl>
+                                          <p:spTgt spid="21"/>
+                                        </p:tgtEl>
+                                        <p:attrNameLst>
+                                          <p:attrName>style.visibility</p:attrName>
+                                        </p:attrNameLst>
+                                      </p:cBhvr>
+                                      <p:to>
+                                        <p:strVal val="visible"/>
+                                      </p:to>
+                                    </p:set>
+                                    <p:animEffect transition="in" filter="fade">
+                                      <p:cBhvr>
+                                        <p:cTn id="44" dur="500"/>
+                                        <p:tgtEl>
+                                          <p:spTgt spid="21"/>
+                                        </p:tgtEl>
+                                      </p:cBhvr>
+                                    </p:animEffect>
+                                  </p:childTnLst>
+                                </p:cTn>
+                              </p:par>
+                              <p:par>
+                                <p:cTn id="45" presetID="10" presetClass="entr" presetSubtype="0" fill="hold" nodeType="withEffect">
+                                  <p:stCondLst>
+                                    <p:cond delay="0"/>
+                                  </p:stCondLst>
+                                  <p:childTnLst>
+                                    <p:set>
+                                      <p:cBhvr>
+                                        <p:cTn id="46" dur="1" fill="hold">
+                                          <p:stCondLst>
+                                            <p:cond delay="0"/>
+                                          </p:stCondLst>
+                                        </p:cTn>
+                                        <p:tgtEl>
+                                          <p:spTgt spid="20"/>
+                                        </p:tgtEl>
+                                        <p:attrNameLst>
+                                          <p:attrName>style.visibility</p:attrName>
+                                        </p:attrNameLst>
+                                      </p:cBhvr>
+                                      <p:to>
+                                        <p:strVal val="visible"/>
+                                      </p:to>
+                                    </p:set>
+                                    <p:animEffect transition="in" filter="fade">
+                                      <p:cBhvr>
+                                        <p:cTn id="47" dur="500"/>
+                                        <p:tgtEl>
+                                          <p:spTgt spid="20"/>
+                                        </p:tgtEl>
+                                      </p:cBhvr>
+                                    </p:animEffect>
+                                  </p:childTnLst>
+                                </p:cTn>
+                              </p:par>
+                              <p:par>
+                                <p:cTn id="48" presetID="10" presetClass="entr" presetSubtype="0" fill="hold" grpId="0" nodeType="withEffect">
+                                  <p:stCondLst>
+                                    <p:cond delay="0"/>
+                                  </p:stCondLst>
+                                  <p:childTnLst>
+                                    <p:set>
+                                      <p:cBhvr>
+                                        <p:cTn id="49" dur="1" fill="hold">
+                                          <p:stCondLst>
+                                            <p:cond delay="0"/>
+                                          </p:stCondLst>
+                                        </p:cTn>
+                                        <p:tgtEl>
+                                          <p:spTgt spid="27"/>
+                                        </p:tgtEl>
+                                        <p:attrNameLst>
+                                          <p:attrName>style.visibility</p:attrName>
+                                        </p:attrNameLst>
+                                      </p:cBhvr>
+                                      <p:to>
+                                        <p:strVal val="visible"/>
+                                      </p:to>
+                                    </p:set>
+                                    <p:animEffect transition="in" filter="fade">
+                                      <p:cBhvr>
+                                        <p:cTn id="50" dur="500"/>
+                                        <p:tgtEl>
+                                          <p:spTgt spid="27"/>
+                                        </p:tgtEl>
+                                      </p:cBhvr>
+                                    </p:animEffect>
+                                  </p:childTnLst>
+                                </p:cTn>
+                              </p:par>
+                            </p:childTnLst>
+                          </p:cTn>
+                        </p:par>
+                      </p:childTnLst>
+                    </p:cTn>
+                  </p:par>
+                </p:childTnLst>
+              </p:cTn>
+              <p:prevCondLst>
+                <p:cond evt="onPrev" delay="0">
+                  <p:tgtEl>
+                    <p:sldTgt/>
+                  </p:tgtEl>
+                </p:cond>
+              </p:prevCondLst>
+              <p:nextCondLst>
+                <p:cond evt="onNext" delay="0">
+                  <p:tgtEl>
+                    <p:sldTgt/>
+                  </p:tgtEl>
+                </p:cond>
+              </p:nextCondLst>
+            </p:seq>
+          </p:childTnLst>
+        </p:cTn>
+      </p:par>
+    </p:tnLst>
+    <p:bldLst>
+      <p:bldP spid="10" grpId="0" animBg="1"/>
+      <p:bldP spid="16" grpId="0"/>
+      <p:bldP spid="17" grpId="0"/>
+      <p:bldP spid="18" grpId="0" animBg="1"/>
+      <p:bldP spid="27" grpId="0" animBg="1"/>
+    </p:bldLst>
+  </p:timing>
+</p:sld>
+</file>
+
+<file path=ppt/slides/slide4.xml><?xml version="1.0" encoding="utf-8"?>
+<p:sld xmlns:a="http://schemas.openxmlformats.org/drawingml/2006/main" xmlns:r="http://schemas.openxmlformats.org/officeDocument/2006/relationships" xmlns:p="http://schemas.openxmlformats.org/presentationml/2006/main">
+  <p:cSld>
+    <p:spTree>
+      <p:nvGrpSpPr>
+        <p:cNvPr id="1" name=""/>
+        <p:cNvGrpSpPr/>
+        <p:nvPr/>
+      </p:nvGrpSpPr>
+      <p:grpSpPr>
+        <a:xfrm>
+          <a:off x="0" y="0"/>
+          <a:ext cx="0" cy="0"/>
+          <a:chOff x="0" y="0"/>
+          <a:chExt cx="0" cy="0"/>
+        </a:xfrm>
+      </p:grpSpPr>
+      <p:sp>
+        <p:nvSpPr>
+          <p:cNvPr id="2" name="Titre 1">
+            <a:extLst>
+              <a:ext uri="{FF2B5EF4-FFF2-40B4-BE49-F238E27FC236}">
+                <a16:creationId xmlns:a16="http://schemas.microsoft.com/office/drawing/2014/main" id="{71889CED-957C-DE18-0996-5264CD0284F0}"/>
+              </a:ext>
+            </a:extLst>
+          </p:cNvPr>
+          <p:cNvSpPr>
+            <a:spLocks noGrp="1"/>
+          </p:cNvSpPr>
+          <p:nvPr>
+            <p:ph type="title"/>
+          </p:nvPr>
+        </p:nvSpPr>
+        <p:spPr>
+          <a:xfrm>
+            <a:off x="1066800" y="424561"/>
+            <a:ext cx="10058400" cy="749808"/>
+          </a:xfrm>
+        </p:spPr>
+        <p:txBody>
+          <a:bodyPr>
+            <a:normAutofit fontScale="90000"/>
+          </a:bodyPr>
+          <a:lstStyle/>
+          <a:p>
+            <a:r>
+              <a:rPr lang="fr-CH" dirty="0"/>
+              <a:t>GUI</a:t>
+            </a:r>
+          </a:p>
+        </p:txBody>
+      </p:sp>
+      <p:sp>
+        <p:nvSpPr>
+          <p:cNvPr id="4" name="Espace réservé du pied de page 3">
+            <a:extLst>
+              <a:ext uri="{FF2B5EF4-FFF2-40B4-BE49-F238E27FC236}">
+                <a16:creationId xmlns:a16="http://schemas.microsoft.com/office/drawing/2014/main" id="{A97F0B2A-0A35-04A6-C5F1-655E4B92EB0C}"/>
+              </a:ext>
+            </a:extLst>
+          </p:cNvPr>
+          <p:cNvSpPr>
+            <a:spLocks noGrp="1"/>
+          </p:cNvSpPr>
+          <p:nvPr>
+            <p:ph type="ftr" sz="quarter" idx="11"/>
+          </p:nvPr>
+        </p:nvSpPr>
+        <p:spPr/>
+        <p:txBody>
+          <a:bodyPr/>
+          <a:lstStyle/>
+          <a:p>
+            <a:r>
+              <a:rPr lang="en-US"/>
+              <a:t>Hyperdrive project 2023 - Group D</a:t>
+            </a:r>
+            <a:endParaRPr lang="en-US" dirty="0"/>
+          </a:p>
+        </p:txBody>
+      </p:sp>
+      <p:sp>
+        <p:nvSpPr>
+          <p:cNvPr id="5" name="Espace réservé du numéro de diapositive 4">
+            <a:extLst>
+              <a:ext uri="{FF2B5EF4-FFF2-40B4-BE49-F238E27FC236}">
+                <a16:creationId xmlns:a16="http://schemas.microsoft.com/office/drawing/2014/main" id="{443FB19D-4432-3E9A-4659-B1FAEEF4D828}"/>
+              </a:ext>
+            </a:extLst>
+          </p:cNvPr>
+          <p:cNvSpPr>
+            <a:spLocks noGrp="1"/>
+          </p:cNvSpPr>
+          <p:nvPr>
+            <p:ph type="sldNum" sz="quarter" idx="12"/>
+          </p:nvPr>
+        </p:nvSpPr>
+        <p:spPr/>
+        <p:txBody>
+          <a:bodyPr/>
+          <a:lstStyle/>
+          <a:p>
+            <a:fld id="{6D22F896-40B5-4ADD-8801-0D06FADFA095}" type="slidenum">
+              <a:rPr lang="en-US" smtClean="0"/>
+              <a:t>4</a:t>
+            </a:fld>
+            <a:endParaRPr lang="en-US" dirty="0"/>
+          </a:p>
+        </p:txBody>
+      </p:sp>
       <p:sp>
         <p:nvSpPr>
           <p:cNvPr id="8" name="Titre 1">
@@ -5176,8 +7188,8 @@
         </p:nvSpPr>
         <p:spPr>
           <a:xfrm>
-            <a:off x="1088136" y="1522633"/>
-            <a:ext cx="5647470" cy="749808"/>
+            <a:off x="931679" y="1044366"/>
+            <a:ext cx="3914641" cy="749808"/>
           </a:xfrm>
           <a:prstGeom prst="rect">
             <a:avLst/>
@@ -5214,6 +7226,7 @@
             </a:lvl1pPr>
           </a:lstStyle>
           <a:p>
+            <a:pPr algn="ctr"/>
             <a:r>
               <a:rPr lang="fr-CH" sz="3200" dirty="0"/>
               <a:t>Python (uses </a:t>
@@ -5245,8 +7258,8 @@
         </p:nvSpPr>
         <p:spPr>
           <a:xfrm>
-            <a:off x="5899909" y="1520425"/>
-            <a:ext cx="5647470" cy="749808"/>
+            <a:off x="5429777" y="1044366"/>
+            <a:ext cx="5966968" cy="749808"/>
           </a:xfrm>
           <a:prstGeom prst="rect">
             <a:avLst/>
@@ -5283,6 +7296,7 @@
             </a:lvl1pPr>
           </a:lstStyle>
           <a:p>
+            <a:pPr algn="ctr"/>
             <a:r>
               <a:rPr lang="fr-CH" sz="3200" dirty="0"/>
               <a:t>Java (uses Swing)</a:t>
@@ -5314,9 +7328,39 @@
         </p:blipFill>
         <p:spPr>
           <a:xfrm>
-            <a:off x="5743452" y="2270233"/>
-            <a:ext cx="5659116" cy="3716866"/>
+            <a:off x="5429777" y="2007078"/>
+            <a:ext cx="5966968" cy="3919061"/>
           </a:xfrm>
+        </p:spPr>
+      </p:pic>
+      <p:pic>
+        <p:nvPicPr>
+          <p:cNvPr id="6" name="Image 5" descr="Une image contenant texte, capture d’écran, Police, conception&#10;&#10;Description générée automatiquement">
+            <a:extLst>
+              <a:ext uri="{FF2B5EF4-FFF2-40B4-BE49-F238E27FC236}">
+                <a16:creationId xmlns:a16="http://schemas.microsoft.com/office/drawing/2014/main" id="{D090D852-1A54-78C9-8348-7A54800DD64C}"/>
+              </a:ext>
+            </a:extLst>
+          </p:cNvPr>
+          <p:cNvPicPr>
+            <a:picLocks noChangeAspect="1"/>
+          </p:cNvPicPr>
+          <p:nvPr/>
+        </p:nvPicPr>
+        <p:blipFill>
+          <a:blip r:embed="rId4"/>
+          <a:stretch>
+            <a:fillRect/>
+          </a:stretch>
+        </p:blipFill>
+        <p:spPr>
+          <a:xfrm>
+            <a:off x="931679" y="1631698"/>
+            <a:ext cx="3914641" cy="4643780"/>
+          </a:xfrm>
+          <a:prstGeom prst="rect">
+            <a:avLst/>
+          </a:prstGeom>
         </p:spPr>
       </p:pic>
     </p:spTree>
@@ -5332,7 +7376,7 @@
 </p:sld>
 </file>
 
-<file path=ppt/slides/slide4.xml><?xml version="1.0" encoding="utf-8"?>
+<file path=ppt/slides/slide5.xml><?xml version="1.0" encoding="utf-8"?>
 <p:sld xmlns:a="http://schemas.openxmlformats.org/drawingml/2006/main" xmlns:r="http://schemas.openxmlformats.org/officeDocument/2006/relationships" xmlns:p="http://schemas.openxmlformats.org/presentationml/2006/main">
   <p:cSld>
     <p:spTree>
@@ -5436,7 +7480,7 @@
           <a:p>
             <a:fld id="{6D22F896-40B5-4ADD-8801-0D06FADFA095}" type="slidenum">
               <a:rPr lang="en-US" smtClean="0"/>
-              <a:t>4</a:t>
+              <a:t>5</a:t>
             </a:fld>
             <a:endParaRPr lang="en-US" dirty="0"/>
           </a:p>
@@ -9387,7 +11431,7 @@
 </p:sld>
 </file>
 
-<file path=ppt/slides/slide5.xml><?xml version="1.0" encoding="utf-8"?>
+<file path=ppt/slides/slide6.xml><?xml version="1.0" encoding="utf-8"?>
 <p:sld xmlns:a="http://schemas.openxmlformats.org/drawingml/2006/main" xmlns:r="http://schemas.openxmlformats.org/officeDocument/2006/relationships" xmlns:p="http://schemas.openxmlformats.org/presentationml/2006/main">
   <p:cSld>
     <p:spTree>
@@ -9404,6 +11448,78 @@
           <a:chExt cx="0" cy="0"/>
         </a:xfrm>
       </p:grpSpPr>
+      <p:pic>
+        <p:nvPicPr>
+          <p:cNvPr id="21" name="Graphique 20" descr="Un coup de pinceau">
+            <a:extLst>
+              <a:ext uri="{FF2B5EF4-FFF2-40B4-BE49-F238E27FC236}">
+                <a16:creationId xmlns:a16="http://schemas.microsoft.com/office/drawing/2014/main" id="{B98CC158-633F-525B-0557-F83256378929}"/>
+              </a:ext>
+            </a:extLst>
+          </p:cNvPr>
+          <p:cNvPicPr>
+            <a:picLocks noChangeAspect="1"/>
+          </p:cNvPicPr>
+          <p:nvPr/>
+        </p:nvPicPr>
+        <p:blipFill>
+          <a:blip r:embed="rId2">
+            <a:extLst>
+              <a:ext uri="{96DAC541-7B7A-43D3-8B79-37D633B846F1}">
+                <asvg:svgBlip xmlns:asvg="http://schemas.microsoft.com/office/drawing/2016/SVG/main" r:embed="rId3"/>
+              </a:ext>
+            </a:extLst>
+          </a:blip>
+          <a:stretch>
+            <a:fillRect/>
+          </a:stretch>
+        </p:blipFill>
+        <p:spPr>
+          <a:xfrm>
+            <a:off x="1806" y="241444"/>
+            <a:ext cx="2157220" cy="4027042"/>
+          </a:xfrm>
+          <a:prstGeom prst="rect">
+            <a:avLst/>
+          </a:prstGeom>
+        </p:spPr>
+      </p:pic>
+      <p:pic>
+        <p:nvPicPr>
+          <p:cNvPr id="16" name="Graphique 15" descr="Un coup de pinceau">
+            <a:extLst>
+              <a:ext uri="{FF2B5EF4-FFF2-40B4-BE49-F238E27FC236}">
+                <a16:creationId xmlns:a16="http://schemas.microsoft.com/office/drawing/2014/main" id="{2D30F1AD-B2FC-8B5F-78E3-E28F43C57C27}"/>
+              </a:ext>
+            </a:extLst>
+          </p:cNvPr>
+          <p:cNvPicPr>
+            <a:picLocks noChangeAspect="1"/>
+          </p:cNvPicPr>
+          <p:nvPr/>
+        </p:nvPicPr>
+        <p:blipFill>
+          <a:blip r:embed="rId4">
+            <a:extLst>
+              <a:ext uri="{96DAC541-7B7A-43D3-8B79-37D633B846F1}">
+                <asvg:svgBlip xmlns:asvg="http://schemas.microsoft.com/office/drawing/2016/SVG/main" r:embed="rId5"/>
+              </a:ext>
+            </a:extLst>
+          </a:blip>
+          <a:stretch>
+            <a:fillRect/>
+          </a:stretch>
+        </p:blipFill>
+        <p:spPr>
+          <a:xfrm>
+            <a:off x="41796" y="2303955"/>
+            <a:ext cx="2157220" cy="4027042"/>
+          </a:xfrm>
+          <a:prstGeom prst="rect">
+            <a:avLst/>
+          </a:prstGeom>
+        </p:spPr>
+      </p:pic>
       <p:sp>
         <p:nvSpPr>
           <p:cNvPr id="2" name="Titre 1">
@@ -9498,7 +11614,7 @@
           <a:p>
             <a:fld id="{6D22F896-40B5-4ADD-8801-0D06FADFA095}" type="slidenum">
               <a:rPr lang="en-US" smtClean="0"/>
-              <a:t>5</a:t>
+              <a:t>6</a:t>
             </a:fld>
             <a:endParaRPr lang="en-US" dirty="0"/>
           </a:p>
@@ -9647,113 +11763,6 @@
       </p:sp>
       <p:sp>
         <p:nvSpPr>
-          <p:cNvPr id="12" name="Flèche : pentagone 11">
-            <a:extLst>
-              <a:ext uri="{FF2B5EF4-FFF2-40B4-BE49-F238E27FC236}">
-                <a16:creationId xmlns:a16="http://schemas.microsoft.com/office/drawing/2014/main" id="{3B18238C-0DBD-7A4A-1645-CCFEBF9DE7EA}"/>
-              </a:ext>
-            </a:extLst>
-          </p:cNvPr>
-          <p:cNvSpPr/>
-          <p:nvPr/>
-        </p:nvSpPr>
-        <p:spPr>
-          <a:xfrm>
-            <a:off x="826674" y="2028869"/>
-            <a:ext cx="1313688" cy="467360"/>
-          </a:xfrm>
-          <a:prstGeom prst="homePlate">
-            <a:avLst/>
-          </a:prstGeom>
-        </p:spPr>
-        <p:style>
-          <a:lnRef idx="3">
-            <a:schemeClr val="lt1"/>
-          </a:lnRef>
-          <a:fillRef idx="1">
-            <a:schemeClr val="accent1"/>
-          </a:fillRef>
-          <a:effectRef idx="1">
-            <a:schemeClr val="accent1"/>
-          </a:effectRef>
-          <a:fontRef idx="minor">
-            <a:schemeClr val="lt1"/>
-          </a:fontRef>
-        </p:style>
-        <p:txBody>
-          <a:bodyPr rtlCol="0" anchor="ctr"/>
-          <a:lstStyle/>
-          <a:p>
-            <a:pPr algn="ctr"/>
-            <a:r>
-              <a:rPr lang="fr-CH" sz="1400" dirty="0" err="1"/>
-              <a:t>Steer</a:t>
-            </a:r>
-            <a:endParaRPr lang="fr-CH" dirty="0"/>
-          </a:p>
-        </p:txBody>
-      </p:sp>
-      <p:sp>
-        <p:nvSpPr>
-          <p:cNvPr id="13" name="Flèche : pentagone 12">
-            <a:extLst>
-              <a:ext uri="{FF2B5EF4-FFF2-40B4-BE49-F238E27FC236}">
-                <a16:creationId xmlns:a16="http://schemas.microsoft.com/office/drawing/2014/main" id="{292E8436-2E55-23C5-0587-BEDB26D0D5EB}"/>
-              </a:ext>
-            </a:extLst>
-          </p:cNvPr>
-          <p:cNvSpPr/>
-          <p:nvPr/>
-        </p:nvSpPr>
-        <p:spPr>
-          <a:xfrm>
-            <a:off x="826674" y="4194981"/>
-            <a:ext cx="1313688" cy="619760"/>
-          </a:xfrm>
-          <a:prstGeom prst="homePlate">
-            <a:avLst/>
-          </a:prstGeom>
-        </p:spPr>
-        <p:style>
-          <a:lnRef idx="3">
-            <a:schemeClr val="lt1"/>
-          </a:lnRef>
-          <a:fillRef idx="1">
-            <a:schemeClr val="accent1"/>
-          </a:fillRef>
-          <a:effectRef idx="1">
-            <a:schemeClr val="accent1"/>
-          </a:effectRef>
-          <a:fontRef idx="minor">
-            <a:schemeClr val="lt1"/>
-          </a:fontRef>
-        </p:style>
-        <p:txBody>
-          <a:bodyPr rtlCol="0" anchor="ctr"/>
-          <a:lstStyle/>
-          <a:p>
-            <a:pPr algn="ctr"/>
-            <a:r>
-              <a:rPr lang="fr-CH" sz="1400" dirty="0" err="1"/>
-              <a:t>Retrieve</a:t>
-            </a:r>
-            <a:r>
-              <a:rPr lang="fr-CH" sz="1400" dirty="0"/>
-              <a:t> </a:t>
-            </a:r>
-            <a:r>
-              <a:rPr lang="fr-CH" sz="1400" dirty="0" err="1"/>
-              <a:t>vehicle</a:t>
-            </a:r>
-            <a:r>
-              <a:rPr lang="fr-CH" sz="1400" dirty="0"/>
-              <a:t> info</a:t>
-            </a:r>
-          </a:p>
-        </p:txBody>
-      </p:sp>
-      <p:sp>
-        <p:nvSpPr>
           <p:cNvPr id="14" name="ZoneTexte 13">
             <a:extLst>
               <a:ext uri="{FF2B5EF4-FFF2-40B4-BE49-F238E27FC236}">
@@ -9886,10 +11895,10 @@
           <p:nvPr/>
         </p:nvPicPr>
         <p:blipFill>
-          <a:blip r:embed="rId2">
+          <a:blip r:embed="rId6">
             <a:extLst>
               <a:ext uri="{96DAC541-7B7A-43D3-8B79-37D633B846F1}">
-                <asvg:svgBlip xmlns:asvg="http://schemas.microsoft.com/office/drawing/2016/SVG/main" r:embed="rId3"/>
+                <asvg:svgBlip xmlns:asvg="http://schemas.microsoft.com/office/drawing/2016/SVG/main" r:embed="rId7"/>
               </a:ext>
             </a:extLst>
           </a:blip>
@@ -9922,10 +11931,10 @@
           <p:nvPr/>
         </p:nvPicPr>
         <p:blipFill>
-          <a:blip r:embed="rId4">
+          <a:blip r:embed="rId8">
             <a:extLst>
               <a:ext uri="{96DAC541-7B7A-43D3-8B79-37D633B846F1}">
-                <asvg:svgBlip xmlns:asvg="http://schemas.microsoft.com/office/drawing/2016/SVG/main" r:embed="rId5"/>
+                <asvg:svgBlip xmlns:asvg="http://schemas.microsoft.com/office/drawing/2016/SVG/main" r:embed="rId9"/>
               </a:ext>
             </a:extLst>
           </a:blip>
@@ -9958,10 +11967,10 @@
           <p:nvPr/>
         </p:nvPicPr>
         <p:blipFill>
-          <a:blip r:embed="rId6">
+          <a:blip r:embed="rId10">
             <a:extLst>
               <a:ext uri="{96DAC541-7B7A-43D3-8B79-37D633B846F1}">
-                <asvg:svgBlip xmlns:asvg="http://schemas.microsoft.com/office/drawing/2016/SVG/main" r:embed="rId7"/>
+                <asvg:svgBlip xmlns:asvg="http://schemas.microsoft.com/office/drawing/2016/SVG/main" r:embed="rId11"/>
               </a:ext>
             </a:extLst>
           </a:blip>
@@ -9994,10 +12003,10 @@
           <p:nvPr/>
         </p:nvPicPr>
         <p:blipFill>
-          <a:blip r:embed="rId8">
+          <a:blip r:embed="rId12">
             <a:extLst>
               <a:ext uri="{96DAC541-7B7A-43D3-8B79-37D633B846F1}">
-                <asvg:svgBlip xmlns:asvg="http://schemas.microsoft.com/office/drawing/2016/SVG/main" r:embed="rId9"/>
+                <asvg:svgBlip xmlns:asvg="http://schemas.microsoft.com/office/drawing/2016/SVG/main" r:embed="rId13"/>
               </a:ext>
             </a:extLst>
           </a:blip>
@@ -10015,287 +12024,6 @@
           </a:prstGeom>
         </p:spPr>
       </p:pic>
-      <p:sp>
-        <p:nvSpPr>
-          <p:cNvPr id="32" name="Espace réservé du contenu 2">
-            <a:extLst>
-              <a:ext uri="{FF2B5EF4-FFF2-40B4-BE49-F238E27FC236}">
-                <a16:creationId xmlns:a16="http://schemas.microsoft.com/office/drawing/2014/main" id="{76502CCF-B178-CE0B-3479-BEDC9C3D9CC5}"/>
-              </a:ext>
-            </a:extLst>
-          </p:cNvPr>
-          <p:cNvSpPr txBox="1">
-            <a:spLocks/>
-          </p:cNvSpPr>
-          <p:nvPr/>
-        </p:nvSpPr>
-        <p:spPr>
-          <a:xfrm>
-            <a:off x="826674" y="1471374"/>
-            <a:ext cx="1313688" cy="637094"/>
-          </a:xfrm>
-          <a:prstGeom prst="rect">
-            <a:avLst/>
-          </a:prstGeom>
-        </p:spPr>
-        <p:txBody>
-          <a:bodyPr vert="horz" lIns="91440" tIns="45720" rIns="91440" bIns="45720" rtlCol="0">
-            <a:normAutofit/>
-          </a:bodyPr>
-          <a:lstStyle>
-            <a:lvl1pPr marL="182880" indent="-182880" algn="l" defTabSz="914400" rtl="0" eaLnBrk="1" latinLnBrk="0" hangingPunct="1">
-              <a:lnSpc>
-                <a:spcPct val="90000"/>
-              </a:lnSpc>
-              <a:spcBef>
-                <a:spcPts val="1200"/>
-              </a:spcBef>
-              <a:buClr>
-                <a:schemeClr val="accent1">
-                  <a:lumMod val="75000"/>
-                </a:schemeClr>
-              </a:buClr>
-              <a:buSzPct val="85000"/>
-              <a:buFont typeface="Wingdings" pitchFamily="2" charset="2"/>
-              <a:buChar char="§"/>
-              <a:defRPr sz="2000" kern="1200">
-                <a:solidFill>
-                  <a:schemeClr val="tx1"/>
-                </a:solidFill>
-                <a:latin typeface="+mn-lt"/>
-                <a:ea typeface="+mn-ea"/>
-                <a:cs typeface="+mn-cs"/>
-              </a:defRPr>
-            </a:lvl1pPr>
-            <a:lvl2pPr marL="457200" indent="-182880" algn="l" defTabSz="914400" rtl="0" eaLnBrk="1" latinLnBrk="0" hangingPunct="1">
-              <a:lnSpc>
-                <a:spcPct val="90000"/>
-              </a:lnSpc>
-              <a:spcBef>
-                <a:spcPts val="400"/>
-              </a:spcBef>
-              <a:spcAft>
-                <a:spcPts val="200"/>
-              </a:spcAft>
-              <a:buClr>
-                <a:schemeClr val="accent1">
-                  <a:lumMod val="75000"/>
-                </a:schemeClr>
-              </a:buClr>
-              <a:buSzPct val="85000"/>
-              <a:buFont typeface="Wingdings" pitchFamily="2" charset="2"/>
-              <a:buChar char="§"/>
-              <a:defRPr sz="1800" kern="1200">
-                <a:solidFill>
-                  <a:schemeClr val="tx1"/>
-                </a:solidFill>
-                <a:latin typeface="+mn-lt"/>
-                <a:ea typeface="+mn-ea"/>
-                <a:cs typeface="+mn-cs"/>
-              </a:defRPr>
-            </a:lvl2pPr>
-            <a:lvl3pPr marL="731520" indent="-182880" algn="l" defTabSz="914400" rtl="0" eaLnBrk="1" latinLnBrk="0" hangingPunct="1">
-              <a:lnSpc>
-                <a:spcPct val="90000"/>
-              </a:lnSpc>
-              <a:spcBef>
-                <a:spcPts val="400"/>
-              </a:spcBef>
-              <a:spcAft>
-                <a:spcPts val="200"/>
-              </a:spcAft>
-              <a:buClr>
-                <a:schemeClr val="accent1">
-                  <a:lumMod val="75000"/>
-                </a:schemeClr>
-              </a:buClr>
-              <a:buSzPct val="85000"/>
-              <a:buFont typeface="Wingdings" pitchFamily="2" charset="2"/>
-              <a:buChar char="§"/>
-              <a:defRPr sz="1600" kern="1200">
-                <a:solidFill>
-                  <a:schemeClr val="tx1"/>
-                </a:solidFill>
-                <a:latin typeface="+mn-lt"/>
-                <a:ea typeface="+mn-ea"/>
-                <a:cs typeface="+mn-cs"/>
-              </a:defRPr>
-            </a:lvl3pPr>
-            <a:lvl4pPr marL="1005840" indent="-182880" algn="l" defTabSz="914400" rtl="0" eaLnBrk="1" latinLnBrk="0" hangingPunct="1">
-              <a:lnSpc>
-                <a:spcPct val="90000"/>
-              </a:lnSpc>
-              <a:spcBef>
-                <a:spcPts val="400"/>
-              </a:spcBef>
-              <a:spcAft>
-                <a:spcPts val="200"/>
-              </a:spcAft>
-              <a:buClr>
-                <a:schemeClr val="accent1">
-                  <a:lumMod val="75000"/>
-                </a:schemeClr>
-              </a:buClr>
-              <a:buSzPct val="85000"/>
-              <a:buFont typeface="Wingdings" pitchFamily="2" charset="2"/>
-              <a:buChar char="§"/>
-              <a:defRPr sz="1600" kern="1200">
-                <a:solidFill>
-                  <a:schemeClr val="tx1"/>
-                </a:solidFill>
-                <a:latin typeface="+mn-lt"/>
-                <a:ea typeface="+mn-ea"/>
-                <a:cs typeface="+mn-cs"/>
-              </a:defRPr>
-            </a:lvl4pPr>
-            <a:lvl5pPr marL="1280160" indent="-182880" algn="l" defTabSz="914400" rtl="0" eaLnBrk="1" latinLnBrk="0" hangingPunct="1">
-              <a:lnSpc>
-                <a:spcPct val="90000"/>
-              </a:lnSpc>
-              <a:spcBef>
-                <a:spcPts val="400"/>
-              </a:spcBef>
-              <a:spcAft>
-                <a:spcPts val="200"/>
-              </a:spcAft>
-              <a:buClr>
-                <a:schemeClr val="accent1">
-                  <a:lumMod val="75000"/>
-                </a:schemeClr>
-              </a:buClr>
-              <a:buSzPct val="85000"/>
-              <a:buFont typeface="Wingdings" pitchFamily="2" charset="2"/>
-              <a:buChar char="§"/>
-              <a:defRPr sz="1600" kern="1200">
-                <a:solidFill>
-                  <a:schemeClr val="tx1"/>
-                </a:solidFill>
-                <a:latin typeface="+mn-lt"/>
-                <a:ea typeface="+mn-ea"/>
-                <a:cs typeface="+mn-cs"/>
-              </a:defRPr>
-            </a:lvl5pPr>
-            <a:lvl6pPr marL="1600000" indent="-228600" algn="l" defTabSz="914400" rtl="0" eaLnBrk="1" latinLnBrk="0" hangingPunct="1">
-              <a:lnSpc>
-                <a:spcPct val="90000"/>
-              </a:lnSpc>
-              <a:spcBef>
-                <a:spcPts val="400"/>
-              </a:spcBef>
-              <a:spcAft>
-                <a:spcPts val="200"/>
-              </a:spcAft>
-              <a:buClr>
-                <a:schemeClr val="accent1">
-                  <a:lumMod val="75000"/>
-                </a:schemeClr>
-              </a:buClr>
-              <a:buSzPct val="85000"/>
-              <a:buFont typeface="Wingdings" pitchFamily="2" charset="2"/>
-              <a:buChar char="§"/>
-              <a:defRPr sz="1600" kern="1200">
-                <a:solidFill>
-                  <a:schemeClr val="tx1"/>
-                </a:solidFill>
-                <a:latin typeface="+mn-lt"/>
-                <a:ea typeface="+mn-ea"/>
-                <a:cs typeface="+mn-cs"/>
-              </a:defRPr>
-            </a:lvl6pPr>
-            <a:lvl7pPr marL="1900000" indent="-228600" algn="l" defTabSz="914400" rtl="0" eaLnBrk="1" latinLnBrk="0" hangingPunct="1">
-              <a:lnSpc>
-                <a:spcPct val="90000"/>
-              </a:lnSpc>
-              <a:spcBef>
-                <a:spcPts val="400"/>
-              </a:spcBef>
-              <a:spcAft>
-                <a:spcPts val="200"/>
-              </a:spcAft>
-              <a:buClr>
-                <a:schemeClr val="accent1">
-                  <a:lumMod val="75000"/>
-                </a:schemeClr>
-              </a:buClr>
-              <a:buSzPct val="85000"/>
-              <a:buFont typeface="Wingdings" pitchFamily="2" charset="2"/>
-              <a:buChar char="§"/>
-              <a:defRPr sz="1600" kern="1200">
-                <a:solidFill>
-                  <a:schemeClr val="tx1"/>
-                </a:solidFill>
-                <a:latin typeface="+mn-lt"/>
-                <a:ea typeface="+mn-ea"/>
-                <a:cs typeface="+mn-cs"/>
-              </a:defRPr>
-            </a:lvl7pPr>
-            <a:lvl8pPr marL="2200000" indent="-228600" algn="l" defTabSz="914400" rtl="0" eaLnBrk="1" latinLnBrk="0" hangingPunct="1">
-              <a:lnSpc>
-                <a:spcPct val="90000"/>
-              </a:lnSpc>
-              <a:spcBef>
-                <a:spcPts val="400"/>
-              </a:spcBef>
-              <a:spcAft>
-                <a:spcPts val="200"/>
-              </a:spcAft>
-              <a:buClr>
-                <a:schemeClr val="accent1">
-                  <a:lumMod val="75000"/>
-                </a:schemeClr>
-              </a:buClr>
-              <a:buSzPct val="85000"/>
-              <a:buFont typeface="Wingdings" pitchFamily="2" charset="2"/>
-              <a:buChar char="§"/>
-              <a:defRPr sz="1600" kern="1200">
-                <a:solidFill>
-                  <a:schemeClr val="tx1"/>
-                </a:solidFill>
-                <a:latin typeface="+mn-lt"/>
-                <a:ea typeface="+mn-ea"/>
-                <a:cs typeface="+mn-cs"/>
-              </a:defRPr>
-            </a:lvl8pPr>
-            <a:lvl9pPr marL="2500000" indent="-228600" algn="l" defTabSz="914400" rtl="0" eaLnBrk="1" latinLnBrk="0" hangingPunct="1">
-              <a:lnSpc>
-                <a:spcPct val="90000"/>
-              </a:lnSpc>
-              <a:spcBef>
-                <a:spcPts val="400"/>
-              </a:spcBef>
-              <a:spcAft>
-                <a:spcPts val="200"/>
-              </a:spcAft>
-              <a:buClr>
-                <a:schemeClr val="accent1">
-                  <a:lumMod val="75000"/>
-                </a:schemeClr>
-              </a:buClr>
-              <a:buSzPct val="85000"/>
-              <a:buFont typeface="Wingdings" pitchFamily="2" charset="2"/>
-              <a:buChar char="§"/>
-              <a:defRPr sz="1600" kern="1200">
-                <a:solidFill>
-                  <a:schemeClr val="tx1"/>
-                </a:solidFill>
-                <a:latin typeface="+mn-lt"/>
-                <a:ea typeface="+mn-ea"/>
-                <a:cs typeface="+mn-cs"/>
-              </a:defRPr>
-            </a:lvl9pPr>
-          </a:lstStyle>
-          <a:p>
-            <a:pPr marL="0" indent="0" algn="ctr">
-              <a:buFont typeface="Wingdings" pitchFamily="2" charset="2"/>
-              <a:buNone/>
-            </a:pPr>
-            <a:r>
-              <a:rPr lang="fr-CH" dirty="0"/>
-              <a:t>Thread</a:t>
-            </a:r>
-          </a:p>
-        </p:txBody>
-      </p:sp>
       <p:pic>
         <p:nvPicPr>
           <p:cNvPr id="2050" name="Picture 2" descr="Slider - Free ui icons">
@@ -10311,7 +12039,7 @@
           <p:nvPr/>
         </p:nvPicPr>
         <p:blipFill>
-          <a:blip r:embed="rId10">
+          <a:blip r:embed="rId14">
             <a:extLst>
               <a:ext uri="{28A0092B-C50C-407E-A947-70E740481C1C}">
                 <a14:useLocalDpi xmlns:a14="http://schemas.microsoft.com/office/drawing/2010/main" val="0"/>
@@ -10358,7 +12086,7 @@
           <p:nvPr/>
         </p:nvPicPr>
         <p:blipFill>
-          <a:blip r:embed="rId11">
+          <a:blip r:embed="rId15">
             <a:extLst>
               <a:ext uri="{28A0092B-C50C-407E-A947-70E740481C1C}">
                 <a14:useLocalDpi xmlns:a14="http://schemas.microsoft.com/office/drawing/2010/main" val="0"/>
@@ -10405,7 +12133,7 @@
           <p:nvPr/>
         </p:nvPicPr>
         <p:blipFill>
-          <a:blip r:embed="rId12">
+          <a:blip r:embed="rId16">
             <a:extLst>
               <a:ext uri="{28A0092B-C50C-407E-A947-70E740481C1C}">
                 <a14:useLocalDpi xmlns:a14="http://schemas.microsoft.com/office/drawing/2010/main" val="0"/>
@@ -10582,10 +12310,10 @@
           <p:nvPr/>
         </p:nvPicPr>
         <p:blipFill>
-          <a:blip r:embed="rId13">
+          <a:blip r:embed="rId17">
             <a:extLst>
               <a:ext uri="{96DAC541-7B7A-43D3-8B79-37D633B846F1}">
-                <asvg:svgBlip xmlns:asvg="http://schemas.microsoft.com/office/drawing/2016/SVG/main" r:embed="rId14"/>
+                <asvg:svgBlip xmlns:asvg="http://schemas.microsoft.com/office/drawing/2016/SVG/main" r:embed="rId18"/>
               </a:ext>
             </a:extLst>
           </a:blip>
@@ -10712,7 +12440,7 @@
           <p:nvPr/>
         </p:nvPicPr>
         <p:blipFill>
-          <a:blip r:embed="rId15">
+          <a:blip r:embed="rId19">
             <a:extLst>
               <a:ext uri="{28A0092B-C50C-407E-A947-70E740481C1C}">
                 <a14:useLocalDpi xmlns:a14="http://schemas.microsoft.com/office/drawing/2010/main" val="0"/>
@@ -10759,7 +12487,7 @@
           <p:nvPr/>
         </p:nvPicPr>
         <p:blipFill>
-          <a:blip r:embed="rId16">
+          <a:blip r:embed="rId20">
             <a:extLst>
               <a:ext uri="{28A0092B-C50C-407E-A947-70E740481C1C}">
                 <a14:useLocalDpi xmlns:a14="http://schemas.microsoft.com/office/drawing/2010/main" val="0"/>
@@ -10806,10 +12534,10 @@
           <p:nvPr/>
         </p:nvPicPr>
         <p:blipFill>
-          <a:blip r:embed="rId17">
+          <a:blip r:embed="rId21">
             <a:extLst>
               <a:ext uri="{96DAC541-7B7A-43D3-8B79-37D633B846F1}">
-                <asvg:svgBlip xmlns:asvg="http://schemas.microsoft.com/office/drawing/2016/SVG/main" r:embed="rId18"/>
+                <asvg:svgBlip xmlns:asvg="http://schemas.microsoft.com/office/drawing/2016/SVG/main" r:embed="rId22"/>
               </a:ext>
             </a:extLst>
           </a:blip>
@@ -10899,10 +12627,10 @@
           <p:nvPr/>
         </p:nvPicPr>
         <p:blipFill>
-          <a:blip r:embed="rId19">
+          <a:blip r:embed="rId23">
             <a:extLst>
               <a:ext uri="{96DAC541-7B7A-43D3-8B79-37D633B846F1}">
-                <asvg:svgBlip xmlns:asvg="http://schemas.microsoft.com/office/drawing/2016/SVG/main" r:embed="rId20"/>
+                <asvg:svgBlip xmlns:asvg="http://schemas.microsoft.com/office/drawing/2016/SVG/main" r:embed="rId24"/>
               </a:ext>
             </a:extLst>
           </a:blip>
@@ -10992,10 +12720,10 @@
           <p:nvPr/>
         </p:nvPicPr>
         <p:blipFill>
-          <a:blip r:embed="rId17">
+          <a:blip r:embed="rId21">
             <a:extLst>
               <a:ext uri="{96DAC541-7B7A-43D3-8B79-37D633B846F1}">
-                <asvg:svgBlip xmlns:asvg="http://schemas.microsoft.com/office/drawing/2016/SVG/main" r:embed="rId18"/>
+                <asvg:svgBlip xmlns:asvg="http://schemas.microsoft.com/office/drawing/2016/SVG/main" r:embed="rId22"/>
               </a:ext>
             </a:extLst>
           </a:blip>
@@ -11080,10 +12808,10 @@
           <p:nvPr/>
         </p:nvPicPr>
         <p:blipFill>
-          <a:blip r:embed="rId21">
+          <a:blip r:embed="rId25">
             <a:extLst>
               <a:ext uri="{96DAC541-7B7A-43D3-8B79-37D633B846F1}">
-                <asvg:svgBlip xmlns:asvg="http://schemas.microsoft.com/office/drawing/2016/SVG/main" r:embed="rId22"/>
+                <asvg:svgBlip xmlns:asvg="http://schemas.microsoft.com/office/drawing/2016/SVG/main" r:embed="rId26"/>
               </a:ext>
             </a:extLst>
           </a:blip>
@@ -11116,10 +12844,10 @@
           <p:nvPr/>
         </p:nvPicPr>
         <p:blipFill>
-          <a:blip r:embed="rId23">
+          <a:blip r:embed="rId27">
             <a:extLst>
               <a:ext uri="{96DAC541-7B7A-43D3-8B79-37D633B846F1}">
-                <asvg:svgBlip xmlns:asvg="http://schemas.microsoft.com/office/drawing/2016/SVG/main" r:embed="rId24"/>
+                <asvg:svgBlip xmlns:asvg="http://schemas.microsoft.com/office/drawing/2016/SVG/main" r:embed="rId28"/>
               </a:ext>
             </a:extLst>
           </a:blip>
@@ -11379,10 +13107,10 @@
           <p:nvPr/>
         </p:nvPicPr>
         <p:blipFill>
-          <a:blip r:embed="rId23">
+          <a:blip r:embed="rId27">
             <a:extLst>
               <a:ext uri="{96DAC541-7B7A-43D3-8B79-37D633B846F1}">
-                <asvg:svgBlip xmlns:asvg="http://schemas.microsoft.com/office/drawing/2016/SVG/main" r:embed="rId24"/>
+                <asvg:svgBlip xmlns:asvg="http://schemas.microsoft.com/office/drawing/2016/SVG/main" r:embed="rId28"/>
               </a:ext>
             </a:extLst>
           </a:blip>
@@ -11502,10 +13230,10 @@
           <p:nvPr/>
         </p:nvPicPr>
         <p:blipFill>
-          <a:blip r:embed="rId21">
+          <a:blip r:embed="rId25">
             <a:extLst>
               <a:ext uri="{96DAC541-7B7A-43D3-8B79-37D633B846F1}">
-                <asvg:svgBlip xmlns:asvg="http://schemas.microsoft.com/office/drawing/2016/SVG/main" r:embed="rId22"/>
+                <asvg:svgBlip xmlns:asvg="http://schemas.microsoft.com/office/drawing/2016/SVG/main" r:embed="rId26"/>
               </a:ext>
             </a:extLst>
           </a:blip>
@@ -12053,10 +13781,10 @@
           <p:nvPr/>
         </p:nvPicPr>
         <p:blipFill>
-          <a:blip r:embed="rId25">
+          <a:blip r:embed="rId29">
             <a:extLst>
               <a:ext uri="{96DAC541-7B7A-43D3-8B79-37D633B846F1}">
-                <asvg:svgBlip xmlns:asvg="http://schemas.microsoft.com/office/drawing/2016/SVG/main" r:embed="rId26"/>
+                <asvg:svgBlip xmlns:asvg="http://schemas.microsoft.com/office/drawing/2016/SVG/main" r:embed="rId30"/>
               </a:ext>
             </a:extLst>
           </a:blip>
@@ -12074,6 +13802,110 @@
           </a:prstGeom>
         </p:spPr>
       </p:pic>
+      <p:sp>
+        <p:nvSpPr>
+          <p:cNvPr id="11" name="ZoneTexte 10">
+            <a:extLst>
+              <a:ext uri="{FF2B5EF4-FFF2-40B4-BE49-F238E27FC236}">
+                <a16:creationId xmlns:a16="http://schemas.microsoft.com/office/drawing/2014/main" id="{94C13DC0-B844-52A0-93C2-331AD5B8590F}"/>
+              </a:ext>
+            </a:extLst>
+          </p:cNvPr>
+          <p:cNvSpPr txBox="1"/>
+          <p:nvPr/>
+        </p:nvSpPr>
+        <p:spPr>
+          <a:xfrm>
+            <a:off x="639981" y="1963201"/>
+            <a:ext cx="1209674" cy="584775"/>
+          </a:xfrm>
+          <a:prstGeom prst="rect">
+            <a:avLst/>
+          </a:prstGeom>
+          <a:noFill/>
+        </p:spPr>
+        <p:txBody>
+          <a:bodyPr wrap="square" rtlCol="0">
+            <a:spAutoFit/>
+          </a:bodyPr>
+          <a:lstStyle/>
+          <a:p>
+            <a:pPr algn="ctr"/>
+            <a:r>
+              <a:rPr lang="fr-CH" sz="1600" b="1" cap="small" dirty="0" err="1">
+                <a:solidFill>
+                  <a:schemeClr val="accent1">
+                    <a:lumMod val="50000"/>
+                  </a:schemeClr>
+                </a:solidFill>
+              </a:rPr>
+              <a:t>Steering</a:t>
+            </a:r>
+            <a:r>
+              <a:rPr lang="fr-CH" sz="1600" b="1" cap="small" dirty="0">
+                <a:solidFill>
+                  <a:schemeClr val="accent1">
+                    <a:lumMod val="50000"/>
+                  </a:schemeClr>
+                </a:solidFill>
+              </a:rPr>
+              <a:t> thread</a:t>
+            </a:r>
+          </a:p>
+        </p:txBody>
+      </p:sp>
+      <p:sp>
+        <p:nvSpPr>
+          <p:cNvPr id="15" name="ZoneTexte 14">
+            <a:extLst>
+              <a:ext uri="{FF2B5EF4-FFF2-40B4-BE49-F238E27FC236}">
+                <a16:creationId xmlns:a16="http://schemas.microsoft.com/office/drawing/2014/main" id="{E03209A1-9280-78DB-EF5B-5941AB5BE03B}"/>
+              </a:ext>
+            </a:extLst>
+          </p:cNvPr>
+          <p:cNvSpPr txBox="1"/>
+          <p:nvPr/>
+        </p:nvSpPr>
+        <p:spPr>
+          <a:xfrm>
+            <a:off x="510509" y="4076254"/>
+            <a:ext cx="1468619" cy="584775"/>
+          </a:xfrm>
+          <a:prstGeom prst="rect">
+            <a:avLst/>
+          </a:prstGeom>
+          <a:noFill/>
+        </p:spPr>
+        <p:txBody>
+          <a:bodyPr wrap="square" rtlCol="0">
+            <a:spAutoFit/>
+          </a:bodyPr>
+          <a:lstStyle/>
+          <a:p>
+            <a:pPr algn="ctr"/>
+            <a:r>
+              <a:rPr lang="fr-CH" sz="1600" b="1" cap="small" dirty="0" err="1">
+                <a:solidFill>
+                  <a:schemeClr val="accent3">
+                    <a:lumMod val="50000"/>
+                  </a:schemeClr>
+                </a:solidFill>
+              </a:rPr>
+              <a:t>VehicleInfo</a:t>
+            </a:r>
+            <a:r>
+              <a:rPr lang="fr-CH" sz="1600" b="1" cap="small" dirty="0">
+                <a:solidFill>
+                  <a:schemeClr val="accent3">
+                    <a:lumMod val="50000"/>
+                  </a:schemeClr>
+                </a:solidFill>
+              </a:rPr>
+              <a:t> thread</a:t>
+            </a:r>
+          </a:p>
+        </p:txBody>
+      </p:sp>
     </p:spTree>
     <p:extLst>
       <p:ext uri="{BB962C8B-B14F-4D97-AF65-F5344CB8AC3E}">
@@ -13783,6 +15615,146 @@
                                         <p:cTn id="153" dur="500"/>
                                         <p:tgtEl>
                                           <p:spTgt spid="29"/>
+                                        </p:tgtEl>
+                                      </p:cBhvr>
+                                    </p:animEffect>
+                                  </p:childTnLst>
+                                </p:cTn>
+                              </p:par>
+                              <p:par>
+                                <p:cTn id="154" presetID="10" presetClass="entr" presetSubtype="0" fill="hold" grpId="0" nodeType="withEffect">
+                                  <p:stCondLst>
+                                    <p:cond delay="0"/>
+                                  </p:stCondLst>
+                                  <p:childTnLst>
+                                    <p:set>
+                                      <p:cBhvr>
+                                        <p:cTn id="155" dur="1" fill="hold">
+                                          <p:stCondLst>
+                                            <p:cond delay="0"/>
+                                          </p:stCondLst>
+                                        </p:cTn>
+                                        <p:tgtEl>
+                                          <p:spTgt spid="11"/>
+                                        </p:tgtEl>
+                                        <p:attrNameLst>
+                                          <p:attrName>style.visibility</p:attrName>
+                                        </p:attrNameLst>
+                                      </p:cBhvr>
+                                      <p:to>
+                                        <p:strVal val="visible"/>
+                                      </p:to>
+                                    </p:set>
+                                    <p:animEffect transition="in" filter="fade">
+                                      <p:cBhvr>
+                                        <p:cTn id="156" dur="500"/>
+                                        <p:tgtEl>
+                                          <p:spTgt spid="11"/>
+                                        </p:tgtEl>
+                                      </p:cBhvr>
+                                    </p:animEffect>
+                                  </p:childTnLst>
+                                </p:cTn>
+                              </p:par>
+                              <p:par>
+                                <p:cTn id="157" presetID="10" presetClass="entr" presetSubtype="0" fill="hold" grpId="0" nodeType="withEffect">
+                                  <p:stCondLst>
+                                    <p:cond delay="0"/>
+                                  </p:stCondLst>
+                                  <p:childTnLst>
+                                    <p:set>
+                                      <p:cBhvr>
+                                        <p:cTn id="158" dur="1" fill="hold">
+                                          <p:stCondLst>
+                                            <p:cond delay="0"/>
+                                          </p:stCondLst>
+                                        </p:cTn>
+                                        <p:tgtEl>
+                                          <p:spTgt spid="15"/>
+                                        </p:tgtEl>
+                                        <p:attrNameLst>
+                                          <p:attrName>style.visibility</p:attrName>
+                                        </p:attrNameLst>
+                                      </p:cBhvr>
+                                      <p:to>
+                                        <p:strVal val="visible"/>
+                                      </p:to>
+                                    </p:set>
+                                    <p:animEffect transition="in" filter="fade">
+                                      <p:cBhvr>
+                                        <p:cTn id="159" dur="500"/>
+                                        <p:tgtEl>
+                                          <p:spTgt spid="15"/>
+                                        </p:tgtEl>
+                                      </p:cBhvr>
+                                    </p:animEffect>
+                                  </p:childTnLst>
+                                </p:cTn>
+                              </p:par>
+                              <p:par>
+                                <p:cTn id="160" presetID="10" presetClass="entr" presetSubtype="0" fill="hold" nodeType="withEffect">
+                                  <p:stCondLst>
+                                    <p:cond delay="0"/>
+                                  </p:stCondLst>
+                                  <p:childTnLst>
+                                    <p:set>
+                                      <p:cBhvr>
+                                        <p:cTn id="161" dur="1" fill="hold">
+                                          <p:stCondLst>
+                                            <p:cond delay="0"/>
+                                          </p:stCondLst>
+                                        </p:cTn>
+                                        <p:tgtEl>
+                                          <p:spTgt spid="16"/>
+                                        </p:tgtEl>
+                                        <p:attrNameLst>
+                                          <p:attrName>style.visibility</p:attrName>
+                                        </p:attrNameLst>
+                                      </p:cBhvr>
+                                      <p:to>
+                                        <p:strVal val="visible"/>
+                                      </p:to>
+                                    </p:set>
+                                    <p:animEffect transition="in" filter="fade">
+                                      <p:cBhvr>
+                                        <p:cTn id="162" dur="500"/>
+                                        <p:tgtEl>
+                                          <p:spTgt spid="16"/>
+                                        </p:tgtEl>
+                                      </p:cBhvr>
+                                    </p:animEffect>
+                                  </p:childTnLst>
+                                </p:cTn>
+                              </p:par>
+                              <p:par>
+                                <p:cTn id="163" presetID="10" presetClass="entr" presetSubtype="0" fill="hold" nodeType="withEffect">
+                                  <p:stCondLst>
+                                    <p:cond delay="0"/>
+                                  </p:stCondLst>
+                                  <p:childTnLst>
+                                    <p:set>
+                                      <p:cBhvr>
+                                        <p:cTn id="164" dur="1" fill="hold">
+                                          <p:stCondLst>
+                                            <p:cond delay="0"/>
+                                          </p:stCondLst>
+                                        </p:cTn>
+                                        <p:tgtEl>
+                                          <p:spTgt spid="21"/>
+                                        </p:tgtEl>
+                                        <p:attrNameLst>
+                                          <p:attrName>style.visibility</p:attrName>
+                                        </p:attrNameLst>
+                                      </p:cBhvr>
+                                      <p:to>
+                                        <p:strVal val="visible"/>
+                                      </p:to>
+                                    </p:set>
+                                    <p:animEffect transition="in" filter="fade">
+                                      <p:cBhvr>
+                                        <p:cTn id="165" dur="500"/>
+                                        <p:tgtEl>
+                                          <p:spTgt spid="21"/>
                                         </p:tgtEl>
                                       </p:cBhvr>
                                     </p:animEffect>
@@ -13833,12 +15805,14 @@
       <p:bldP spid="20" grpId="0" animBg="1"/>
       <p:bldP spid="22" grpId="0" animBg="1"/>
       <p:bldP spid="17" grpId="0" animBg="1"/>
+      <p:bldP spid="11" grpId="0"/>
+      <p:bldP spid="15" grpId="0"/>
     </p:bldLst>
   </p:timing>
 </p:sld>
 </file>
 
-<file path=ppt/slides/slide6.xml><?xml version="1.0" encoding="utf-8"?>
+<file path=ppt/slides/slide7.xml><?xml version="1.0" encoding="utf-8"?>
 <p:sld xmlns:a="http://schemas.openxmlformats.org/drawingml/2006/main" xmlns:r="http://schemas.openxmlformats.org/officeDocument/2006/relationships" xmlns:p="http://schemas.openxmlformats.org/presentationml/2006/main">
   <p:cSld>
     <p:spTree>
@@ -14203,7 +16177,7 @@
           <a:p>
             <a:fld id="{6D22F896-40B5-4ADD-8801-0D06FADFA095}" type="slidenum">
               <a:rPr lang="en-US" smtClean="0"/>
-              <a:t>6</a:t>
+              <a:t>7</a:t>
             </a:fld>
             <a:endParaRPr lang="en-US" dirty="0"/>
           </a:p>

</xml_diff>